<commit_message>
Progress on the presentation.
</commit_message>
<xml_diff>
--- a/RxJava and SWT.pptx
+++ b/RxJava and SWT.pptx
@@ -6,7 +6,12 @@
   </p:sldMasterIdLst>
   <p:sldIdLst>
     <p:sldId id="256" r:id="rId2"/>
-    <p:sldId id="257" r:id="rId3"/>
+    <p:sldId id="259" r:id="rId3"/>
+    <p:sldId id="260" r:id="rId4"/>
+    <p:sldId id="258" r:id="rId5"/>
+    <p:sldId id="257" r:id="rId6"/>
+    <p:sldId id="261" r:id="rId7"/>
+    <p:sldId id="262" r:id="rId8"/>
   </p:sldIdLst>
   <p:sldSz cx="12192000" cy="6858000"/>
   <p:notesSz cx="6858000" cy="9144000"/>
@@ -244,7 +249,7 @@
           <a:p>
             <a:fld id="{B8966210-D7C8-4A1C-B59E-033C29288170}" type="datetimeFigureOut">
               <a:rPr lang="en-US" smtClean="0"/>
-              <a:t>11/21/2015</a:t>
+              <a:t>11/22/2015</a:t>
             </a:fld>
             <a:endParaRPr lang="en-US"/>
           </a:p>
@@ -414,7 +419,7 @@
           <a:p>
             <a:fld id="{B8966210-D7C8-4A1C-B59E-033C29288170}" type="datetimeFigureOut">
               <a:rPr lang="en-US" smtClean="0"/>
-              <a:t>11/21/2015</a:t>
+              <a:t>11/22/2015</a:t>
             </a:fld>
             <a:endParaRPr lang="en-US"/>
           </a:p>
@@ -594,7 +599,7 @@
           <a:p>
             <a:fld id="{B8966210-D7C8-4A1C-B59E-033C29288170}" type="datetimeFigureOut">
               <a:rPr lang="en-US" smtClean="0"/>
-              <a:t>11/21/2015</a:t>
+              <a:t>11/22/2015</a:t>
             </a:fld>
             <a:endParaRPr lang="en-US"/>
           </a:p>
@@ -764,7 +769,7 @@
           <a:p>
             <a:fld id="{B8966210-D7C8-4A1C-B59E-033C29288170}" type="datetimeFigureOut">
               <a:rPr lang="en-US" smtClean="0"/>
-              <a:t>11/21/2015</a:t>
+              <a:t>11/22/2015</a:t>
             </a:fld>
             <a:endParaRPr lang="en-US"/>
           </a:p>
@@ -1010,7 +1015,7 @@
           <a:p>
             <a:fld id="{B8966210-D7C8-4A1C-B59E-033C29288170}" type="datetimeFigureOut">
               <a:rPr lang="en-US" smtClean="0"/>
-              <a:t>11/21/2015</a:t>
+              <a:t>11/22/2015</a:t>
             </a:fld>
             <a:endParaRPr lang="en-US"/>
           </a:p>
@@ -1242,7 +1247,7 @@
           <a:p>
             <a:fld id="{B8966210-D7C8-4A1C-B59E-033C29288170}" type="datetimeFigureOut">
               <a:rPr lang="en-US" smtClean="0"/>
-              <a:t>11/21/2015</a:t>
+              <a:t>11/22/2015</a:t>
             </a:fld>
             <a:endParaRPr lang="en-US"/>
           </a:p>
@@ -1609,7 +1614,7 @@
           <a:p>
             <a:fld id="{B8966210-D7C8-4A1C-B59E-033C29288170}" type="datetimeFigureOut">
               <a:rPr lang="en-US" smtClean="0"/>
-              <a:t>11/21/2015</a:t>
+              <a:t>11/22/2015</a:t>
             </a:fld>
             <a:endParaRPr lang="en-US"/>
           </a:p>
@@ -1727,7 +1732,7 @@
           <a:p>
             <a:fld id="{B8966210-D7C8-4A1C-B59E-033C29288170}" type="datetimeFigureOut">
               <a:rPr lang="en-US" smtClean="0"/>
-              <a:t>11/21/2015</a:t>
+              <a:t>11/22/2015</a:t>
             </a:fld>
             <a:endParaRPr lang="en-US"/>
           </a:p>
@@ -1822,7 +1827,7 @@
           <a:p>
             <a:fld id="{B8966210-D7C8-4A1C-B59E-033C29288170}" type="datetimeFigureOut">
               <a:rPr lang="en-US" smtClean="0"/>
-              <a:t>11/21/2015</a:t>
+              <a:t>11/22/2015</a:t>
             </a:fld>
             <a:endParaRPr lang="en-US"/>
           </a:p>
@@ -2099,7 +2104,7 @@
           <a:p>
             <a:fld id="{B8966210-D7C8-4A1C-B59E-033C29288170}" type="datetimeFigureOut">
               <a:rPr lang="en-US" smtClean="0"/>
-              <a:t>11/21/2015</a:t>
+              <a:t>11/22/2015</a:t>
             </a:fld>
             <a:endParaRPr lang="en-US"/>
           </a:p>
@@ -2352,7 +2357,7 @@
           <a:p>
             <a:fld id="{B8966210-D7C8-4A1C-B59E-033C29288170}" type="datetimeFigureOut">
               <a:rPr lang="en-US" smtClean="0"/>
-              <a:t>11/21/2015</a:t>
+              <a:t>11/22/2015</a:t>
             </a:fld>
             <a:endParaRPr lang="en-US"/>
           </a:p>
@@ -2565,7 +2570,7 @@
           <a:p>
             <a:fld id="{B8966210-D7C8-4A1C-B59E-033C29288170}" type="datetimeFigureOut">
               <a:rPr lang="en-US" smtClean="0"/>
-              <a:t>11/21/2015</a:t>
+              <a:t>11/22/2015</a:t>
             </a:fld>
             <a:endParaRPr lang="en-US"/>
           </a:p>
@@ -2982,7 +2987,7 @@
         </p:nvSpPr>
         <p:spPr>
           <a:xfrm>
-            <a:off x="1474124" y="714895"/>
+            <a:off x="1474124" y="111048"/>
             <a:ext cx="9144000" cy="1880668"/>
           </a:xfrm>
         </p:spPr>
@@ -3034,7 +3039,7 @@
         </p:blipFill>
         <p:spPr bwMode="auto">
           <a:xfrm>
-            <a:off x="2823673" y="3978438"/>
+            <a:off x="2823673" y="2210028"/>
             <a:ext cx="2114088" cy="2114088"/>
           </a:xfrm>
           <a:prstGeom prst="rect">
@@ -3075,7 +3080,7 @@
         </p:blipFill>
         <p:spPr bwMode="auto">
           <a:xfrm>
-            <a:off x="6728723" y="3669897"/>
+            <a:off x="6728723" y="1901487"/>
             <a:ext cx="2731162" cy="2731170"/>
           </a:xfrm>
           <a:prstGeom prst="rect">
@@ -3093,6 +3098,117 @@
           </a:extLst>
         </p:spPr>
       </p:pic>
+      <p:sp>
+        <p:nvSpPr>
+          <p:cNvPr id="5" name="Title 1"/>
+          <p:cNvSpPr txBox="1">
+            <a:spLocks/>
+          </p:cNvSpPr>
+          <p:nvPr/>
+        </p:nvSpPr>
+        <p:spPr>
+          <a:xfrm>
+            <a:off x="1474124" y="4162588"/>
+            <a:ext cx="9144000" cy="1880668"/>
+          </a:xfrm>
+          <a:prstGeom prst="rect">
+            <a:avLst/>
+          </a:prstGeom>
+        </p:spPr>
+        <p:txBody>
+          <a:bodyPr vert="horz" lIns="91440" tIns="45720" rIns="91440" bIns="45720" rtlCol="0" anchor="b">
+            <a:normAutofit/>
+          </a:bodyPr>
+          <a:lstStyle>
+            <a:lvl1pPr algn="ctr" defTabSz="914400" rtl="0" eaLnBrk="1" latinLnBrk="0" hangingPunct="1">
+              <a:lnSpc>
+                <a:spcPct val="90000"/>
+              </a:lnSpc>
+              <a:spcBef>
+                <a:spcPct val="0"/>
+              </a:spcBef>
+              <a:buNone/>
+              <a:defRPr sz="6000" kern="1200">
+                <a:solidFill>
+                  <a:schemeClr val="tx1"/>
+                </a:solidFill>
+                <a:latin typeface="+mj-lt"/>
+                <a:ea typeface="+mj-ea"/>
+                <a:cs typeface="+mj-cs"/>
+              </a:defRPr>
+            </a:lvl1pPr>
+          </a:lstStyle>
+          <a:p>
+            <a:r>
+              <a:rPr lang="en-US" sz="3600" dirty="0">
+                <a:hlinkClick r:id="rId4"/>
+              </a:rPr>
+              <a:t>https://github.com/diffplug/rxjava_and_swt</a:t>
+            </a:r>
+            <a:endParaRPr lang="en-US" sz="3600" dirty="0"/>
+          </a:p>
+        </p:txBody>
+      </p:sp>
+      <p:sp>
+        <p:nvSpPr>
+          <p:cNvPr id="6" name="Title 1"/>
+          <p:cNvSpPr txBox="1">
+            <a:spLocks/>
+          </p:cNvSpPr>
+          <p:nvPr/>
+        </p:nvSpPr>
+        <p:spPr>
+          <a:xfrm>
+            <a:off x="1413739" y="3692323"/>
+            <a:ext cx="9144000" cy="1880668"/>
+          </a:xfrm>
+          <a:prstGeom prst="rect">
+            <a:avLst/>
+          </a:prstGeom>
+        </p:spPr>
+        <p:txBody>
+          <a:bodyPr vert="horz" lIns="91440" tIns="45720" rIns="91440" bIns="45720" rtlCol="0" anchor="b">
+            <a:normAutofit/>
+          </a:bodyPr>
+          <a:lstStyle>
+            <a:lvl1pPr algn="ctr" defTabSz="914400" rtl="0" eaLnBrk="1" latinLnBrk="0" hangingPunct="1">
+              <a:lnSpc>
+                <a:spcPct val="90000"/>
+              </a:lnSpc>
+              <a:spcBef>
+                <a:spcPct val="0"/>
+              </a:spcBef>
+              <a:buNone/>
+              <a:defRPr sz="6000" kern="1200">
+                <a:solidFill>
+                  <a:schemeClr val="tx1"/>
+                </a:solidFill>
+                <a:latin typeface="+mj-lt"/>
+                <a:ea typeface="+mj-ea"/>
+                <a:cs typeface="+mj-cs"/>
+              </a:defRPr>
+            </a:lvl1pPr>
+          </a:lstStyle>
+          <a:p>
+            <a:r>
+              <a:rPr lang="en-US" sz="4000" dirty="0" smtClean="0"/>
+              <a:t>Ned </a:t>
+            </a:r>
+            <a:r>
+              <a:rPr lang="en-US" sz="4000" dirty="0" err="1" smtClean="0"/>
+              <a:t>Twigg</a:t>
+            </a:r>
+            <a:endParaRPr lang="en-US" sz="4000" dirty="0" smtClean="0"/>
+          </a:p>
+          <a:p>
+            <a:r>
+              <a:rPr lang="en-US" sz="3200" dirty="0" smtClean="0"/>
+              <a:t>All code examples available here</a:t>
+            </a:r>
+            <a:endParaRPr lang="en-US" sz="3200" dirty="0"/>
+          </a:p>
+        </p:txBody>
+      </p:sp>
     </p:spTree>
     <p:extLst>
       <p:ext uri="{BB962C8B-B14F-4D97-AF65-F5344CB8AC3E}">
@@ -3147,7 +3263,7 @@
           <a:p>
             <a:r>
               <a:rPr lang="en-US" dirty="0" smtClean="0"/>
-              <a:t>What is Event-driven programming?</a:t>
+              <a:t>What is Functional Reactive Programming</a:t>
             </a:r>
             <a:endParaRPr lang="en-US" dirty="0"/>
           </a:p>
@@ -3165,17 +3281,1232 @@
         </p:nvSpPr>
         <p:spPr/>
         <p:txBody>
-          <a:bodyPr/>
-          <a:lstStyle/>
-          <a:p>
+          <a:bodyPr>
+            <a:normAutofit/>
+          </a:bodyPr>
+          <a:lstStyle/>
+          <a:p>
+            <a:r>
+              <a:rPr lang="en-US" dirty="0" smtClean="0"/>
+              <a:t>A buzzword for event-driven programming</a:t>
+            </a:r>
+          </a:p>
+          <a:p>
+            <a:r>
+              <a:rPr lang="en-US" dirty="0" smtClean="0"/>
+              <a:t>But this time the events are COMPOSABLE</a:t>
+            </a:r>
+          </a:p>
+          <a:p>
+            <a:pPr lvl="1"/>
+            <a:r>
+              <a:rPr lang="en-US" u="sng" dirty="0" smtClean="0">
+                <a:hlinkClick r:id="rId2"/>
+              </a:rPr>
+              <a:t>Epigrams in Programming</a:t>
+            </a:r>
+            <a:r>
+              <a:rPr lang="en-US" dirty="0" smtClean="0"/>
+              <a:t> #9 (Alan Perlis 1988, 30-50 years of experience)</a:t>
+            </a:r>
+          </a:p>
+          <a:p>
+            <a:pPr lvl="1"/>
+            <a:r>
+              <a:rPr lang="en-US" sz="3600" dirty="0"/>
+              <a:t>It is better to have 100 functions operate on one data structure than 10 functions on 10 data structures</a:t>
+            </a:r>
+            <a:r>
+              <a:rPr lang="en-US" sz="3600" dirty="0" smtClean="0"/>
+              <a:t>.</a:t>
+            </a:r>
+          </a:p>
+          <a:p>
+            <a:r>
+              <a:rPr lang="en-US" sz="3200" dirty="0" smtClean="0"/>
+              <a:t>SWT – ~30 event / listener pairs, 0 methods</a:t>
+            </a:r>
+          </a:p>
+          <a:p>
+            <a:r>
+              <a:rPr lang="en-US" sz="3200" dirty="0" err="1" smtClean="0"/>
+              <a:t>RxJava</a:t>
+            </a:r>
+            <a:r>
+              <a:rPr lang="en-US" sz="3200" dirty="0" smtClean="0"/>
+              <a:t> – 1 event / listener pair, gazillion methods</a:t>
+            </a:r>
+            <a:endParaRPr lang="en-US" sz="3200" dirty="0"/>
+          </a:p>
+          <a:p>
+            <a:pPr marL="457200" lvl="1" indent="0">
+              <a:buNone/>
+            </a:pPr>
+            <a:endParaRPr lang="en-US" dirty="0" smtClean="0"/>
+          </a:p>
+          <a:p>
+            <a:pPr lvl="1"/>
+            <a:endParaRPr lang="en-US" dirty="0" smtClean="0"/>
+          </a:p>
+          <a:p>
+            <a:pPr lvl="1"/>
+            <a:endParaRPr lang="en-US" dirty="0" smtClean="0"/>
+          </a:p>
+        </p:txBody>
+      </p:sp>
+    </p:spTree>
+    <p:extLst>
+      <p:ext uri="{BB962C8B-B14F-4D97-AF65-F5344CB8AC3E}">
+        <p14:creationId xmlns:p14="http://schemas.microsoft.com/office/powerpoint/2010/main" val="170680520"/>
+      </p:ext>
+    </p:extLst>
+  </p:cSld>
+  <p:clrMapOvr>
+    <a:masterClrMapping/>
+  </p:clrMapOvr>
+  <p:timing>
+    <p:tnLst>
+      <p:par>
+        <p:cTn id="1" dur="indefinite" restart="never" nodeType="tmRoot"/>
+      </p:par>
+    </p:tnLst>
+  </p:timing>
+</p:sld>
+</file>
+
+<file path=ppt/slides/slide3.xml><?xml version="1.0" encoding="utf-8"?>
+<p:sld xmlns:a="http://schemas.openxmlformats.org/drawingml/2006/main" xmlns:r="http://schemas.openxmlformats.org/officeDocument/2006/relationships" xmlns:p="http://schemas.openxmlformats.org/presentationml/2006/main">
+  <p:cSld>
+    <p:spTree>
+      <p:nvGrpSpPr>
+        <p:cNvPr id="1" name=""/>
+        <p:cNvGrpSpPr/>
+        <p:nvPr/>
+      </p:nvGrpSpPr>
+      <p:grpSpPr>
+        <a:xfrm>
+          <a:off x="0" y="0"/>
+          <a:ext cx="0" cy="0"/>
+          <a:chOff x="0" y="0"/>
+          <a:chExt cx="0" cy="0"/>
+        </a:xfrm>
+      </p:grpSpPr>
+      <p:sp>
+        <p:nvSpPr>
+          <p:cNvPr id="2" name="Title 1"/>
+          <p:cNvSpPr>
+            <a:spLocks noGrp="1"/>
+          </p:cNvSpPr>
+          <p:nvPr>
+            <p:ph type="title"/>
+          </p:nvPr>
+        </p:nvSpPr>
+        <p:spPr/>
+        <p:txBody>
+          <a:bodyPr/>
+          <a:lstStyle/>
+          <a:p>
+            <a:r>
+              <a:rPr lang="en-US" dirty="0" smtClean="0"/>
+              <a:t>What makes </a:t>
+            </a:r>
+            <a:r>
+              <a:rPr lang="en-US" dirty="0" err="1" smtClean="0"/>
+              <a:t>RxJava</a:t>
+            </a:r>
+            <a:r>
+              <a:rPr lang="en-US" dirty="0" smtClean="0"/>
+              <a:t> more “</a:t>
+            </a:r>
+            <a:r>
+              <a:rPr lang="en-US" dirty="0" err="1" smtClean="0"/>
+              <a:t>composable</a:t>
+            </a:r>
+            <a:r>
+              <a:rPr lang="en-US" dirty="0" smtClean="0"/>
+              <a:t>”?</a:t>
+            </a:r>
             <a:endParaRPr lang="en-US" dirty="0"/>
           </a:p>
         </p:txBody>
       </p:sp>
+      <p:sp>
+        <p:nvSpPr>
+          <p:cNvPr id="3" name="Content Placeholder 2"/>
+          <p:cNvSpPr>
+            <a:spLocks noGrp="1"/>
+          </p:cNvSpPr>
+          <p:nvPr>
+            <p:ph idx="1"/>
+          </p:nvPr>
+        </p:nvSpPr>
+        <p:spPr>
+          <a:xfrm>
+            <a:off x="838200" y="1515533"/>
+            <a:ext cx="10515600" cy="4661430"/>
+          </a:xfrm>
+        </p:spPr>
+        <p:txBody>
+          <a:bodyPr>
+            <a:normAutofit lnSpcReduction="10000"/>
+          </a:bodyPr>
+          <a:lstStyle/>
+          <a:p>
+            <a:r>
+              <a:rPr lang="en-US" dirty="0" smtClean="0"/>
+              <a:t>In SWT, we add an event handler like this:</a:t>
+            </a:r>
+          </a:p>
+          <a:p>
+            <a:endParaRPr lang="en-US" dirty="0" smtClean="0"/>
+          </a:p>
+          <a:p>
+            <a:endParaRPr lang="en-US" dirty="0"/>
+          </a:p>
+          <a:p>
+            <a:endParaRPr lang="en-US" dirty="0" smtClean="0"/>
+          </a:p>
+          <a:p>
+            <a:r>
+              <a:rPr lang="en-US" dirty="0" smtClean="0"/>
+              <a:t>In </a:t>
+            </a:r>
+            <a:r>
+              <a:rPr lang="en-US" dirty="0" err="1" smtClean="0"/>
+              <a:t>RxJava</a:t>
+            </a:r>
+            <a:r>
+              <a:rPr lang="en-US" dirty="0" smtClean="0"/>
+              <a:t>, we add an event handler like this:</a:t>
+            </a:r>
+          </a:p>
+          <a:p>
+            <a:endParaRPr lang="en-US" dirty="0"/>
+          </a:p>
+          <a:p>
+            <a:endParaRPr lang="en-US" dirty="0" smtClean="0"/>
+          </a:p>
+          <a:p>
+            <a:endParaRPr lang="en-US" dirty="0"/>
+          </a:p>
+          <a:p>
+            <a:endParaRPr lang="en-US" dirty="0" smtClean="0"/>
+          </a:p>
+          <a:p>
+            <a:r>
+              <a:rPr lang="en-US" dirty="0" smtClean="0"/>
+              <a:t>Observable is a pipe we can filter, map, and more!</a:t>
+            </a:r>
+            <a:endParaRPr lang="en-US" dirty="0"/>
+          </a:p>
+        </p:txBody>
+      </p:sp>
+      <p:pic>
+        <p:nvPicPr>
+          <p:cNvPr id="4" name="Picture 3"/>
+          <p:cNvPicPr>
+            <a:picLocks noChangeAspect="1"/>
+          </p:cNvPicPr>
+          <p:nvPr/>
+        </p:nvPicPr>
+        <p:blipFill>
+          <a:blip r:embed="rId2"/>
+          <a:stretch>
+            <a:fillRect/>
+          </a:stretch>
+        </p:blipFill>
+        <p:spPr>
+          <a:xfrm>
+            <a:off x="988309" y="1981199"/>
+            <a:ext cx="6614758" cy="1161520"/>
+          </a:xfrm>
+          <a:prstGeom prst="rect">
+            <a:avLst/>
+          </a:prstGeom>
+        </p:spPr>
+      </p:pic>
+      <p:pic>
+        <p:nvPicPr>
+          <p:cNvPr id="5" name="Picture 4"/>
+          <p:cNvPicPr>
+            <a:picLocks noChangeAspect="1"/>
+          </p:cNvPicPr>
+          <p:nvPr/>
+        </p:nvPicPr>
+        <p:blipFill>
+          <a:blip r:embed="rId3"/>
+          <a:stretch>
+            <a:fillRect/>
+          </a:stretch>
+        </p:blipFill>
+        <p:spPr>
+          <a:xfrm>
+            <a:off x="988309" y="3908149"/>
+            <a:ext cx="10440858" cy="1451239"/>
+          </a:xfrm>
+          <a:prstGeom prst="rect">
+            <a:avLst/>
+          </a:prstGeom>
+        </p:spPr>
+      </p:pic>
+    </p:spTree>
+    <p:extLst>
+      <p:ext uri="{BB962C8B-B14F-4D97-AF65-F5344CB8AC3E}">
+        <p14:creationId xmlns:p14="http://schemas.microsoft.com/office/powerpoint/2010/main" val="3215044474"/>
+      </p:ext>
+    </p:extLst>
+  </p:cSld>
+  <p:clrMapOvr>
+    <a:masterClrMapping/>
+  </p:clrMapOvr>
+  <p:timing>
+    <p:tnLst>
+      <p:par>
+        <p:cTn id="1" dur="indefinite" restart="never" nodeType="tmRoot"/>
+      </p:par>
+    </p:tnLst>
+  </p:timing>
+</p:sld>
+</file>
+
+<file path=ppt/slides/slide4.xml><?xml version="1.0" encoding="utf-8"?>
+<p:sld xmlns:a="http://schemas.openxmlformats.org/drawingml/2006/main" xmlns:r="http://schemas.openxmlformats.org/officeDocument/2006/relationships" xmlns:p="http://schemas.openxmlformats.org/presentationml/2006/main">
+  <p:cSld>
+    <p:spTree>
+      <p:nvGrpSpPr>
+        <p:cNvPr id="1" name=""/>
+        <p:cNvGrpSpPr/>
+        <p:nvPr/>
+      </p:nvGrpSpPr>
+      <p:grpSpPr>
+        <a:xfrm>
+          <a:off x="0" y="0"/>
+          <a:ext cx="0" cy="0"/>
+          <a:chOff x="0" y="0"/>
+          <a:chExt cx="0" cy="0"/>
+        </a:xfrm>
+      </p:grpSpPr>
+      <p:sp>
+        <p:nvSpPr>
+          <p:cNvPr id="2" name="Title 1"/>
+          <p:cNvSpPr>
+            <a:spLocks noGrp="1"/>
+          </p:cNvSpPr>
+          <p:nvPr>
+            <p:ph type="title"/>
+          </p:nvPr>
+        </p:nvSpPr>
+        <p:spPr/>
+        <p:txBody>
+          <a:bodyPr/>
+          <a:lstStyle/>
+          <a:p>
+            <a:r>
+              <a:rPr lang="en-US" dirty="0" smtClean="0"/>
+              <a:t>What good is a pipe?</a:t>
+            </a:r>
+            <a:endParaRPr lang="en-US" dirty="0"/>
+          </a:p>
+        </p:txBody>
+      </p:sp>
+      <p:pic>
+        <p:nvPicPr>
+          <p:cNvPr id="6" name="Picture 5"/>
+          <p:cNvPicPr>
+            <a:picLocks noChangeAspect="1"/>
+          </p:cNvPicPr>
+          <p:nvPr/>
+        </p:nvPicPr>
+        <p:blipFill rotWithShape="1">
+          <a:blip r:embed="rId2"/>
+          <a:srcRect l="5560" t="32930" r="11137" b="41269"/>
+          <a:stretch/>
+        </p:blipFill>
+        <p:spPr>
+          <a:xfrm>
+            <a:off x="413466" y="2390328"/>
+            <a:ext cx="4753155" cy="569343"/>
+          </a:xfrm>
+          <a:prstGeom prst="rect">
+            <a:avLst/>
+          </a:prstGeom>
+        </p:spPr>
+      </p:pic>
+      <p:pic>
+        <p:nvPicPr>
+          <p:cNvPr id="7" name="Picture 6"/>
+          <p:cNvPicPr>
+            <a:picLocks noChangeAspect="1"/>
+          </p:cNvPicPr>
+          <p:nvPr/>
+        </p:nvPicPr>
+        <p:blipFill rotWithShape="1">
+          <a:blip r:embed="rId3"/>
+          <a:srcRect t="44948" r="17634" b="31718"/>
+          <a:stretch/>
+        </p:blipFill>
+        <p:spPr>
+          <a:xfrm>
+            <a:off x="5739771" y="2345016"/>
+            <a:ext cx="5614029" cy="569343"/>
+          </a:xfrm>
+          <a:prstGeom prst="rect">
+            <a:avLst/>
+          </a:prstGeom>
+        </p:spPr>
+      </p:pic>
+      <p:sp>
+        <p:nvSpPr>
+          <p:cNvPr id="8" name="Content Placeholder 2"/>
+          <p:cNvSpPr>
+            <a:spLocks noGrp="1"/>
+          </p:cNvSpPr>
+          <p:nvPr>
+            <p:ph idx="1"/>
+          </p:nvPr>
+        </p:nvSpPr>
+        <p:spPr>
+          <a:xfrm>
+            <a:off x="838200" y="1515533"/>
+            <a:ext cx="10515600" cy="4661430"/>
+          </a:xfrm>
+        </p:spPr>
+        <p:txBody>
+          <a:bodyPr>
+            <a:normAutofit/>
+          </a:bodyPr>
+          <a:lstStyle/>
+          <a:p>
+            <a:r>
+              <a:rPr lang="en-US" dirty="0" smtClean="0"/>
+              <a:t>Event callbacks and event streams are the same</a:t>
+            </a:r>
+          </a:p>
+          <a:p>
+            <a:pPr lvl="1"/>
+            <a:r>
+              <a:rPr lang="en-US" dirty="0" smtClean="0"/>
+              <a:t>every if statement = filter</a:t>
+            </a:r>
+          </a:p>
+          <a:p>
+            <a:pPr lvl="1"/>
+            <a:endParaRPr lang="en-US" dirty="0"/>
+          </a:p>
+          <a:p>
+            <a:pPr lvl="1"/>
+            <a:endParaRPr lang="en-US" dirty="0" smtClean="0"/>
+          </a:p>
+          <a:p>
+            <a:pPr lvl="1"/>
+            <a:r>
+              <a:rPr lang="en-US" dirty="0" smtClean="0"/>
+              <a:t>every new value = map</a:t>
+            </a:r>
+          </a:p>
+          <a:p>
+            <a:pPr lvl="1"/>
+            <a:endParaRPr lang="en-US" dirty="0"/>
+          </a:p>
+          <a:p>
+            <a:pPr lvl="1"/>
+            <a:endParaRPr lang="en-US" dirty="0" smtClean="0"/>
+          </a:p>
+          <a:p>
+            <a:r>
+              <a:rPr lang="en-US" dirty="0" smtClean="0"/>
+              <a:t>A keypress will cause a cascade of actions across your program</a:t>
+            </a:r>
+          </a:p>
+          <a:p>
+            <a:pPr lvl="1"/>
+            <a:r>
+              <a:rPr lang="en-US" dirty="0" smtClean="0"/>
+              <a:t>With Events, that cascade flows through ad-hoc function calls</a:t>
+            </a:r>
+          </a:p>
+          <a:p>
+            <a:pPr lvl="1"/>
+            <a:r>
+              <a:rPr lang="en-US" dirty="0" smtClean="0"/>
+              <a:t>With Observables, that cascade is </a:t>
+            </a:r>
+            <a:r>
+              <a:rPr lang="en-US" i="1" dirty="0" smtClean="0"/>
+              <a:t>explicitly modeled </a:t>
+            </a:r>
+            <a:r>
+              <a:rPr lang="en-US" dirty="0" smtClean="0"/>
+              <a:t>and comes with batteries</a:t>
+            </a:r>
+          </a:p>
+          <a:p>
+            <a:pPr lvl="2"/>
+            <a:r>
+              <a:rPr lang="en-US" dirty="0" smtClean="0"/>
+              <a:t>Especially for time – </a:t>
+            </a:r>
+            <a:r>
+              <a:rPr lang="en-US" dirty="0" err="1" smtClean="0"/>
+              <a:t>debounce</a:t>
+            </a:r>
+            <a:r>
+              <a:rPr lang="en-US" dirty="0" smtClean="0"/>
+              <a:t>, sample, throttle, etc.</a:t>
+            </a:r>
+          </a:p>
+        </p:txBody>
+      </p:sp>
+      <p:pic>
+        <p:nvPicPr>
+          <p:cNvPr id="10" name="Picture 9"/>
+          <p:cNvPicPr>
+            <a:picLocks noChangeAspect="1"/>
+          </p:cNvPicPr>
+          <p:nvPr/>
+        </p:nvPicPr>
+        <p:blipFill rotWithShape="1">
+          <a:blip r:embed="rId3"/>
+          <a:srcRect t="75315" r="6302"/>
+          <a:stretch/>
+        </p:blipFill>
+        <p:spPr>
+          <a:xfrm>
+            <a:off x="5838196" y="3741211"/>
+            <a:ext cx="5515604" cy="520163"/>
+          </a:xfrm>
+          <a:prstGeom prst="rect">
+            <a:avLst/>
+          </a:prstGeom>
+        </p:spPr>
+      </p:pic>
+      <p:pic>
+        <p:nvPicPr>
+          <p:cNvPr id="11" name="Picture 10"/>
+          <p:cNvPicPr>
+            <a:picLocks noChangeAspect="1"/>
+          </p:cNvPicPr>
+          <p:nvPr/>
+        </p:nvPicPr>
+        <p:blipFill>
+          <a:blip r:embed="rId4"/>
+          <a:stretch>
+            <a:fillRect/>
+          </a:stretch>
+        </p:blipFill>
+        <p:spPr>
+          <a:xfrm>
+            <a:off x="413466" y="3682893"/>
+            <a:ext cx="5125611" cy="578481"/>
+          </a:xfrm>
+          <a:prstGeom prst="rect">
+            <a:avLst/>
+          </a:prstGeom>
+        </p:spPr>
+      </p:pic>
+    </p:spTree>
+    <p:extLst>
+      <p:ext uri="{BB962C8B-B14F-4D97-AF65-F5344CB8AC3E}">
+        <p14:creationId xmlns:p14="http://schemas.microsoft.com/office/powerpoint/2010/main" val="4197146541"/>
+      </p:ext>
+    </p:extLst>
+  </p:cSld>
+  <p:clrMapOvr>
+    <a:masterClrMapping/>
+  </p:clrMapOvr>
+  <p:timing>
+    <p:tnLst>
+      <p:par>
+        <p:cTn id="1" dur="indefinite" restart="never" nodeType="tmRoot"/>
+      </p:par>
+    </p:tnLst>
+  </p:timing>
+</p:sld>
+</file>
+
+<file path=ppt/slides/slide5.xml><?xml version="1.0" encoding="utf-8"?>
+<p:sld xmlns:a="http://schemas.openxmlformats.org/drawingml/2006/main" xmlns:r="http://schemas.openxmlformats.org/officeDocument/2006/relationships" xmlns:p="http://schemas.openxmlformats.org/presentationml/2006/main">
+  <p:cSld>
+    <p:spTree>
+      <p:nvGrpSpPr>
+        <p:cNvPr id="1" name=""/>
+        <p:cNvGrpSpPr/>
+        <p:nvPr/>
+      </p:nvGrpSpPr>
+      <p:grpSpPr>
+        <a:xfrm>
+          <a:off x="0" y="0"/>
+          <a:ext cx="0" cy="0"/>
+          <a:chOff x="0" y="0"/>
+          <a:chExt cx="0" cy="0"/>
+        </a:xfrm>
+      </p:grpSpPr>
+      <p:grpSp>
+        <p:nvGrpSpPr>
+          <p:cNvPr id="14" name="Group 13"/>
+          <p:cNvGrpSpPr/>
+          <p:nvPr/>
+        </p:nvGrpSpPr>
+        <p:grpSpPr>
+          <a:xfrm>
+            <a:off x="294409" y="963933"/>
+            <a:ext cx="5896482" cy="5114702"/>
+            <a:chOff x="6161809" y="1427414"/>
+            <a:chExt cx="5896482" cy="5114702"/>
+          </a:xfrm>
+        </p:grpSpPr>
+        <p:pic>
+          <p:nvPicPr>
+            <p:cNvPr id="5" name="Picture 4"/>
+            <p:cNvPicPr>
+              <a:picLocks noChangeAspect="1"/>
+            </p:cNvPicPr>
+            <p:nvPr/>
+          </p:nvPicPr>
+          <p:blipFill>
+            <a:blip r:embed="rId2"/>
+            <a:stretch>
+              <a:fillRect/>
+            </a:stretch>
+          </p:blipFill>
+          <p:spPr>
+            <a:xfrm>
+              <a:off x="6161809" y="2787406"/>
+              <a:ext cx="5896482" cy="3754710"/>
+            </a:xfrm>
+            <a:prstGeom prst="rect">
+              <a:avLst/>
+            </a:prstGeom>
+          </p:spPr>
+        </p:pic>
+        <p:pic>
+          <p:nvPicPr>
+            <p:cNvPr id="6" name="Picture 5"/>
+            <p:cNvPicPr>
+              <a:picLocks noChangeAspect="1"/>
+            </p:cNvPicPr>
+            <p:nvPr/>
+          </p:nvPicPr>
+          <p:blipFill>
+            <a:blip r:embed="rId3"/>
+            <a:stretch>
+              <a:fillRect/>
+            </a:stretch>
+          </p:blipFill>
+          <p:spPr>
+            <a:xfrm>
+              <a:off x="6161809" y="1427414"/>
+              <a:ext cx="3858502" cy="1060448"/>
+            </a:xfrm>
+            <a:prstGeom prst="rect">
+              <a:avLst/>
+            </a:prstGeom>
+          </p:spPr>
+        </p:pic>
+      </p:grpSp>
+      <p:grpSp>
+        <p:nvGrpSpPr>
+          <p:cNvPr id="13" name="Group 12"/>
+          <p:cNvGrpSpPr/>
+          <p:nvPr/>
+        </p:nvGrpSpPr>
+        <p:grpSpPr>
+          <a:xfrm>
+            <a:off x="6353568" y="784387"/>
+            <a:ext cx="6299865" cy="5054556"/>
+            <a:chOff x="346468" y="1427414"/>
+            <a:chExt cx="6299865" cy="5054556"/>
+          </a:xfrm>
+        </p:grpSpPr>
+        <p:pic>
+          <p:nvPicPr>
+            <p:cNvPr id="7" name="Picture 6"/>
+            <p:cNvPicPr>
+              <a:picLocks noChangeAspect="1"/>
+            </p:cNvPicPr>
+            <p:nvPr/>
+          </p:nvPicPr>
+          <p:blipFill>
+            <a:blip r:embed="rId4"/>
+            <a:stretch>
+              <a:fillRect/>
+            </a:stretch>
+          </p:blipFill>
+          <p:spPr>
+            <a:xfrm>
+              <a:off x="354935" y="2249987"/>
+              <a:ext cx="5538741" cy="1390680"/>
+            </a:xfrm>
+            <a:prstGeom prst="rect">
+              <a:avLst/>
+            </a:prstGeom>
+          </p:spPr>
+        </p:pic>
+        <p:sp>
+          <p:nvSpPr>
+            <p:cNvPr id="10" name="Title 1"/>
+            <p:cNvSpPr txBox="1">
+              <a:spLocks/>
+            </p:cNvSpPr>
+            <p:nvPr/>
+          </p:nvSpPr>
+          <p:spPr>
+            <a:xfrm>
+              <a:off x="346468" y="1427414"/>
+              <a:ext cx="6291398" cy="1155489"/>
+            </a:xfrm>
+            <a:prstGeom prst="rect">
+              <a:avLst/>
+            </a:prstGeom>
+          </p:spPr>
+          <p:txBody>
+            <a:bodyPr vert="horz" lIns="91440" tIns="45720" rIns="91440" bIns="45720" rtlCol="0" anchor="ctr">
+              <a:normAutofit/>
+            </a:bodyPr>
+            <a:lstStyle>
+              <a:lvl1pPr algn="l" defTabSz="914400" rtl="0" eaLnBrk="1" latinLnBrk="0" hangingPunct="1">
+                <a:lnSpc>
+                  <a:spcPct val="90000"/>
+                </a:lnSpc>
+                <a:spcBef>
+                  <a:spcPct val="0"/>
+                </a:spcBef>
+                <a:buNone/>
+                <a:defRPr sz="4400" kern="1200">
+                  <a:solidFill>
+                    <a:schemeClr val="tx1"/>
+                  </a:solidFill>
+                  <a:latin typeface="+mj-lt"/>
+                  <a:ea typeface="+mj-ea"/>
+                  <a:cs typeface="+mj-cs"/>
+                </a:defRPr>
+              </a:lvl1pPr>
+            </a:lstStyle>
+            <a:p>
+              <a:r>
+                <a:rPr lang="en-US" sz="2400" dirty="0" smtClean="0"/>
+                <a:t>Events – nested calls</a:t>
+              </a:r>
+              <a:endParaRPr lang="en-US" sz="2400" dirty="0"/>
+            </a:p>
+          </p:txBody>
+        </p:sp>
+        <p:pic>
+          <p:nvPicPr>
+            <p:cNvPr id="12" name="Picture 11"/>
+            <p:cNvPicPr>
+              <a:picLocks noChangeAspect="1"/>
+            </p:cNvPicPr>
+            <p:nvPr/>
+          </p:nvPicPr>
+          <p:blipFill>
+            <a:blip r:embed="rId5"/>
+            <a:stretch>
+              <a:fillRect/>
+            </a:stretch>
+          </p:blipFill>
+          <p:spPr>
+            <a:xfrm>
+              <a:off x="346468" y="4463240"/>
+              <a:ext cx="5458938" cy="2018730"/>
+            </a:xfrm>
+            <a:prstGeom prst="rect">
+              <a:avLst/>
+            </a:prstGeom>
+          </p:spPr>
+        </p:pic>
+        <p:sp>
+          <p:nvSpPr>
+            <p:cNvPr id="11" name="Title 1"/>
+            <p:cNvSpPr txBox="1">
+              <a:spLocks/>
+            </p:cNvSpPr>
+            <p:nvPr/>
+          </p:nvSpPr>
+          <p:spPr>
+            <a:xfrm>
+              <a:off x="354935" y="3736410"/>
+              <a:ext cx="6291398" cy="1302563"/>
+            </a:xfrm>
+            <a:prstGeom prst="rect">
+              <a:avLst/>
+            </a:prstGeom>
+          </p:spPr>
+          <p:txBody>
+            <a:bodyPr vert="horz" lIns="91440" tIns="45720" rIns="91440" bIns="45720" rtlCol="0" anchor="ctr">
+              <a:normAutofit/>
+            </a:bodyPr>
+            <a:lstStyle>
+              <a:lvl1pPr algn="l" defTabSz="914400" rtl="0" eaLnBrk="1" latinLnBrk="0" hangingPunct="1">
+                <a:lnSpc>
+                  <a:spcPct val="90000"/>
+                </a:lnSpc>
+                <a:spcBef>
+                  <a:spcPct val="0"/>
+                </a:spcBef>
+                <a:buNone/>
+                <a:defRPr sz="4400" kern="1200">
+                  <a:solidFill>
+                    <a:schemeClr val="tx1"/>
+                  </a:solidFill>
+                  <a:latin typeface="+mj-lt"/>
+                  <a:ea typeface="+mj-ea"/>
+                  <a:cs typeface="+mj-cs"/>
+                </a:defRPr>
+              </a:lvl1pPr>
+            </a:lstStyle>
+            <a:p>
+              <a:r>
+                <a:rPr lang="en-US" sz="2400" dirty="0" smtClean="0"/>
+                <a:t>Observable – </a:t>
+              </a:r>
+              <a:r>
+                <a:rPr lang="en-US" sz="2400" b="1" i="1" dirty="0" smtClean="0"/>
+                <a:t>decouples</a:t>
+              </a:r>
+              <a:r>
+                <a:rPr lang="en-US" sz="2400" dirty="0" smtClean="0"/>
+                <a:t> the event’s </a:t>
+              </a:r>
+              <a:r>
+                <a:rPr lang="en-US" sz="2400" b="1" i="1" dirty="0" smtClean="0"/>
+                <a:t>source</a:t>
+              </a:r>
+            </a:p>
+            <a:p>
+              <a:r>
+                <a:rPr lang="en-US" sz="2400" dirty="0" smtClean="0"/>
+                <a:t>                                                   from its </a:t>
+              </a:r>
+              <a:r>
+                <a:rPr lang="en-US" sz="2400" b="1" i="1" dirty="0" smtClean="0"/>
+                <a:t>effects </a:t>
+              </a:r>
+              <a:endParaRPr lang="en-US" sz="2400" b="1" i="1" dirty="0"/>
+            </a:p>
+          </p:txBody>
+        </p:sp>
+      </p:grpSp>
     </p:spTree>
     <p:extLst>
       <p:ext uri="{BB962C8B-B14F-4D97-AF65-F5344CB8AC3E}">
         <p14:creationId xmlns:p14="http://schemas.microsoft.com/office/powerpoint/2010/main" val="190357252"/>
+      </p:ext>
+    </p:extLst>
+  </p:cSld>
+  <p:clrMapOvr>
+    <a:masterClrMapping/>
+  </p:clrMapOvr>
+  <p:timing>
+    <p:tnLst>
+      <p:par>
+        <p:cTn id="1" dur="indefinite" restart="never" nodeType="tmRoot"/>
+      </p:par>
+    </p:tnLst>
+  </p:timing>
+</p:sld>
+</file>
+
+<file path=ppt/slides/slide6.xml><?xml version="1.0" encoding="utf-8"?>
+<p:sld xmlns:a="http://schemas.openxmlformats.org/drawingml/2006/main" xmlns:r="http://schemas.openxmlformats.org/officeDocument/2006/relationships" xmlns:p="http://schemas.openxmlformats.org/presentationml/2006/main">
+  <p:cSld>
+    <p:spTree>
+      <p:nvGrpSpPr>
+        <p:cNvPr id="1" name=""/>
+        <p:cNvGrpSpPr/>
+        <p:nvPr/>
+      </p:nvGrpSpPr>
+      <p:grpSpPr>
+        <a:xfrm>
+          <a:off x="0" y="0"/>
+          <a:ext cx="0" cy="0"/>
+          <a:chOff x="0" y="0"/>
+          <a:chExt cx="0" cy="0"/>
+        </a:xfrm>
+      </p:grpSpPr>
+      <p:pic>
+        <p:nvPicPr>
+          <p:cNvPr id="4" name="Picture 3"/>
+          <p:cNvPicPr>
+            <a:picLocks noChangeAspect="1"/>
+          </p:cNvPicPr>
+          <p:nvPr/>
+        </p:nvPicPr>
+        <p:blipFill>
+          <a:blip r:embed="rId2"/>
+          <a:stretch>
+            <a:fillRect/>
+          </a:stretch>
+        </p:blipFill>
+        <p:spPr>
+          <a:xfrm>
+            <a:off x="7383992" y="365125"/>
+            <a:ext cx="2876550" cy="1228725"/>
+          </a:xfrm>
+          <a:prstGeom prst="rect">
+            <a:avLst/>
+          </a:prstGeom>
+        </p:spPr>
+      </p:pic>
+      <p:pic>
+        <p:nvPicPr>
+          <p:cNvPr id="5" name="Picture 4"/>
+          <p:cNvPicPr>
+            <a:picLocks noChangeAspect="1"/>
+          </p:cNvPicPr>
+          <p:nvPr/>
+        </p:nvPicPr>
+        <p:blipFill>
+          <a:blip r:embed="rId3"/>
+          <a:stretch>
+            <a:fillRect/>
+          </a:stretch>
+        </p:blipFill>
+        <p:spPr>
+          <a:xfrm>
+            <a:off x="459317" y="1936754"/>
+            <a:ext cx="4838700" cy="4762500"/>
+          </a:xfrm>
+          <a:prstGeom prst="rect">
+            <a:avLst/>
+          </a:prstGeom>
+        </p:spPr>
+      </p:pic>
+      <p:pic>
+        <p:nvPicPr>
+          <p:cNvPr id="6" name="Picture 5"/>
+          <p:cNvPicPr>
+            <a:picLocks noChangeAspect="1"/>
+          </p:cNvPicPr>
+          <p:nvPr/>
+        </p:nvPicPr>
+        <p:blipFill>
+          <a:blip r:embed="rId4"/>
+          <a:stretch>
+            <a:fillRect/>
+          </a:stretch>
+        </p:blipFill>
+        <p:spPr>
+          <a:xfrm>
+            <a:off x="6524624" y="3403600"/>
+            <a:ext cx="4676775" cy="3143250"/>
+          </a:xfrm>
+          <a:prstGeom prst="rect">
+            <a:avLst/>
+          </a:prstGeom>
+        </p:spPr>
+      </p:pic>
+      <p:sp>
+        <p:nvSpPr>
+          <p:cNvPr id="7" name="Title 1"/>
+          <p:cNvSpPr txBox="1">
+            <a:spLocks/>
+          </p:cNvSpPr>
+          <p:nvPr/>
+        </p:nvSpPr>
+        <p:spPr>
+          <a:xfrm>
+            <a:off x="385627" y="1235977"/>
+            <a:ext cx="6291398" cy="1155489"/>
+          </a:xfrm>
+          <a:prstGeom prst="rect">
+            <a:avLst/>
+          </a:prstGeom>
+        </p:spPr>
+        <p:txBody>
+          <a:bodyPr vert="horz" lIns="91440" tIns="45720" rIns="91440" bIns="45720" rtlCol="0" anchor="ctr">
+            <a:normAutofit/>
+          </a:bodyPr>
+          <a:lstStyle>
+            <a:lvl1pPr algn="l" defTabSz="914400" rtl="0" eaLnBrk="1" latinLnBrk="0" hangingPunct="1">
+              <a:lnSpc>
+                <a:spcPct val="90000"/>
+              </a:lnSpc>
+              <a:spcBef>
+                <a:spcPct val="0"/>
+              </a:spcBef>
+              <a:buNone/>
+              <a:defRPr sz="4400" kern="1200">
+                <a:solidFill>
+                  <a:schemeClr val="tx1"/>
+                </a:solidFill>
+                <a:latin typeface="+mj-lt"/>
+                <a:ea typeface="+mj-ea"/>
+                <a:cs typeface="+mj-cs"/>
+              </a:defRPr>
+            </a:lvl1pPr>
+          </a:lstStyle>
+          <a:p>
+            <a:r>
+              <a:rPr lang="en-US" sz="2400" dirty="0" smtClean="0"/>
+              <a:t>Events – nested calls</a:t>
+            </a:r>
+            <a:endParaRPr lang="en-US" sz="2400" dirty="0"/>
+          </a:p>
+        </p:txBody>
+      </p:sp>
+      <p:sp>
+        <p:nvSpPr>
+          <p:cNvPr id="8" name="Title 7"/>
+          <p:cNvSpPr>
+            <a:spLocks noGrp="1"/>
+          </p:cNvSpPr>
+          <p:nvPr>
+            <p:ph type="title"/>
+          </p:nvPr>
+        </p:nvSpPr>
+        <p:spPr/>
+        <p:txBody>
+          <a:bodyPr/>
+          <a:lstStyle/>
+          <a:p>
+            <a:r>
+              <a:rPr lang="en-US" dirty="0" smtClean="0"/>
+              <a:t>Just a smidge harder…</a:t>
+            </a:r>
+            <a:endParaRPr lang="en-US" dirty="0"/>
+          </a:p>
+        </p:txBody>
+      </p:sp>
+      <p:sp>
+        <p:nvSpPr>
+          <p:cNvPr id="9" name="Title 1"/>
+          <p:cNvSpPr txBox="1">
+            <a:spLocks/>
+          </p:cNvSpPr>
+          <p:nvPr/>
+        </p:nvSpPr>
+        <p:spPr>
+          <a:xfrm>
+            <a:off x="6222334" y="2445180"/>
+            <a:ext cx="6291398" cy="1302563"/>
+          </a:xfrm>
+          <a:prstGeom prst="rect">
+            <a:avLst/>
+          </a:prstGeom>
+        </p:spPr>
+        <p:txBody>
+          <a:bodyPr vert="horz" lIns="91440" tIns="45720" rIns="91440" bIns="45720" rtlCol="0" anchor="ctr">
+            <a:normAutofit/>
+          </a:bodyPr>
+          <a:lstStyle>
+            <a:lvl1pPr algn="l" defTabSz="914400" rtl="0" eaLnBrk="1" latinLnBrk="0" hangingPunct="1">
+              <a:lnSpc>
+                <a:spcPct val="90000"/>
+              </a:lnSpc>
+              <a:spcBef>
+                <a:spcPct val="0"/>
+              </a:spcBef>
+              <a:buNone/>
+              <a:defRPr sz="4400" kern="1200">
+                <a:solidFill>
+                  <a:schemeClr val="tx1"/>
+                </a:solidFill>
+                <a:latin typeface="+mj-lt"/>
+                <a:ea typeface="+mj-ea"/>
+                <a:cs typeface="+mj-cs"/>
+              </a:defRPr>
+            </a:lvl1pPr>
+          </a:lstStyle>
+          <a:p>
+            <a:r>
+              <a:rPr lang="en-US" sz="2400" dirty="0" smtClean="0"/>
+              <a:t>Observable – </a:t>
+            </a:r>
+            <a:r>
+              <a:rPr lang="en-US" sz="2400" b="1" i="1" dirty="0" smtClean="0"/>
+              <a:t>decouples</a:t>
+            </a:r>
+            <a:r>
+              <a:rPr lang="en-US" sz="2400" dirty="0" smtClean="0"/>
+              <a:t> the event’s </a:t>
+            </a:r>
+            <a:r>
+              <a:rPr lang="en-US" sz="2400" b="1" i="1" dirty="0" smtClean="0"/>
+              <a:t>source</a:t>
+            </a:r>
+          </a:p>
+          <a:p>
+            <a:r>
+              <a:rPr lang="en-US" sz="2400" dirty="0" smtClean="0"/>
+              <a:t>                                                   from its </a:t>
+            </a:r>
+            <a:r>
+              <a:rPr lang="en-US" sz="2400" b="1" i="1" dirty="0" smtClean="0"/>
+              <a:t>effects </a:t>
+            </a:r>
+            <a:endParaRPr lang="en-US" sz="2400" b="1" i="1" dirty="0"/>
+          </a:p>
+        </p:txBody>
+      </p:sp>
+    </p:spTree>
+    <p:extLst>
+      <p:ext uri="{BB962C8B-B14F-4D97-AF65-F5344CB8AC3E}">
+        <p14:creationId xmlns:p14="http://schemas.microsoft.com/office/powerpoint/2010/main" val="3341701171"/>
+      </p:ext>
+    </p:extLst>
+  </p:cSld>
+  <p:clrMapOvr>
+    <a:masterClrMapping/>
+  </p:clrMapOvr>
+  <p:timing>
+    <p:tnLst>
+      <p:par>
+        <p:cTn id="1" dur="indefinite" restart="never" nodeType="tmRoot"/>
+      </p:par>
+    </p:tnLst>
+  </p:timing>
+</p:sld>
+</file>
+
+<file path=ppt/slides/slide7.xml><?xml version="1.0" encoding="utf-8"?>
+<p:sld xmlns:a="http://schemas.openxmlformats.org/drawingml/2006/main" xmlns:r="http://schemas.openxmlformats.org/officeDocument/2006/relationships" xmlns:p="http://schemas.openxmlformats.org/presentationml/2006/main">
+  <p:cSld>
+    <p:spTree>
+      <p:nvGrpSpPr>
+        <p:cNvPr id="1" name=""/>
+        <p:cNvGrpSpPr/>
+        <p:nvPr/>
+      </p:nvGrpSpPr>
+      <p:grpSpPr>
+        <a:xfrm>
+          <a:off x="0" y="0"/>
+          <a:ext cx="0" cy="0"/>
+          <a:chOff x="0" y="0"/>
+          <a:chExt cx="0" cy="0"/>
+        </a:xfrm>
+      </p:grpSpPr>
+      <p:sp>
+        <p:nvSpPr>
+          <p:cNvPr id="2" name="Title 1"/>
+          <p:cNvSpPr>
+            <a:spLocks noGrp="1"/>
+          </p:cNvSpPr>
+          <p:nvPr>
+            <p:ph type="title"/>
+          </p:nvPr>
+        </p:nvSpPr>
+        <p:spPr/>
+        <p:txBody>
+          <a:bodyPr/>
+          <a:lstStyle/>
+          <a:p>
+            <a:r>
+              <a:rPr lang="en-US" dirty="0" smtClean="0"/>
+              <a:t>Still to come, pending time from dry runs</a:t>
+            </a:r>
+            <a:endParaRPr lang="en-US" dirty="0"/>
+          </a:p>
+        </p:txBody>
+      </p:sp>
+      <p:sp>
+        <p:nvSpPr>
+          <p:cNvPr id="3" name="Content Placeholder 2"/>
+          <p:cNvSpPr>
+            <a:spLocks noGrp="1"/>
+          </p:cNvSpPr>
+          <p:nvPr>
+            <p:ph idx="1"/>
+          </p:nvPr>
+        </p:nvSpPr>
+        <p:spPr/>
+        <p:txBody>
+          <a:bodyPr/>
+          <a:lstStyle/>
+          <a:p>
+            <a:r>
+              <a:rPr lang="en-US" dirty="0" smtClean="0"/>
+              <a:t>Error handling</a:t>
+            </a:r>
+          </a:p>
+          <a:p>
+            <a:pPr lvl="1"/>
+            <a:r>
+              <a:rPr lang="en-US" dirty="0" smtClean="0"/>
+              <a:t>Either&lt;Value, Exception&gt; vs handling them directly</a:t>
+            </a:r>
+          </a:p>
+          <a:p>
+            <a:r>
+              <a:rPr lang="en-US" dirty="0" smtClean="0"/>
+              <a:t>Non-SWT thread issues (stock picker example)</a:t>
+            </a:r>
+          </a:p>
+          <a:p>
+            <a:pPr lvl="1"/>
+            <a:r>
+              <a:rPr lang="en-US" dirty="0" err="1" smtClean="0"/>
+              <a:t>SwtExec.async</a:t>
+            </a:r>
+            <a:r>
+              <a:rPr lang="en-US" dirty="0" smtClean="0"/>
+              <a:t>().</a:t>
+            </a:r>
+            <a:r>
+              <a:rPr lang="en-US" dirty="0" err="1" smtClean="0"/>
+              <a:t>guardOn</a:t>
+            </a:r>
+            <a:r>
+              <a:rPr lang="en-US" dirty="0" smtClean="0"/>
+              <a:t>(widget).</a:t>
+            </a:r>
+            <a:r>
+              <a:rPr lang="en-US" dirty="0" err="1" smtClean="0"/>
+              <a:t>subscribeTo</a:t>
+            </a:r>
+            <a:r>
+              <a:rPr lang="en-US" dirty="0" smtClean="0"/>
+              <a:t>(</a:t>
+            </a:r>
+            <a:r>
+              <a:rPr lang="en-US" dirty="0" err="1" smtClean="0"/>
+              <a:t>rxValue</a:t>
+            </a:r>
+            <a:r>
+              <a:rPr lang="en-US" dirty="0" smtClean="0"/>
+              <a:t>, action);</a:t>
+            </a:r>
+          </a:p>
+          <a:p>
+            <a:r>
+              <a:rPr lang="en-US" dirty="0" smtClean="0"/>
+              <a:t>Tour-de-force colored stock picker example</a:t>
+            </a:r>
+          </a:p>
+          <a:p>
+            <a:pPr lvl="1"/>
+            <a:endParaRPr lang="en-US" dirty="0" smtClean="0"/>
+          </a:p>
+        </p:txBody>
+      </p:sp>
+      <p:pic>
+        <p:nvPicPr>
+          <p:cNvPr id="4" name="Picture 3"/>
+          <p:cNvPicPr>
+            <a:picLocks noChangeAspect="1"/>
+          </p:cNvPicPr>
+          <p:nvPr/>
+        </p:nvPicPr>
+        <p:blipFill>
+          <a:blip r:embed="rId2"/>
+          <a:stretch>
+            <a:fillRect/>
+          </a:stretch>
+        </p:blipFill>
+        <p:spPr>
+          <a:xfrm>
+            <a:off x="1954212" y="4029075"/>
+            <a:ext cx="2390775" cy="2828925"/>
+          </a:xfrm>
+          <a:prstGeom prst="rect">
+            <a:avLst/>
+          </a:prstGeom>
+        </p:spPr>
+      </p:pic>
+    </p:spTree>
+    <p:extLst>
+      <p:ext uri="{BB962C8B-B14F-4D97-AF65-F5344CB8AC3E}">
+        <p14:creationId xmlns:p14="http://schemas.microsoft.com/office/powerpoint/2010/main" val="4034754423"/>
       </p:ext>
     </p:extLst>
   </p:cSld>

</xml_diff>

<commit_message>
Updated presentation with evaluation slide.
</commit_message>
<xml_diff>
--- a/RxJava and SWT.pptx
+++ b/RxJava and SWT.pptx
@@ -3,15 +3,17 @@
 <p:presentation xmlns:a="http://schemas.openxmlformats.org/drawingml/2006/main" xmlns:r="http://schemas.openxmlformats.org/officeDocument/2006/relationships" xmlns:p="http://schemas.openxmlformats.org/presentationml/2006/main" saveSubsetFonts="1">
   <p:sldMasterIdLst>
     <p:sldMasterId id="2147483648" r:id="rId1"/>
+    <p:sldMasterId id="2147483660" r:id="rId2"/>
   </p:sldMasterIdLst>
   <p:sldIdLst>
-    <p:sldId id="256" r:id="rId2"/>
-    <p:sldId id="259" r:id="rId3"/>
-    <p:sldId id="260" r:id="rId4"/>
-    <p:sldId id="258" r:id="rId5"/>
-    <p:sldId id="257" r:id="rId6"/>
-    <p:sldId id="261" r:id="rId7"/>
-    <p:sldId id="262" r:id="rId8"/>
+    <p:sldId id="256" r:id="rId3"/>
+    <p:sldId id="259" r:id="rId4"/>
+    <p:sldId id="260" r:id="rId5"/>
+    <p:sldId id="258" r:id="rId6"/>
+    <p:sldId id="257" r:id="rId7"/>
+    <p:sldId id="261" r:id="rId8"/>
+    <p:sldId id="262" r:id="rId9"/>
+    <p:sldId id="263" r:id="rId10"/>
   </p:sldIdLst>
   <p:sldSz cx="12192000" cy="6858000"/>
   <p:notesSz cx="6858000" cy="9144000"/>
@@ -249,7 +251,7 @@
           <a:p>
             <a:fld id="{B8966210-D7C8-4A1C-B59E-033C29288170}" type="datetimeFigureOut">
               <a:rPr lang="en-US" smtClean="0"/>
-              <a:t>11/22/2015</a:t>
+              <a:t>3/1/2016</a:t>
             </a:fld>
             <a:endParaRPr lang="en-US"/>
           </a:p>
@@ -419,7 +421,7 @@
           <a:p>
             <a:fld id="{B8966210-D7C8-4A1C-B59E-033C29288170}" type="datetimeFigureOut">
               <a:rPr lang="en-US" smtClean="0"/>
-              <a:t>11/22/2015</a:t>
+              <a:t>3/1/2016</a:t>
             </a:fld>
             <a:endParaRPr lang="en-US"/>
           </a:p>
@@ -599,7 +601,7 @@
           <a:p>
             <a:fld id="{B8966210-D7C8-4A1C-B59E-033C29288170}" type="datetimeFigureOut">
               <a:rPr lang="en-US" smtClean="0"/>
-              <a:t>11/22/2015</a:t>
+              <a:t>3/1/2016</a:t>
             </a:fld>
             <a:endParaRPr lang="en-US"/>
           </a:p>
@@ -651,6 +653,2125 @@
     <p:extLst>
       <p:ext uri="{BB962C8B-B14F-4D97-AF65-F5344CB8AC3E}">
         <p14:creationId xmlns:p14="http://schemas.microsoft.com/office/powerpoint/2010/main" val="2941773549"/>
+      </p:ext>
+    </p:extLst>
+  </p:cSld>
+  <p:clrMapOvr>
+    <a:masterClrMapping/>
+  </p:clrMapOvr>
+</p:sldLayout>
+</file>
+
+<file path=ppt/slideLayouts/slideLayout12.xml><?xml version="1.0" encoding="utf-8"?>
+<p:sldLayout xmlns:a="http://schemas.openxmlformats.org/drawingml/2006/main" xmlns:r="http://schemas.openxmlformats.org/officeDocument/2006/relationships" xmlns:p="http://schemas.openxmlformats.org/presentationml/2006/main" type="title" preserve="1">
+  <p:cSld name="Title Slide">
+    <p:spTree>
+      <p:nvGrpSpPr>
+        <p:cNvPr id="1" name=""/>
+        <p:cNvGrpSpPr/>
+        <p:nvPr/>
+      </p:nvGrpSpPr>
+      <p:grpSpPr>
+        <a:xfrm>
+          <a:off x="0" y="0"/>
+          <a:ext cx="0" cy="0"/>
+          <a:chOff x="0" y="0"/>
+          <a:chExt cx="0" cy="0"/>
+        </a:xfrm>
+      </p:grpSpPr>
+      <p:sp>
+        <p:nvSpPr>
+          <p:cNvPr id="2" name="Title 1"/>
+          <p:cNvSpPr>
+            <a:spLocks noGrp="1"/>
+          </p:cNvSpPr>
+          <p:nvPr>
+            <p:ph type="ctrTitle"/>
+          </p:nvPr>
+        </p:nvSpPr>
+        <p:spPr>
+          <a:xfrm>
+            <a:off x="914400" y="2130426"/>
+            <a:ext cx="10363200" cy="1470025"/>
+          </a:xfrm>
+        </p:spPr>
+        <p:txBody>
+          <a:bodyPr/>
+          <a:lstStyle/>
+          <a:p>
+            <a:r>
+              <a:rPr lang="en-US" smtClean="0"/>
+              <a:t>Click to edit Master title style</a:t>
+            </a:r>
+            <a:endParaRPr lang="en-US"/>
+          </a:p>
+        </p:txBody>
+      </p:sp>
+      <p:sp>
+        <p:nvSpPr>
+          <p:cNvPr id="3" name="Subtitle 2"/>
+          <p:cNvSpPr>
+            <a:spLocks noGrp="1"/>
+          </p:cNvSpPr>
+          <p:nvPr>
+            <p:ph type="subTitle" idx="1"/>
+          </p:nvPr>
+        </p:nvSpPr>
+        <p:spPr>
+          <a:xfrm>
+            <a:off x="1828800" y="3886200"/>
+            <a:ext cx="8534400" cy="1752600"/>
+          </a:xfrm>
+        </p:spPr>
+        <p:txBody>
+          <a:bodyPr/>
+          <a:lstStyle>
+            <a:lvl1pPr marL="0" indent="0" algn="ctr">
+              <a:buNone/>
+              <a:defRPr>
+                <a:solidFill>
+                  <a:schemeClr val="tx1">
+                    <a:tint val="75000"/>
+                  </a:schemeClr>
+                </a:solidFill>
+              </a:defRPr>
+            </a:lvl1pPr>
+            <a:lvl2pPr marL="609585" indent="0" algn="ctr">
+              <a:buNone/>
+              <a:defRPr>
+                <a:solidFill>
+                  <a:schemeClr val="tx1">
+                    <a:tint val="75000"/>
+                  </a:schemeClr>
+                </a:solidFill>
+              </a:defRPr>
+            </a:lvl2pPr>
+            <a:lvl3pPr marL="1219170" indent="0" algn="ctr">
+              <a:buNone/>
+              <a:defRPr>
+                <a:solidFill>
+                  <a:schemeClr val="tx1">
+                    <a:tint val="75000"/>
+                  </a:schemeClr>
+                </a:solidFill>
+              </a:defRPr>
+            </a:lvl3pPr>
+            <a:lvl4pPr marL="1828754" indent="0" algn="ctr">
+              <a:buNone/>
+              <a:defRPr>
+                <a:solidFill>
+                  <a:schemeClr val="tx1">
+                    <a:tint val="75000"/>
+                  </a:schemeClr>
+                </a:solidFill>
+              </a:defRPr>
+            </a:lvl4pPr>
+            <a:lvl5pPr marL="2438339" indent="0" algn="ctr">
+              <a:buNone/>
+              <a:defRPr>
+                <a:solidFill>
+                  <a:schemeClr val="tx1">
+                    <a:tint val="75000"/>
+                  </a:schemeClr>
+                </a:solidFill>
+              </a:defRPr>
+            </a:lvl5pPr>
+            <a:lvl6pPr marL="3047924" indent="0" algn="ctr">
+              <a:buNone/>
+              <a:defRPr>
+                <a:solidFill>
+                  <a:schemeClr val="tx1">
+                    <a:tint val="75000"/>
+                  </a:schemeClr>
+                </a:solidFill>
+              </a:defRPr>
+            </a:lvl6pPr>
+            <a:lvl7pPr marL="3657509" indent="0" algn="ctr">
+              <a:buNone/>
+              <a:defRPr>
+                <a:solidFill>
+                  <a:schemeClr val="tx1">
+                    <a:tint val="75000"/>
+                  </a:schemeClr>
+                </a:solidFill>
+              </a:defRPr>
+            </a:lvl7pPr>
+            <a:lvl8pPr marL="4267093" indent="0" algn="ctr">
+              <a:buNone/>
+              <a:defRPr>
+                <a:solidFill>
+                  <a:schemeClr val="tx1">
+                    <a:tint val="75000"/>
+                  </a:schemeClr>
+                </a:solidFill>
+              </a:defRPr>
+            </a:lvl8pPr>
+            <a:lvl9pPr marL="4876678" indent="0" algn="ctr">
+              <a:buNone/>
+              <a:defRPr>
+                <a:solidFill>
+                  <a:schemeClr val="tx1">
+                    <a:tint val="75000"/>
+                  </a:schemeClr>
+                </a:solidFill>
+              </a:defRPr>
+            </a:lvl9pPr>
+          </a:lstStyle>
+          <a:p>
+            <a:r>
+              <a:rPr lang="en-US" smtClean="0"/>
+              <a:t>Click to edit Master subtitle style</a:t>
+            </a:r>
+            <a:endParaRPr lang="en-US"/>
+          </a:p>
+        </p:txBody>
+      </p:sp>
+      <p:sp>
+        <p:nvSpPr>
+          <p:cNvPr id="4" name="Date Placeholder 3"/>
+          <p:cNvSpPr>
+            <a:spLocks noGrp="1"/>
+          </p:cNvSpPr>
+          <p:nvPr>
+            <p:ph type="dt" sz="half" idx="10"/>
+          </p:nvPr>
+        </p:nvSpPr>
+        <p:spPr/>
+        <p:txBody>
+          <a:bodyPr/>
+          <a:lstStyle/>
+          <a:p>
+            <a:fld id="{F642DA6E-6CD9-7C41-9FD8-01D28C61CAEF}" type="datetimeFigureOut">
+              <a:rPr lang="en-US" smtClean="0">
+                <a:solidFill>
+                  <a:prstClr val="black">
+                    <a:tint val="75000"/>
+                  </a:prstClr>
+                </a:solidFill>
+              </a:rPr>
+              <a:pPr/>
+              <a:t>3/1/2016</a:t>
+            </a:fld>
+            <a:endParaRPr lang="en-US">
+              <a:solidFill>
+                <a:prstClr val="black">
+                  <a:tint val="75000"/>
+                </a:prstClr>
+              </a:solidFill>
+            </a:endParaRPr>
+          </a:p>
+        </p:txBody>
+      </p:sp>
+      <p:sp>
+        <p:nvSpPr>
+          <p:cNvPr id="5" name="Footer Placeholder 4"/>
+          <p:cNvSpPr>
+            <a:spLocks noGrp="1"/>
+          </p:cNvSpPr>
+          <p:nvPr>
+            <p:ph type="ftr" sz="quarter" idx="11"/>
+          </p:nvPr>
+        </p:nvSpPr>
+        <p:spPr/>
+        <p:txBody>
+          <a:bodyPr/>
+          <a:lstStyle/>
+          <a:p>
+            <a:endParaRPr lang="en-US">
+              <a:solidFill>
+                <a:prstClr val="black">
+                  <a:tint val="75000"/>
+                </a:prstClr>
+              </a:solidFill>
+            </a:endParaRPr>
+          </a:p>
+        </p:txBody>
+      </p:sp>
+      <p:sp>
+        <p:nvSpPr>
+          <p:cNvPr id="6" name="Slide Number Placeholder 5"/>
+          <p:cNvSpPr>
+            <a:spLocks noGrp="1"/>
+          </p:cNvSpPr>
+          <p:nvPr>
+            <p:ph type="sldNum" sz="quarter" idx="12"/>
+          </p:nvPr>
+        </p:nvSpPr>
+        <p:spPr/>
+        <p:txBody>
+          <a:bodyPr/>
+          <a:lstStyle/>
+          <a:p>
+            <a:fld id="{CE3CCD67-A99C-7B4C-9065-78DD3F082118}" type="slidenum">
+              <a:rPr lang="en-US" smtClean="0">
+                <a:solidFill>
+                  <a:prstClr val="black">
+                    <a:tint val="75000"/>
+                  </a:prstClr>
+                </a:solidFill>
+              </a:rPr>
+              <a:pPr/>
+              <a:t>‹#›</a:t>
+            </a:fld>
+            <a:endParaRPr lang="en-US">
+              <a:solidFill>
+                <a:prstClr val="black">
+                  <a:tint val="75000"/>
+                </a:prstClr>
+              </a:solidFill>
+            </a:endParaRPr>
+          </a:p>
+        </p:txBody>
+      </p:sp>
+    </p:spTree>
+    <p:extLst>
+      <p:ext uri="{BB962C8B-B14F-4D97-AF65-F5344CB8AC3E}">
+        <p14:creationId xmlns:p14="http://schemas.microsoft.com/office/powerpoint/2010/main" val="3395938659"/>
+      </p:ext>
+    </p:extLst>
+  </p:cSld>
+  <p:clrMapOvr>
+    <a:masterClrMapping/>
+  </p:clrMapOvr>
+</p:sldLayout>
+</file>
+
+<file path=ppt/slideLayouts/slideLayout13.xml><?xml version="1.0" encoding="utf-8"?>
+<p:sldLayout xmlns:a="http://schemas.openxmlformats.org/drawingml/2006/main" xmlns:r="http://schemas.openxmlformats.org/officeDocument/2006/relationships" xmlns:p="http://schemas.openxmlformats.org/presentationml/2006/main" type="obj" preserve="1">
+  <p:cSld name="Title and Content">
+    <p:spTree>
+      <p:nvGrpSpPr>
+        <p:cNvPr id="1" name=""/>
+        <p:cNvGrpSpPr/>
+        <p:nvPr/>
+      </p:nvGrpSpPr>
+      <p:grpSpPr>
+        <a:xfrm>
+          <a:off x="0" y="0"/>
+          <a:ext cx="0" cy="0"/>
+          <a:chOff x="0" y="0"/>
+          <a:chExt cx="0" cy="0"/>
+        </a:xfrm>
+      </p:grpSpPr>
+      <p:sp>
+        <p:nvSpPr>
+          <p:cNvPr id="2" name="Title 1"/>
+          <p:cNvSpPr>
+            <a:spLocks noGrp="1"/>
+          </p:cNvSpPr>
+          <p:nvPr>
+            <p:ph type="title"/>
+          </p:nvPr>
+        </p:nvSpPr>
+        <p:spPr/>
+        <p:txBody>
+          <a:bodyPr/>
+          <a:lstStyle/>
+          <a:p>
+            <a:r>
+              <a:rPr lang="en-US" smtClean="0"/>
+              <a:t>Click to edit Master title style</a:t>
+            </a:r>
+            <a:endParaRPr lang="en-US"/>
+          </a:p>
+        </p:txBody>
+      </p:sp>
+      <p:sp>
+        <p:nvSpPr>
+          <p:cNvPr id="3" name="Content Placeholder 2"/>
+          <p:cNvSpPr>
+            <a:spLocks noGrp="1"/>
+          </p:cNvSpPr>
+          <p:nvPr>
+            <p:ph idx="1"/>
+          </p:nvPr>
+        </p:nvSpPr>
+        <p:spPr/>
+        <p:txBody>
+          <a:bodyPr/>
+          <a:lstStyle/>
+          <a:p>
+            <a:pPr lvl="0"/>
+            <a:r>
+              <a:rPr lang="en-US" smtClean="0"/>
+              <a:t>Click to edit Master text styles</a:t>
+            </a:r>
+          </a:p>
+          <a:p>
+            <a:pPr lvl="1"/>
+            <a:r>
+              <a:rPr lang="en-US" smtClean="0"/>
+              <a:t>Second level</a:t>
+            </a:r>
+          </a:p>
+          <a:p>
+            <a:pPr lvl="2"/>
+            <a:r>
+              <a:rPr lang="en-US" smtClean="0"/>
+              <a:t>Third level</a:t>
+            </a:r>
+          </a:p>
+          <a:p>
+            <a:pPr lvl="3"/>
+            <a:r>
+              <a:rPr lang="en-US" smtClean="0"/>
+              <a:t>Fourth level</a:t>
+            </a:r>
+          </a:p>
+          <a:p>
+            <a:pPr lvl="4"/>
+            <a:r>
+              <a:rPr lang="en-US" smtClean="0"/>
+              <a:t>Fifth level</a:t>
+            </a:r>
+            <a:endParaRPr lang="en-US"/>
+          </a:p>
+        </p:txBody>
+      </p:sp>
+      <p:sp>
+        <p:nvSpPr>
+          <p:cNvPr id="4" name="Date Placeholder 3"/>
+          <p:cNvSpPr>
+            <a:spLocks noGrp="1"/>
+          </p:cNvSpPr>
+          <p:nvPr>
+            <p:ph type="dt" sz="half" idx="10"/>
+          </p:nvPr>
+        </p:nvSpPr>
+        <p:spPr/>
+        <p:txBody>
+          <a:bodyPr/>
+          <a:lstStyle/>
+          <a:p>
+            <a:fld id="{F642DA6E-6CD9-7C41-9FD8-01D28C61CAEF}" type="datetimeFigureOut">
+              <a:rPr lang="en-US" smtClean="0">
+                <a:solidFill>
+                  <a:prstClr val="black">
+                    <a:tint val="75000"/>
+                  </a:prstClr>
+                </a:solidFill>
+              </a:rPr>
+              <a:pPr/>
+              <a:t>3/1/2016</a:t>
+            </a:fld>
+            <a:endParaRPr lang="en-US">
+              <a:solidFill>
+                <a:prstClr val="black">
+                  <a:tint val="75000"/>
+                </a:prstClr>
+              </a:solidFill>
+            </a:endParaRPr>
+          </a:p>
+        </p:txBody>
+      </p:sp>
+      <p:sp>
+        <p:nvSpPr>
+          <p:cNvPr id="5" name="Footer Placeholder 4"/>
+          <p:cNvSpPr>
+            <a:spLocks noGrp="1"/>
+          </p:cNvSpPr>
+          <p:nvPr>
+            <p:ph type="ftr" sz="quarter" idx="11"/>
+          </p:nvPr>
+        </p:nvSpPr>
+        <p:spPr/>
+        <p:txBody>
+          <a:bodyPr/>
+          <a:lstStyle/>
+          <a:p>
+            <a:endParaRPr lang="en-US">
+              <a:solidFill>
+                <a:prstClr val="black">
+                  <a:tint val="75000"/>
+                </a:prstClr>
+              </a:solidFill>
+            </a:endParaRPr>
+          </a:p>
+        </p:txBody>
+      </p:sp>
+      <p:sp>
+        <p:nvSpPr>
+          <p:cNvPr id="6" name="Slide Number Placeholder 5"/>
+          <p:cNvSpPr>
+            <a:spLocks noGrp="1"/>
+          </p:cNvSpPr>
+          <p:nvPr>
+            <p:ph type="sldNum" sz="quarter" idx="12"/>
+          </p:nvPr>
+        </p:nvSpPr>
+        <p:spPr/>
+        <p:txBody>
+          <a:bodyPr/>
+          <a:lstStyle/>
+          <a:p>
+            <a:fld id="{CE3CCD67-A99C-7B4C-9065-78DD3F082118}" type="slidenum">
+              <a:rPr lang="en-US" smtClean="0">
+                <a:solidFill>
+                  <a:prstClr val="black">
+                    <a:tint val="75000"/>
+                  </a:prstClr>
+                </a:solidFill>
+              </a:rPr>
+              <a:pPr/>
+              <a:t>‹#›</a:t>
+            </a:fld>
+            <a:endParaRPr lang="en-US">
+              <a:solidFill>
+                <a:prstClr val="black">
+                  <a:tint val="75000"/>
+                </a:prstClr>
+              </a:solidFill>
+            </a:endParaRPr>
+          </a:p>
+        </p:txBody>
+      </p:sp>
+    </p:spTree>
+    <p:extLst>
+      <p:ext uri="{BB962C8B-B14F-4D97-AF65-F5344CB8AC3E}">
+        <p14:creationId xmlns:p14="http://schemas.microsoft.com/office/powerpoint/2010/main" val="2354691380"/>
+      </p:ext>
+    </p:extLst>
+  </p:cSld>
+  <p:clrMapOvr>
+    <a:masterClrMapping/>
+  </p:clrMapOvr>
+</p:sldLayout>
+</file>
+
+<file path=ppt/slideLayouts/slideLayout14.xml><?xml version="1.0" encoding="utf-8"?>
+<p:sldLayout xmlns:a="http://schemas.openxmlformats.org/drawingml/2006/main" xmlns:r="http://schemas.openxmlformats.org/officeDocument/2006/relationships" xmlns:p="http://schemas.openxmlformats.org/presentationml/2006/main" type="secHead" preserve="1">
+  <p:cSld name="Section Header">
+    <p:spTree>
+      <p:nvGrpSpPr>
+        <p:cNvPr id="1" name=""/>
+        <p:cNvGrpSpPr/>
+        <p:nvPr/>
+      </p:nvGrpSpPr>
+      <p:grpSpPr>
+        <a:xfrm>
+          <a:off x="0" y="0"/>
+          <a:ext cx="0" cy="0"/>
+          <a:chOff x="0" y="0"/>
+          <a:chExt cx="0" cy="0"/>
+        </a:xfrm>
+      </p:grpSpPr>
+      <p:sp>
+        <p:nvSpPr>
+          <p:cNvPr id="2" name="Title 1"/>
+          <p:cNvSpPr>
+            <a:spLocks noGrp="1"/>
+          </p:cNvSpPr>
+          <p:nvPr>
+            <p:ph type="title"/>
+          </p:nvPr>
+        </p:nvSpPr>
+        <p:spPr>
+          <a:xfrm>
+            <a:off x="963084" y="4406901"/>
+            <a:ext cx="10363200" cy="1362075"/>
+          </a:xfrm>
+        </p:spPr>
+        <p:txBody>
+          <a:bodyPr anchor="t"/>
+          <a:lstStyle>
+            <a:lvl1pPr algn="l">
+              <a:defRPr sz="5333" b="1" cap="all"/>
+            </a:lvl1pPr>
+          </a:lstStyle>
+          <a:p>
+            <a:r>
+              <a:rPr lang="en-US" smtClean="0"/>
+              <a:t>Click to edit Master title style</a:t>
+            </a:r>
+            <a:endParaRPr lang="en-US"/>
+          </a:p>
+        </p:txBody>
+      </p:sp>
+      <p:sp>
+        <p:nvSpPr>
+          <p:cNvPr id="3" name="Text Placeholder 2"/>
+          <p:cNvSpPr>
+            <a:spLocks noGrp="1"/>
+          </p:cNvSpPr>
+          <p:nvPr>
+            <p:ph type="body" idx="1"/>
+          </p:nvPr>
+        </p:nvSpPr>
+        <p:spPr>
+          <a:xfrm>
+            <a:off x="963084" y="2906713"/>
+            <a:ext cx="10363200" cy="1500187"/>
+          </a:xfrm>
+        </p:spPr>
+        <p:txBody>
+          <a:bodyPr anchor="b"/>
+          <a:lstStyle>
+            <a:lvl1pPr marL="0" indent="0">
+              <a:buNone/>
+              <a:defRPr sz="2667">
+                <a:solidFill>
+                  <a:schemeClr val="tx1">
+                    <a:tint val="75000"/>
+                  </a:schemeClr>
+                </a:solidFill>
+              </a:defRPr>
+            </a:lvl1pPr>
+            <a:lvl2pPr marL="609585" indent="0">
+              <a:buNone/>
+              <a:defRPr sz="2400">
+                <a:solidFill>
+                  <a:schemeClr val="tx1">
+                    <a:tint val="75000"/>
+                  </a:schemeClr>
+                </a:solidFill>
+              </a:defRPr>
+            </a:lvl2pPr>
+            <a:lvl3pPr marL="1219170" indent="0">
+              <a:buNone/>
+              <a:defRPr sz="2133">
+                <a:solidFill>
+                  <a:schemeClr val="tx1">
+                    <a:tint val="75000"/>
+                  </a:schemeClr>
+                </a:solidFill>
+              </a:defRPr>
+            </a:lvl3pPr>
+            <a:lvl4pPr marL="1828754" indent="0">
+              <a:buNone/>
+              <a:defRPr sz="1867">
+                <a:solidFill>
+                  <a:schemeClr val="tx1">
+                    <a:tint val="75000"/>
+                  </a:schemeClr>
+                </a:solidFill>
+              </a:defRPr>
+            </a:lvl4pPr>
+            <a:lvl5pPr marL="2438339" indent="0">
+              <a:buNone/>
+              <a:defRPr sz="1867">
+                <a:solidFill>
+                  <a:schemeClr val="tx1">
+                    <a:tint val="75000"/>
+                  </a:schemeClr>
+                </a:solidFill>
+              </a:defRPr>
+            </a:lvl5pPr>
+            <a:lvl6pPr marL="3047924" indent="0">
+              <a:buNone/>
+              <a:defRPr sz="1867">
+                <a:solidFill>
+                  <a:schemeClr val="tx1">
+                    <a:tint val="75000"/>
+                  </a:schemeClr>
+                </a:solidFill>
+              </a:defRPr>
+            </a:lvl6pPr>
+            <a:lvl7pPr marL="3657509" indent="0">
+              <a:buNone/>
+              <a:defRPr sz="1867">
+                <a:solidFill>
+                  <a:schemeClr val="tx1">
+                    <a:tint val="75000"/>
+                  </a:schemeClr>
+                </a:solidFill>
+              </a:defRPr>
+            </a:lvl7pPr>
+            <a:lvl8pPr marL="4267093" indent="0">
+              <a:buNone/>
+              <a:defRPr sz="1867">
+                <a:solidFill>
+                  <a:schemeClr val="tx1">
+                    <a:tint val="75000"/>
+                  </a:schemeClr>
+                </a:solidFill>
+              </a:defRPr>
+            </a:lvl8pPr>
+            <a:lvl9pPr marL="4876678" indent="0">
+              <a:buNone/>
+              <a:defRPr sz="1867">
+                <a:solidFill>
+                  <a:schemeClr val="tx1">
+                    <a:tint val="75000"/>
+                  </a:schemeClr>
+                </a:solidFill>
+              </a:defRPr>
+            </a:lvl9pPr>
+          </a:lstStyle>
+          <a:p>
+            <a:pPr lvl="0"/>
+            <a:r>
+              <a:rPr lang="en-US" smtClean="0"/>
+              <a:t>Click to edit Master text styles</a:t>
+            </a:r>
+          </a:p>
+        </p:txBody>
+      </p:sp>
+      <p:sp>
+        <p:nvSpPr>
+          <p:cNvPr id="4" name="Date Placeholder 3"/>
+          <p:cNvSpPr>
+            <a:spLocks noGrp="1"/>
+          </p:cNvSpPr>
+          <p:nvPr>
+            <p:ph type="dt" sz="half" idx="10"/>
+          </p:nvPr>
+        </p:nvSpPr>
+        <p:spPr/>
+        <p:txBody>
+          <a:bodyPr/>
+          <a:lstStyle/>
+          <a:p>
+            <a:fld id="{F642DA6E-6CD9-7C41-9FD8-01D28C61CAEF}" type="datetimeFigureOut">
+              <a:rPr lang="en-US" smtClean="0">
+                <a:solidFill>
+                  <a:prstClr val="black">
+                    <a:tint val="75000"/>
+                  </a:prstClr>
+                </a:solidFill>
+              </a:rPr>
+              <a:pPr/>
+              <a:t>3/1/2016</a:t>
+            </a:fld>
+            <a:endParaRPr lang="en-US">
+              <a:solidFill>
+                <a:prstClr val="black">
+                  <a:tint val="75000"/>
+                </a:prstClr>
+              </a:solidFill>
+            </a:endParaRPr>
+          </a:p>
+        </p:txBody>
+      </p:sp>
+      <p:sp>
+        <p:nvSpPr>
+          <p:cNvPr id="5" name="Footer Placeholder 4"/>
+          <p:cNvSpPr>
+            <a:spLocks noGrp="1"/>
+          </p:cNvSpPr>
+          <p:nvPr>
+            <p:ph type="ftr" sz="quarter" idx="11"/>
+          </p:nvPr>
+        </p:nvSpPr>
+        <p:spPr/>
+        <p:txBody>
+          <a:bodyPr/>
+          <a:lstStyle/>
+          <a:p>
+            <a:endParaRPr lang="en-US">
+              <a:solidFill>
+                <a:prstClr val="black">
+                  <a:tint val="75000"/>
+                </a:prstClr>
+              </a:solidFill>
+            </a:endParaRPr>
+          </a:p>
+        </p:txBody>
+      </p:sp>
+      <p:sp>
+        <p:nvSpPr>
+          <p:cNvPr id="6" name="Slide Number Placeholder 5"/>
+          <p:cNvSpPr>
+            <a:spLocks noGrp="1"/>
+          </p:cNvSpPr>
+          <p:nvPr>
+            <p:ph type="sldNum" sz="quarter" idx="12"/>
+          </p:nvPr>
+        </p:nvSpPr>
+        <p:spPr/>
+        <p:txBody>
+          <a:bodyPr/>
+          <a:lstStyle/>
+          <a:p>
+            <a:fld id="{CE3CCD67-A99C-7B4C-9065-78DD3F082118}" type="slidenum">
+              <a:rPr lang="en-US" smtClean="0">
+                <a:solidFill>
+                  <a:prstClr val="black">
+                    <a:tint val="75000"/>
+                  </a:prstClr>
+                </a:solidFill>
+              </a:rPr>
+              <a:pPr/>
+              <a:t>‹#›</a:t>
+            </a:fld>
+            <a:endParaRPr lang="en-US">
+              <a:solidFill>
+                <a:prstClr val="black">
+                  <a:tint val="75000"/>
+                </a:prstClr>
+              </a:solidFill>
+            </a:endParaRPr>
+          </a:p>
+        </p:txBody>
+      </p:sp>
+    </p:spTree>
+    <p:extLst>
+      <p:ext uri="{BB962C8B-B14F-4D97-AF65-F5344CB8AC3E}">
+        <p14:creationId xmlns:p14="http://schemas.microsoft.com/office/powerpoint/2010/main" val="3906545932"/>
+      </p:ext>
+    </p:extLst>
+  </p:cSld>
+  <p:clrMapOvr>
+    <a:masterClrMapping/>
+  </p:clrMapOvr>
+</p:sldLayout>
+</file>
+
+<file path=ppt/slideLayouts/slideLayout15.xml><?xml version="1.0" encoding="utf-8"?>
+<p:sldLayout xmlns:a="http://schemas.openxmlformats.org/drawingml/2006/main" xmlns:r="http://schemas.openxmlformats.org/officeDocument/2006/relationships" xmlns:p="http://schemas.openxmlformats.org/presentationml/2006/main" type="twoObj" preserve="1">
+  <p:cSld name="Two Content">
+    <p:spTree>
+      <p:nvGrpSpPr>
+        <p:cNvPr id="1" name=""/>
+        <p:cNvGrpSpPr/>
+        <p:nvPr/>
+      </p:nvGrpSpPr>
+      <p:grpSpPr>
+        <a:xfrm>
+          <a:off x="0" y="0"/>
+          <a:ext cx="0" cy="0"/>
+          <a:chOff x="0" y="0"/>
+          <a:chExt cx="0" cy="0"/>
+        </a:xfrm>
+      </p:grpSpPr>
+      <p:sp>
+        <p:nvSpPr>
+          <p:cNvPr id="2" name="Title 1"/>
+          <p:cNvSpPr>
+            <a:spLocks noGrp="1"/>
+          </p:cNvSpPr>
+          <p:nvPr>
+            <p:ph type="title"/>
+          </p:nvPr>
+        </p:nvSpPr>
+        <p:spPr/>
+        <p:txBody>
+          <a:bodyPr/>
+          <a:lstStyle/>
+          <a:p>
+            <a:r>
+              <a:rPr lang="en-US" smtClean="0"/>
+              <a:t>Click to edit Master title style</a:t>
+            </a:r>
+            <a:endParaRPr lang="en-US"/>
+          </a:p>
+        </p:txBody>
+      </p:sp>
+      <p:sp>
+        <p:nvSpPr>
+          <p:cNvPr id="3" name="Content Placeholder 2"/>
+          <p:cNvSpPr>
+            <a:spLocks noGrp="1"/>
+          </p:cNvSpPr>
+          <p:nvPr>
+            <p:ph sz="half" idx="1"/>
+          </p:nvPr>
+        </p:nvSpPr>
+        <p:spPr>
+          <a:xfrm>
+            <a:off x="609600" y="1200151"/>
+            <a:ext cx="5384800" cy="3394075"/>
+          </a:xfrm>
+        </p:spPr>
+        <p:txBody>
+          <a:bodyPr/>
+          <a:lstStyle>
+            <a:lvl1pPr>
+              <a:defRPr sz="3733"/>
+            </a:lvl1pPr>
+            <a:lvl2pPr>
+              <a:defRPr sz="3200"/>
+            </a:lvl2pPr>
+            <a:lvl3pPr>
+              <a:defRPr sz="2667"/>
+            </a:lvl3pPr>
+            <a:lvl4pPr>
+              <a:defRPr sz="2400"/>
+            </a:lvl4pPr>
+            <a:lvl5pPr>
+              <a:defRPr sz="2400"/>
+            </a:lvl5pPr>
+            <a:lvl6pPr>
+              <a:defRPr sz="2400"/>
+            </a:lvl6pPr>
+            <a:lvl7pPr>
+              <a:defRPr sz="2400"/>
+            </a:lvl7pPr>
+            <a:lvl8pPr>
+              <a:defRPr sz="2400"/>
+            </a:lvl8pPr>
+            <a:lvl9pPr>
+              <a:defRPr sz="2400"/>
+            </a:lvl9pPr>
+          </a:lstStyle>
+          <a:p>
+            <a:pPr lvl="0"/>
+            <a:r>
+              <a:rPr lang="en-US" smtClean="0"/>
+              <a:t>Click to edit Master text styles</a:t>
+            </a:r>
+          </a:p>
+          <a:p>
+            <a:pPr lvl="1"/>
+            <a:r>
+              <a:rPr lang="en-US" smtClean="0"/>
+              <a:t>Second level</a:t>
+            </a:r>
+          </a:p>
+          <a:p>
+            <a:pPr lvl="2"/>
+            <a:r>
+              <a:rPr lang="en-US" smtClean="0"/>
+              <a:t>Third level</a:t>
+            </a:r>
+          </a:p>
+          <a:p>
+            <a:pPr lvl="3"/>
+            <a:r>
+              <a:rPr lang="en-US" smtClean="0"/>
+              <a:t>Fourth level</a:t>
+            </a:r>
+          </a:p>
+          <a:p>
+            <a:pPr lvl="4"/>
+            <a:r>
+              <a:rPr lang="en-US" smtClean="0"/>
+              <a:t>Fifth level</a:t>
+            </a:r>
+            <a:endParaRPr lang="en-US"/>
+          </a:p>
+        </p:txBody>
+      </p:sp>
+      <p:sp>
+        <p:nvSpPr>
+          <p:cNvPr id="4" name="Content Placeholder 3"/>
+          <p:cNvSpPr>
+            <a:spLocks noGrp="1"/>
+          </p:cNvSpPr>
+          <p:nvPr>
+            <p:ph sz="half" idx="2"/>
+          </p:nvPr>
+        </p:nvSpPr>
+        <p:spPr>
+          <a:xfrm>
+            <a:off x="6197600" y="1200151"/>
+            <a:ext cx="5384800" cy="3394075"/>
+          </a:xfrm>
+        </p:spPr>
+        <p:txBody>
+          <a:bodyPr/>
+          <a:lstStyle>
+            <a:lvl1pPr>
+              <a:defRPr sz="3733"/>
+            </a:lvl1pPr>
+            <a:lvl2pPr>
+              <a:defRPr sz="3200"/>
+            </a:lvl2pPr>
+            <a:lvl3pPr>
+              <a:defRPr sz="2667"/>
+            </a:lvl3pPr>
+            <a:lvl4pPr>
+              <a:defRPr sz="2400"/>
+            </a:lvl4pPr>
+            <a:lvl5pPr>
+              <a:defRPr sz="2400"/>
+            </a:lvl5pPr>
+            <a:lvl6pPr>
+              <a:defRPr sz="2400"/>
+            </a:lvl6pPr>
+            <a:lvl7pPr>
+              <a:defRPr sz="2400"/>
+            </a:lvl7pPr>
+            <a:lvl8pPr>
+              <a:defRPr sz="2400"/>
+            </a:lvl8pPr>
+            <a:lvl9pPr>
+              <a:defRPr sz="2400"/>
+            </a:lvl9pPr>
+          </a:lstStyle>
+          <a:p>
+            <a:pPr lvl="0"/>
+            <a:r>
+              <a:rPr lang="en-US" smtClean="0"/>
+              <a:t>Click to edit Master text styles</a:t>
+            </a:r>
+          </a:p>
+          <a:p>
+            <a:pPr lvl="1"/>
+            <a:r>
+              <a:rPr lang="en-US" smtClean="0"/>
+              <a:t>Second level</a:t>
+            </a:r>
+          </a:p>
+          <a:p>
+            <a:pPr lvl="2"/>
+            <a:r>
+              <a:rPr lang="en-US" smtClean="0"/>
+              <a:t>Third level</a:t>
+            </a:r>
+          </a:p>
+          <a:p>
+            <a:pPr lvl="3"/>
+            <a:r>
+              <a:rPr lang="en-US" smtClean="0"/>
+              <a:t>Fourth level</a:t>
+            </a:r>
+          </a:p>
+          <a:p>
+            <a:pPr lvl="4"/>
+            <a:r>
+              <a:rPr lang="en-US" smtClean="0"/>
+              <a:t>Fifth level</a:t>
+            </a:r>
+            <a:endParaRPr lang="en-US"/>
+          </a:p>
+        </p:txBody>
+      </p:sp>
+      <p:sp>
+        <p:nvSpPr>
+          <p:cNvPr id="5" name="Date Placeholder 4"/>
+          <p:cNvSpPr>
+            <a:spLocks noGrp="1"/>
+          </p:cNvSpPr>
+          <p:nvPr>
+            <p:ph type="dt" sz="half" idx="10"/>
+          </p:nvPr>
+        </p:nvSpPr>
+        <p:spPr/>
+        <p:txBody>
+          <a:bodyPr/>
+          <a:lstStyle/>
+          <a:p>
+            <a:fld id="{F642DA6E-6CD9-7C41-9FD8-01D28C61CAEF}" type="datetimeFigureOut">
+              <a:rPr lang="en-US" smtClean="0">
+                <a:solidFill>
+                  <a:prstClr val="black">
+                    <a:tint val="75000"/>
+                  </a:prstClr>
+                </a:solidFill>
+              </a:rPr>
+              <a:pPr/>
+              <a:t>3/1/2016</a:t>
+            </a:fld>
+            <a:endParaRPr lang="en-US">
+              <a:solidFill>
+                <a:prstClr val="black">
+                  <a:tint val="75000"/>
+                </a:prstClr>
+              </a:solidFill>
+            </a:endParaRPr>
+          </a:p>
+        </p:txBody>
+      </p:sp>
+      <p:sp>
+        <p:nvSpPr>
+          <p:cNvPr id="6" name="Footer Placeholder 5"/>
+          <p:cNvSpPr>
+            <a:spLocks noGrp="1"/>
+          </p:cNvSpPr>
+          <p:nvPr>
+            <p:ph type="ftr" sz="quarter" idx="11"/>
+          </p:nvPr>
+        </p:nvSpPr>
+        <p:spPr/>
+        <p:txBody>
+          <a:bodyPr/>
+          <a:lstStyle/>
+          <a:p>
+            <a:endParaRPr lang="en-US">
+              <a:solidFill>
+                <a:prstClr val="black">
+                  <a:tint val="75000"/>
+                </a:prstClr>
+              </a:solidFill>
+            </a:endParaRPr>
+          </a:p>
+        </p:txBody>
+      </p:sp>
+      <p:sp>
+        <p:nvSpPr>
+          <p:cNvPr id="7" name="Slide Number Placeholder 6"/>
+          <p:cNvSpPr>
+            <a:spLocks noGrp="1"/>
+          </p:cNvSpPr>
+          <p:nvPr>
+            <p:ph type="sldNum" sz="quarter" idx="12"/>
+          </p:nvPr>
+        </p:nvSpPr>
+        <p:spPr/>
+        <p:txBody>
+          <a:bodyPr/>
+          <a:lstStyle/>
+          <a:p>
+            <a:fld id="{CE3CCD67-A99C-7B4C-9065-78DD3F082118}" type="slidenum">
+              <a:rPr lang="en-US" smtClean="0">
+                <a:solidFill>
+                  <a:prstClr val="black">
+                    <a:tint val="75000"/>
+                  </a:prstClr>
+                </a:solidFill>
+              </a:rPr>
+              <a:pPr/>
+              <a:t>‹#›</a:t>
+            </a:fld>
+            <a:endParaRPr lang="en-US">
+              <a:solidFill>
+                <a:prstClr val="black">
+                  <a:tint val="75000"/>
+                </a:prstClr>
+              </a:solidFill>
+            </a:endParaRPr>
+          </a:p>
+        </p:txBody>
+      </p:sp>
+    </p:spTree>
+    <p:extLst>
+      <p:ext uri="{BB962C8B-B14F-4D97-AF65-F5344CB8AC3E}">
+        <p14:creationId xmlns:p14="http://schemas.microsoft.com/office/powerpoint/2010/main" val="3399916957"/>
+      </p:ext>
+    </p:extLst>
+  </p:cSld>
+  <p:clrMapOvr>
+    <a:masterClrMapping/>
+  </p:clrMapOvr>
+</p:sldLayout>
+</file>
+
+<file path=ppt/slideLayouts/slideLayout16.xml><?xml version="1.0" encoding="utf-8"?>
+<p:sldLayout xmlns:a="http://schemas.openxmlformats.org/drawingml/2006/main" xmlns:r="http://schemas.openxmlformats.org/officeDocument/2006/relationships" xmlns:p="http://schemas.openxmlformats.org/presentationml/2006/main" type="twoTxTwoObj" preserve="1">
+  <p:cSld name="Comparison">
+    <p:spTree>
+      <p:nvGrpSpPr>
+        <p:cNvPr id="1" name=""/>
+        <p:cNvGrpSpPr/>
+        <p:nvPr/>
+      </p:nvGrpSpPr>
+      <p:grpSpPr>
+        <a:xfrm>
+          <a:off x="0" y="0"/>
+          <a:ext cx="0" cy="0"/>
+          <a:chOff x="0" y="0"/>
+          <a:chExt cx="0" cy="0"/>
+        </a:xfrm>
+      </p:grpSpPr>
+      <p:sp>
+        <p:nvSpPr>
+          <p:cNvPr id="2" name="Title 1"/>
+          <p:cNvSpPr>
+            <a:spLocks noGrp="1"/>
+          </p:cNvSpPr>
+          <p:nvPr>
+            <p:ph type="title"/>
+          </p:nvPr>
+        </p:nvSpPr>
+        <p:spPr>
+          <a:xfrm>
+            <a:off x="609600" y="274639"/>
+            <a:ext cx="10972800" cy="1143000"/>
+          </a:xfrm>
+        </p:spPr>
+        <p:txBody>
+          <a:bodyPr/>
+          <a:lstStyle>
+            <a:lvl1pPr>
+              <a:defRPr/>
+            </a:lvl1pPr>
+          </a:lstStyle>
+          <a:p>
+            <a:r>
+              <a:rPr lang="en-US" smtClean="0"/>
+              <a:t>Click to edit Master title style</a:t>
+            </a:r>
+            <a:endParaRPr lang="en-US"/>
+          </a:p>
+        </p:txBody>
+      </p:sp>
+      <p:sp>
+        <p:nvSpPr>
+          <p:cNvPr id="3" name="Text Placeholder 2"/>
+          <p:cNvSpPr>
+            <a:spLocks noGrp="1"/>
+          </p:cNvSpPr>
+          <p:nvPr>
+            <p:ph type="body" idx="1"/>
+          </p:nvPr>
+        </p:nvSpPr>
+        <p:spPr>
+          <a:xfrm>
+            <a:off x="609600" y="1535113"/>
+            <a:ext cx="5386917" cy="639763"/>
+          </a:xfrm>
+        </p:spPr>
+        <p:txBody>
+          <a:bodyPr anchor="b"/>
+          <a:lstStyle>
+            <a:lvl1pPr marL="0" indent="0">
+              <a:buNone/>
+              <a:defRPr sz="3200" b="1"/>
+            </a:lvl1pPr>
+            <a:lvl2pPr marL="609585" indent="0">
+              <a:buNone/>
+              <a:defRPr sz="2667" b="1"/>
+            </a:lvl2pPr>
+            <a:lvl3pPr marL="1219170" indent="0">
+              <a:buNone/>
+              <a:defRPr sz="2400" b="1"/>
+            </a:lvl3pPr>
+            <a:lvl4pPr marL="1828754" indent="0">
+              <a:buNone/>
+              <a:defRPr sz="2133" b="1"/>
+            </a:lvl4pPr>
+            <a:lvl5pPr marL="2438339" indent="0">
+              <a:buNone/>
+              <a:defRPr sz="2133" b="1"/>
+            </a:lvl5pPr>
+            <a:lvl6pPr marL="3047924" indent="0">
+              <a:buNone/>
+              <a:defRPr sz="2133" b="1"/>
+            </a:lvl6pPr>
+            <a:lvl7pPr marL="3657509" indent="0">
+              <a:buNone/>
+              <a:defRPr sz="2133" b="1"/>
+            </a:lvl7pPr>
+            <a:lvl8pPr marL="4267093" indent="0">
+              <a:buNone/>
+              <a:defRPr sz="2133" b="1"/>
+            </a:lvl8pPr>
+            <a:lvl9pPr marL="4876678" indent="0">
+              <a:buNone/>
+              <a:defRPr sz="2133" b="1"/>
+            </a:lvl9pPr>
+          </a:lstStyle>
+          <a:p>
+            <a:pPr lvl="0"/>
+            <a:r>
+              <a:rPr lang="en-US" smtClean="0"/>
+              <a:t>Click to edit Master text styles</a:t>
+            </a:r>
+          </a:p>
+        </p:txBody>
+      </p:sp>
+      <p:sp>
+        <p:nvSpPr>
+          <p:cNvPr id="4" name="Content Placeholder 3"/>
+          <p:cNvSpPr>
+            <a:spLocks noGrp="1"/>
+          </p:cNvSpPr>
+          <p:nvPr>
+            <p:ph sz="half" idx="2"/>
+          </p:nvPr>
+        </p:nvSpPr>
+        <p:spPr>
+          <a:xfrm>
+            <a:off x="609600" y="2174875"/>
+            <a:ext cx="5386917" cy="3951288"/>
+          </a:xfrm>
+        </p:spPr>
+        <p:txBody>
+          <a:bodyPr/>
+          <a:lstStyle>
+            <a:lvl1pPr>
+              <a:defRPr sz="3200"/>
+            </a:lvl1pPr>
+            <a:lvl2pPr>
+              <a:defRPr sz="2667"/>
+            </a:lvl2pPr>
+            <a:lvl3pPr>
+              <a:defRPr sz="2400"/>
+            </a:lvl3pPr>
+            <a:lvl4pPr>
+              <a:defRPr sz="2133"/>
+            </a:lvl4pPr>
+            <a:lvl5pPr>
+              <a:defRPr sz="2133"/>
+            </a:lvl5pPr>
+            <a:lvl6pPr>
+              <a:defRPr sz="2133"/>
+            </a:lvl6pPr>
+            <a:lvl7pPr>
+              <a:defRPr sz="2133"/>
+            </a:lvl7pPr>
+            <a:lvl8pPr>
+              <a:defRPr sz="2133"/>
+            </a:lvl8pPr>
+            <a:lvl9pPr>
+              <a:defRPr sz="2133"/>
+            </a:lvl9pPr>
+          </a:lstStyle>
+          <a:p>
+            <a:pPr lvl="0"/>
+            <a:r>
+              <a:rPr lang="en-US" smtClean="0"/>
+              <a:t>Click to edit Master text styles</a:t>
+            </a:r>
+          </a:p>
+          <a:p>
+            <a:pPr lvl="1"/>
+            <a:r>
+              <a:rPr lang="en-US" smtClean="0"/>
+              <a:t>Second level</a:t>
+            </a:r>
+          </a:p>
+          <a:p>
+            <a:pPr lvl="2"/>
+            <a:r>
+              <a:rPr lang="en-US" smtClean="0"/>
+              <a:t>Third level</a:t>
+            </a:r>
+          </a:p>
+          <a:p>
+            <a:pPr lvl="3"/>
+            <a:r>
+              <a:rPr lang="en-US" smtClean="0"/>
+              <a:t>Fourth level</a:t>
+            </a:r>
+          </a:p>
+          <a:p>
+            <a:pPr lvl="4"/>
+            <a:r>
+              <a:rPr lang="en-US" smtClean="0"/>
+              <a:t>Fifth level</a:t>
+            </a:r>
+            <a:endParaRPr lang="en-US"/>
+          </a:p>
+        </p:txBody>
+      </p:sp>
+      <p:sp>
+        <p:nvSpPr>
+          <p:cNvPr id="5" name="Text Placeholder 4"/>
+          <p:cNvSpPr>
+            <a:spLocks noGrp="1"/>
+          </p:cNvSpPr>
+          <p:nvPr>
+            <p:ph type="body" sz="quarter" idx="3"/>
+          </p:nvPr>
+        </p:nvSpPr>
+        <p:spPr>
+          <a:xfrm>
+            <a:off x="6193369" y="1535113"/>
+            <a:ext cx="5389033" cy="639763"/>
+          </a:xfrm>
+        </p:spPr>
+        <p:txBody>
+          <a:bodyPr anchor="b"/>
+          <a:lstStyle>
+            <a:lvl1pPr marL="0" indent="0">
+              <a:buNone/>
+              <a:defRPr sz="3200" b="1"/>
+            </a:lvl1pPr>
+            <a:lvl2pPr marL="609585" indent="0">
+              <a:buNone/>
+              <a:defRPr sz="2667" b="1"/>
+            </a:lvl2pPr>
+            <a:lvl3pPr marL="1219170" indent="0">
+              <a:buNone/>
+              <a:defRPr sz="2400" b="1"/>
+            </a:lvl3pPr>
+            <a:lvl4pPr marL="1828754" indent="0">
+              <a:buNone/>
+              <a:defRPr sz="2133" b="1"/>
+            </a:lvl4pPr>
+            <a:lvl5pPr marL="2438339" indent="0">
+              <a:buNone/>
+              <a:defRPr sz="2133" b="1"/>
+            </a:lvl5pPr>
+            <a:lvl6pPr marL="3047924" indent="0">
+              <a:buNone/>
+              <a:defRPr sz="2133" b="1"/>
+            </a:lvl6pPr>
+            <a:lvl7pPr marL="3657509" indent="0">
+              <a:buNone/>
+              <a:defRPr sz="2133" b="1"/>
+            </a:lvl7pPr>
+            <a:lvl8pPr marL="4267093" indent="0">
+              <a:buNone/>
+              <a:defRPr sz="2133" b="1"/>
+            </a:lvl8pPr>
+            <a:lvl9pPr marL="4876678" indent="0">
+              <a:buNone/>
+              <a:defRPr sz="2133" b="1"/>
+            </a:lvl9pPr>
+          </a:lstStyle>
+          <a:p>
+            <a:pPr lvl="0"/>
+            <a:r>
+              <a:rPr lang="en-US" smtClean="0"/>
+              <a:t>Click to edit Master text styles</a:t>
+            </a:r>
+          </a:p>
+        </p:txBody>
+      </p:sp>
+      <p:sp>
+        <p:nvSpPr>
+          <p:cNvPr id="6" name="Content Placeholder 5"/>
+          <p:cNvSpPr>
+            <a:spLocks noGrp="1"/>
+          </p:cNvSpPr>
+          <p:nvPr>
+            <p:ph sz="quarter" idx="4"/>
+          </p:nvPr>
+        </p:nvSpPr>
+        <p:spPr>
+          <a:xfrm>
+            <a:off x="6193369" y="2174875"/>
+            <a:ext cx="5389033" cy="3951288"/>
+          </a:xfrm>
+        </p:spPr>
+        <p:txBody>
+          <a:bodyPr/>
+          <a:lstStyle>
+            <a:lvl1pPr>
+              <a:defRPr sz="3200"/>
+            </a:lvl1pPr>
+            <a:lvl2pPr>
+              <a:defRPr sz="2667"/>
+            </a:lvl2pPr>
+            <a:lvl3pPr>
+              <a:defRPr sz="2400"/>
+            </a:lvl3pPr>
+            <a:lvl4pPr>
+              <a:defRPr sz="2133"/>
+            </a:lvl4pPr>
+            <a:lvl5pPr>
+              <a:defRPr sz="2133"/>
+            </a:lvl5pPr>
+            <a:lvl6pPr>
+              <a:defRPr sz="2133"/>
+            </a:lvl6pPr>
+            <a:lvl7pPr>
+              <a:defRPr sz="2133"/>
+            </a:lvl7pPr>
+            <a:lvl8pPr>
+              <a:defRPr sz="2133"/>
+            </a:lvl8pPr>
+            <a:lvl9pPr>
+              <a:defRPr sz="2133"/>
+            </a:lvl9pPr>
+          </a:lstStyle>
+          <a:p>
+            <a:pPr lvl="0"/>
+            <a:r>
+              <a:rPr lang="en-US" smtClean="0"/>
+              <a:t>Click to edit Master text styles</a:t>
+            </a:r>
+          </a:p>
+          <a:p>
+            <a:pPr lvl="1"/>
+            <a:r>
+              <a:rPr lang="en-US" smtClean="0"/>
+              <a:t>Second level</a:t>
+            </a:r>
+          </a:p>
+          <a:p>
+            <a:pPr lvl="2"/>
+            <a:r>
+              <a:rPr lang="en-US" smtClean="0"/>
+              <a:t>Third level</a:t>
+            </a:r>
+          </a:p>
+          <a:p>
+            <a:pPr lvl="3"/>
+            <a:r>
+              <a:rPr lang="en-US" smtClean="0"/>
+              <a:t>Fourth level</a:t>
+            </a:r>
+          </a:p>
+          <a:p>
+            <a:pPr lvl="4"/>
+            <a:r>
+              <a:rPr lang="en-US" smtClean="0"/>
+              <a:t>Fifth level</a:t>
+            </a:r>
+            <a:endParaRPr lang="en-US"/>
+          </a:p>
+        </p:txBody>
+      </p:sp>
+      <p:sp>
+        <p:nvSpPr>
+          <p:cNvPr id="7" name="Date Placeholder 6"/>
+          <p:cNvSpPr>
+            <a:spLocks noGrp="1"/>
+          </p:cNvSpPr>
+          <p:nvPr>
+            <p:ph type="dt" sz="half" idx="10"/>
+          </p:nvPr>
+        </p:nvSpPr>
+        <p:spPr/>
+        <p:txBody>
+          <a:bodyPr/>
+          <a:lstStyle/>
+          <a:p>
+            <a:fld id="{F642DA6E-6CD9-7C41-9FD8-01D28C61CAEF}" type="datetimeFigureOut">
+              <a:rPr lang="en-US" smtClean="0">
+                <a:solidFill>
+                  <a:prstClr val="black">
+                    <a:tint val="75000"/>
+                  </a:prstClr>
+                </a:solidFill>
+              </a:rPr>
+              <a:pPr/>
+              <a:t>3/1/2016</a:t>
+            </a:fld>
+            <a:endParaRPr lang="en-US">
+              <a:solidFill>
+                <a:prstClr val="black">
+                  <a:tint val="75000"/>
+                </a:prstClr>
+              </a:solidFill>
+            </a:endParaRPr>
+          </a:p>
+        </p:txBody>
+      </p:sp>
+      <p:sp>
+        <p:nvSpPr>
+          <p:cNvPr id="8" name="Footer Placeholder 7"/>
+          <p:cNvSpPr>
+            <a:spLocks noGrp="1"/>
+          </p:cNvSpPr>
+          <p:nvPr>
+            <p:ph type="ftr" sz="quarter" idx="11"/>
+          </p:nvPr>
+        </p:nvSpPr>
+        <p:spPr/>
+        <p:txBody>
+          <a:bodyPr/>
+          <a:lstStyle/>
+          <a:p>
+            <a:endParaRPr lang="en-US">
+              <a:solidFill>
+                <a:prstClr val="black">
+                  <a:tint val="75000"/>
+                </a:prstClr>
+              </a:solidFill>
+            </a:endParaRPr>
+          </a:p>
+        </p:txBody>
+      </p:sp>
+      <p:sp>
+        <p:nvSpPr>
+          <p:cNvPr id="9" name="Slide Number Placeholder 8"/>
+          <p:cNvSpPr>
+            <a:spLocks noGrp="1"/>
+          </p:cNvSpPr>
+          <p:nvPr>
+            <p:ph type="sldNum" sz="quarter" idx="12"/>
+          </p:nvPr>
+        </p:nvSpPr>
+        <p:spPr/>
+        <p:txBody>
+          <a:bodyPr/>
+          <a:lstStyle/>
+          <a:p>
+            <a:fld id="{CE3CCD67-A99C-7B4C-9065-78DD3F082118}" type="slidenum">
+              <a:rPr lang="en-US" smtClean="0">
+                <a:solidFill>
+                  <a:prstClr val="black">
+                    <a:tint val="75000"/>
+                  </a:prstClr>
+                </a:solidFill>
+              </a:rPr>
+              <a:pPr/>
+              <a:t>‹#›</a:t>
+            </a:fld>
+            <a:endParaRPr lang="en-US">
+              <a:solidFill>
+                <a:prstClr val="black">
+                  <a:tint val="75000"/>
+                </a:prstClr>
+              </a:solidFill>
+            </a:endParaRPr>
+          </a:p>
+        </p:txBody>
+      </p:sp>
+    </p:spTree>
+    <p:extLst>
+      <p:ext uri="{BB962C8B-B14F-4D97-AF65-F5344CB8AC3E}">
+        <p14:creationId xmlns:p14="http://schemas.microsoft.com/office/powerpoint/2010/main" val="3422103616"/>
+      </p:ext>
+    </p:extLst>
+  </p:cSld>
+  <p:clrMapOvr>
+    <a:masterClrMapping/>
+  </p:clrMapOvr>
+</p:sldLayout>
+</file>
+
+<file path=ppt/slideLayouts/slideLayout17.xml><?xml version="1.0" encoding="utf-8"?>
+<p:sldLayout xmlns:a="http://schemas.openxmlformats.org/drawingml/2006/main" xmlns:r="http://schemas.openxmlformats.org/officeDocument/2006/relationships" xmlns:p="http://schemas.openxmlformats.org/presentationml/2006/main" type="titleOnly" preserve="1">
+  <p:cSld name="Title Only">
+    <p:spTree>
+      <p:nvGrpSpPr>
+        <p:cNvPr id="1" name=""/>
+        <p:cNvGrpSpPr/>
+        <p:nvPr/>
+      </p:nvGrpSpPr>
+      <p:grpSpPr>
+        <a:xfrm>
+          <a:off x="0" y="0"/>
+          <a:ext cx="0" cy="0"/>
+          <a:chOff x="0" y="0"/>
+          <a:chExt cx="0" cy="0"/>
+        </a:xfrm>
+      </p:grpSpPr>
+      <p:sp>
+        <p:nvSpPr>
+          <p:cNvPr id="2" name="Title 1"/>
+          <p:cNvSpPr>
+            <a:spLocks noGrp="1"/>
+          </p:cNvSpPr>
+          <p:nvPr>
+            <p:ph type="title"/>
+          </p:nvPr>
+        </p:nvSpPr>
+        <p:spPr/>
+        <p:txBody>
+          <a:bodyPr/>
+          <a:lstStyle/>
+          <a:p>
+            <a:r>
+              <a:rPr lang="en-US" smtClean="0"/>
+              <a:t>Click to edit Master title style</a:t>
+            </a:r>
+            <a:endParaRPr lang="en-US"/>
+          </a:p>
+        </p:txBody>
+      </p:sp>
+      <p:sp>
+        <p:nvSpPr>
+          <p:cNvPr id="3" name="Date Placeholder 2"/>
+          <p:cNvSpPr>
+            <a:spLocks noGrp="1"/>
+          </p:cNvSpPr>
+          <p:nvPr>
+            <p:ph type="dt" sz="half" idx="10"/>
+          </p:nvPr>
+        </p:nvSpPr>
+        <p:spPr/>
+        <p:txBody>
+          <a:bodyPr/>
+          <a:lstStyle/>
+          <a:p>
+            <a:fld id="{F642DA6E-6CD9-7C41-9FD8-01D28C61CAEF}" type="datetimeFigureOut">
+              <a:rPr lang="en-US" smtClean="0">
+                <a:solidFill>
+                  <a:prstClr val="black">
+                    <a:tint val="75000"/>
+                  </a:prstClr>
+                </a:solidFill>
+              </a:rPr>
+              <a:pPr/>
+              <a:t>3/1/2016</a:t>
+            </a:fld>
+            <a:endParaRPr lang="en-US">
+              <a:solidFill>
+                <a:prstClr val="black">
+                  <a:tint val="75000"/>
+                </a:prstClr>
+              </a:solidFill>
+            </a:endParaRPr>
+          </a:p>
+        </p:txBody>
+      </p:sp>
+      <p:sp>
+        <p:nvSpPr>
+          <p:cNvPr id="4" name="Footer Placeholder 3"/>
+          <p:cNvSpPr>
+            <a:spLocks noGrp="1"/>
+          </p:cNvSpPr>
+          <p:nvPr>
+            <p:ph type="ftr" sz="quarter" idx="11"/>
+          </p:nvPr>
+        </p:nvSpPr>
+        <p:spPr/>
+        <p:txBody>
+          <a:bodyPr/>
+          <a:lstStyle/>
+          <a:p>
+            <a:endParaRPr lang="en-US">
+              <a:solidFill>
+                <a:prstClr val="black">
+                  <a:tint val="75000"/>
+                </a:prstClr>
+              </a:solidFill>
+            </a:endParaRPr>
+          </a:p>
+        </p:txBody>
+      </p:sp>
+      <p:sp>
+        <p:nvSpPr>
+          <p:cNvPr id="5" name="Slide Number Placeholder 4"/>
+          <p:cNvSpPr>
+            <a:spLocks noGrp="1"/>
+          </p:cNvSpPr>
+          <p:nvPr>
+            <p:ph type="sldNum" sz="quarter" idx="12"/>
+          </p:nvPr>
+        </p:nvSpPr>
+        <p:spPr/>
+        <p:txBody>
+          <a:bodyPr/>
+          <a:lstStyle/>
+          <a:p>
+            <a:fld id="{CE3CCD67-A99C-7B4C-9065-78DD3F082118}" type="slidenum">
+              <a:rPr lang="en-US" smtClean="0">
+                <a:solidFill>
+                  <a:prstClr val="black">
+                    <a:tint val="75000"/>
+                  </a:prstClr>
+                </a:solidFill>
+              </a:rPr>
+              <a:pPr/>
+              <a:t>‹#›</a:t>
+            </a:fld>
+            <a:endParaRPr lang="en-US">
+              <a:solidFill>
+                <a:prstClr val="black">
+                  <a:tint val="75000"/>
+                </a:prstClr>
+              </a:solidFill>
+            </a:endParaRPr>
+          </a:p>
+        </p:txBody>
+      </p:sp>
+    </p:spTree>
+    <p:extLst>
+      <p:ext uri="{BB962C8B-B14F-4D97-AF65-F5344CB8AC3E}">
+        <p14:creationId xmlns:p14="http://schemas.microsoft.com/office/powerpoint/2010/main" val="1776923725"/>
+      </p:ext>
+    </p:extLst>
+  </p:cSld>
+  <p:clrMapOvr>
+    <a:masterClrMapping/>
+  </p:clrMapOvr>
+</p:sldLayout>
+</file>
+
+<file path=ppt/slideLayouts/slideLayout18.xml><?xml version="1.0" encoding="utf-8"?>
+<p:sldLayout xmlns:a="http://schemas.openxmlformats.org/drawingml/2006/main" xmlns:r="http://schemas.openxmlformats.org/officeDocument/2006/relationships" xmlns:p="http://schemas.openxmlformats.org/presentationml/2006/main" type="blank" preserve="1">
+  <p:cSld name="Blank">
+    <p:spTree>
+      <p:nvGrpSpPr>
+        <p:cNvPr id="1" name=""/>
+        <p:cNvGrpSpPr/>
+        <p:nvPr/>
+      </p:nvGrpSpPr>
+      <p:grpSpPr>
+        <a:xfrm>
+          <a:off x="0" y="0"/>
+          <a:ext cx="0" cy="0"/>
+          <a:chOff x="0" y="0"/>
+          <a:chExt cx="0" cy="0"/>
+        </a:xfrm>
+      </p:grpSpPr>
+      <p:sp>
+        <p:nvSpPr>
+          <p:cNvPr id="2" name="Date Placeholder 1"/>
+          <p:cNvSpPr>
+            <a:spLocks noGrp="1"/>
+          </p:cNvSpPr>
+          <p:nvPr>
+            <p:ph type="dt" sz="half" idx="10"/>
+          </p:nvPr>
+        </p:nvSpPr>
+        <p:spPr/>
+        <p:txBody>
+          <a:bodyPr/>
+          <a:lstStyle/>
+          <a:p>
+            <a:fld id="{F642DA6E-6CD9-7C41-9FD8-01D28C61CAEF}" type="datetimeFigureOut">
+              <a:rPr lang="en-US" smtClean="0">
+                <a:solidFill>
+                  <a:prstClr val="black">
+                    <a:tint val="75000"/>
+                  </a:prstClr>
+                </a:solidFill>
+              </a:rPr>
+              <a:pPr/>
+              <a:t>3/1/2016</a:t>
+            </a:fld>
+            <a:endParaRPr lang="en-US">
+              <a:solidFill>
+                <a:prstClr val="black">
+                  <a:tint val="75000"/>
+                </a:prstClr>
+              </a:solidFill>
+            </a:endParaRPr>
+          </a:p>
+        </p:txBody>
+      </p:sp>
+      <p:sp>
+        <p:nvSpPr>
+          <p:cNvPr id="3" name="Footer Placeholder 2"/>
+          <p:cNvSpPr>
+            <a:spLocks noGrp="1"/>
+          </p:cNvSpPr>
+          <p:nvPr>
+            <p:ph type="ftr" sz="quarter" idx="11"/>
+          </p:nvPr>
+        </p:nvSpPr>
+        <p:spPr/>
+        <p:txBody>
+          <a:bodyPr/>
+          <a:lstStyle/>
+          <a:p>
+            <a:endParaRPr lang="en-US">
+              <a:solidFill>
+                <a:prstClr val="black">
+                  <a:tint val="75000"/>
+                </a:prstClr>
+              </a:solidFill>
+            </a:endParaRPr>
+          </a:p>
+        </p:txBody>
+      </p:sp>
+      <p:sp>
+        <p:nvSpPr>
+          <p:cNvPr id="4" name="Slide Number Placeholder 3"/>
+          <p:cNvSpPr>
+            <a:spLocks noGrp="1"/>
+          </p:cNvSpPr>
+          <p:nvPr>
+            <p:ph type="sldNum" sz="quarter" idx="12"/>
+          </p:nvPr>
+        </p:nvSpPr>
+        <p:spPr/>
+        <p:txBody>
+          <a:bodyPr/>
+          <a:lstStyle/>
+          <a:p>
+            <a:fld id="{CE3CCD67-A99C-7B4C-9065-78DD3F082118}" type="slidenum">
+              <a:rPr lang="en-US" smtClean="0">
+                <a:solidFill>
+                  <a:prstClr val="black">
+                    <a:tint val="75000"/>
+                  </a:prstClr>
+                </a:solidFill>
+              </a:rPr>
+              <a:pPr/>
+              <a:t>‹#›</a:t>
+            </a:fld>
+            <a:endParaRPr lang="en-US">
+              <a:solidFill>
+                <a:prstClr val="black">
+                  <a:tint val="75000"/>
+                </a:prstClr>
+              </a:solidFill>
+            </a:endParaRPr>
+          </a:p>
+        </p:txBody>
+      </p:sp>
+    </p:spTree>
+    <p:extLst>
+      <p:ext uri="{BB962C8B-B14F-4D97-AF65-F5344CB8AC3E}">
+        <p14:creationId xmlns:p14="http://schemas.microsoft.com/office/powerpoint/2010/main" val="1705955808"/>
+      </p:ext>
+    </p:extLst>
+  </p:cSld>
+  <p:clrMapOvr>
+    <a:masterClrMapping/>
+  </p:clrMapOvr>
+</p:sldLayout>
+</file>
+
+<file path=ppt/slideLayouts/slideLayout19.xml><?xml version="1.0" encoding="utf-8"?>
+<p:sldLayout xmlns:a="http://schemas.openxmlformats.org/drawingml/2006/main" xmlns:r="http://schemas.openxmlformats.org/officeDocument/2006/relationships" xmlns:p="http://schemas.openxmlformats.org/presentationml/2006/main" type="objTx" preserve="1">
+  <p:cSld name="Content with Caption">
+    <p:spTree>
+      <p:nvGrpSpPr>
+        <p:cNvPr id="1" name=""/>
+        <p:cNvGrpSpPr/>
+        <p:nvPr/>
+      </p:nvGrpSpPr>
+      <p:grpSpPr>
+        <a:xfrm>
+          <a:off x="0" y="0"/>
+          <a:ext cx="0" cy="0"/>
+          <a:chOff x="0" y="0"/>
+          <a:chExt cx="0" cy="0"/>
+        </a:xfrm>
+      </p:grpSpPr>
+      <p:sp>
+        <p:nvSpPr>
+          <p:cNvPr id="2" name="Title 1"/>
+          <p:cNvSpPr>
+            <a:spLocks noGrp="1"/>
+          </p:cNvSpPr>
+          <p:nvPr>
+            <p:ph type="title"/>
+          </p:nvPr>
+        </p:nvSpPr>
+        <p:spPr>
+          <a:xfrm>
+            <a:off x="609602" y="273049"/>
+            <a:ext cx="4011084" cy="1162051"/>
+          </a:xfrm>
+        </p:spPr>
+        <p:txBody>
+          <a:bodyPr anchor="b"/>
+          <a:lstStyle>
+            <a:lvl1pPr algn="l">
+              <a:defRPr sz="2667" b="1"/>
+            </a:lvl1pPr>
+          </a:lstStyle>
+          <a:p>
+            <a:r>
+              <a:rPr lang="en-US" smtClean="0"/>
+              <a:t>Click to edit Master title style</a:t>
+            </a:r>
+            <a:endParaRPr lang="en-US"/>
+          </a:p>
+        </p:txBody>
+      </p:sp>
+      <p:sp>
+        <p:nvSpPr>
+          <p:cNvPr id="3" name="Content Placeholder 2"/>
+          <p:cNvSpPr>
+            <a:spLocks noGrp="1"/>
+          </p:cNvSpPr>
+          <p:nvPr>
+            <p:ph idx="1"/>
+          </p:nvPr>
+        </p:nvSpPr>
+        <p:spPr>
+          <a:xfrm>
+            <a:off x="4766733" y="273052"/>
+            <a:ext cx="6815667" cy="5853113"/>
+          </a:xfrm>
+        </p:spPr>
+        <p:txBody>
+          <a:bodyPr/>
+          <a:lstStyle>
+            <a:lvl1pPr>
+              <a:defRPr sz="4267"/>
+            </a:lvl1pPr>
+            <a:lvl2pPr>
+              <a:defRPr sz="3733"/>
+            </a:lvl2pPr>
+            <a:lvl3pPr>
+              <a:defRPr sz="3200"/>
+            </a:lvl3pPr>
+            <a:lvl4pPr>
+              <a:defRPr sz="2667"/>
+            </a:lvl4pPr>
+            <a:lvl5pPr>
+              <a:defRPr sz="2667"/>
+            </a:lvl5pPr>
+            <a:lvl6pPr>
+              <a:defRPr sz="2667"/>
+            </a:lvl6pPr>
+            <a:lvl7pPr>
+              <a:defRPr sz="2667"/>
+            </a:lvl7pPr>
+            <a:lvl8pPr>
+              <a:defRPr sz="2667"/>
+            </a:lvl8pPr>
+            <a:lvl9pPr>
+              <a:defRPr sz="2667"/>
+            </a:lvl9pPr>
+          </a:lstStyle>
+          <a:p>
+            <a:pPr lvl="0"/>
+            <a:r>
+              <a:rPr lang="en-US" smtClean="0"/>
+              <a:t>Click to edit Master text styles</a:t>
+            </a:r>
+          </a:p>
+          <a:p>
+            <a:pPr lvl="1"/>
+            <a:r>
+              <a:rPr lang="en-US" smtClean="0"/>
+              <a:t>Second level</a:t>
+            </a:r>
+          </a:p>
+          <a:p>
+            <a:pPr lvl="2"/>
+            <a:r>
+              <a:rPr lang="en-US" smtClean="0"/>
+              <a:t>Third level</a:t>
+            </a:r>
+          </a:p>
+          <a:p>
+            <a:pPr lvl="3"/>
+            <a:r>
+              <a:rPr lang="en-US" smtClean="0"/>
+              <a:t>Fourth level</a:t>
+            </a:r>
+          </a:p>
+          <a:p>
+            <a:pPr lvl="4"/>
+            <a:r>
+              <a:rPr lang="en-US" smtClean="0"/>
+              <a:t>Fifth level</a:t>
+            </a:r>
+            <a:endParaRPr lang="en-US"/>
+          </a:p>
+        </p:txBody>
+      </p:sp>
+      <p:sp>
+        <p:nvSpPr>
+          <p:cNvPr id="4" name="Text Placeholder 3"/>
+          <p:cNvSpPr>
+            <a:spLocks noGrp="1"/>
+          </p:cNvSpPr>
+          <p:nvPr>
+            <p:ph type="body" sz="half" idx="2"/>
+          </p:nvPr>
+        </p:nvSpPr>
+        <p:spPr>
+          <a:xfrm>
+            <a:off x="609602" y="1435102"/>
+            <a:ext cx="4011084" cy="4691063"/>
+          </a:xfrm>
+        </p:spPr>
+        <p:txBody>
+          <a:bodyPr/>
+          <a:lstStyle>
+            <a:lvl1pPr marL="0" indent="0">
+              <a:buNone/>
+              <a:defRPr sz="1867"/>
+            </a:lvl1pPr>
+            <a:lvl2pPr marL="609585" indent="0">
+              <a:buNone/>
+              <a:defRPr sz="1600"/>
+            </a:lvl2pPr>
+            <a:lvl3pPr marL="1219170" indent="0">
+              <a:buNone/>
+              <a:defRPr sz="1333"/>
+            </a:lvl3pPr>
+            <a:lvl4pPr marL="1828754" indent="0">
+              <a:buNone/>
+              <a:defRPr sz="1200"/>
+            </a:lvl4pPr>
+            <a:lvl5pPr marL="2438339" indent="0">
+              <a:buNone/>
+              <a:defRPr sz="1200"/>
+            </a:lvl5pPr>
+            <a:lvl6pPr marL="3047924" indent="0">
+              <a:buNone/>
+              <a:defRPr sz="1200"/>
+            </a:lvl6pPr>
+            <a:lvl7pPr marL="3657509" indent="0">
+              <a:buNone/>
+              <a:defRPr sz="1200"/>
+            </a:lvl7pPr>
+            <a:lvl8pPr marL="4267093" indent="0">
+              <a:buNone/>
+              <a:defRPr sz="1200"/>
+            </a:lvl8pPr>
+            <a:lvl9pPr marL="4876678" indent="0">
+              <a:buNone/>
+              <a:defRPr sz="1200"/>
+            </a:lvl9pPr>
+          </a:lstStyle>
+          <a:p>
+            <a:pPr lvl="0"/>
+            <a:r>
+              <a:rPr lang="en-US" smtClean="0"/>
+              <a:t>Click to edit Master text styles</a:t>
+            </a:r>
+          </a:p>
+        </p:txBody>
+      </p:sp>
+      <p:sp>
+        <p:nvSpPr>
+          <p:cNvPr id="5" name="Date Placeholder 4"/>
+          <p:cNvSpPr>
+            <a:spLocks noGrp="1"/>
+          </p:cNvSpPr>
+          <p:nvPr>
+            <p:ph type="dt" sz="half" idx="10"/>
+          </p:nvPr>
+        </p:nvSpPr>
+        <p:spPr/>
+        <p:txBody>
+          <a:bodyPr/>
+          <a:lstStyle/>
+          <a:p>
+            <a:fld id="{F642DA6E-6CD9-7C41-9FD8-01D28C61CAEF}" type="datetimeFigureOut">
+              <a:rPr lang="en-US" smtClean="0">
+                <a:solidFill>
+                  <a:prstClr val="black">
+                    <a:tint val="75000"/>
+                  </a:prstClr>
+                </a:solidFill>
+              </a:rPr>
+              <a:pPr/>
+              <a:t>3/1/2016</a:t>
+            </a:fld>
+            <a:endParaRPr lang="en-US">
+              <a:solidFill>
+                <a:prstClr val="black">
+                  <a:tint val="75000"/>
+                </a:prstClr>
+              </a:solidFill>
+            </a:endParaRPr>
+          </a:p>
+        </p:txBody>
+      </p:sp>
+      <p:sp>
+        <p:nvSpPr>
+          <p:cNvPr id="6" name="Footer Placeholder 5"/>
+          <p:cNvSpPr>
+            <a:spLocks noGrp="1"/>
+          </p:cNvSpPr>
+          <p:nvPr>
+            <p:ph type="ftr" sz="quarter" idx="11"/>
+          </p:nvPr>
+        </p:nvSpPr>
+        <p:spPr/>
+        <p:txBody>
+          <a:bodyPr/>
+          <a:lstStyle/>
+          <a:p>
+            <a:endParaRPr lang="en-US">
+              <a:solidFill>
+                <a:prstClr val="black">
+                  <a:tint val="75000"/>
+                </a:prstClr>
+              </a:solidFill>
+            </a:endParaRPr>
+          </a:p>
+        </p:txBody>
+      </p:sp>
+      <p:sp>
+        <p:nvSpPr>
+          <p:cNvPr id="7" name="Slide Number Placeholder 6"/>
+          <p:cNvSpPr>
+            <a:spLocks noGrp="1"/>
+          </p:cNvSpPr>
+          <p:nvPr>
+            <p:ph type="sldNum" sz="quarter" idx="12"/>
+          </p:nvPr>
+        </p:nvSpPr>
+        <p:spPr/>
+        <p:txBody>
+          <a:bodyPr/>
+          <a:lstStyle/>
+          <a:p>
+            <a:fld id="{CE3CCD67-A99C-7B4C-9065-78DD3F082118}" type="slidenum">
+              <a:rPr lang="en-US" smtClean="0">
+                <a:solidFill>
+                  <a:prstClr val="black">
+                    <a:tint val="75000"/>
+                  </a:prstClr>
+                </a:solidFill>
+              </a:rPr>
+              <a:pPr/>
+              <a:t>‹#›</a:t>
+            </a:fld>
+            <a:endParaRPr lang="en-US">
+              <a:solidFill>
+                <a:prstClr val="black">
+                  <a:tint val="75000"/>
+                </a:prstClr>
+              </a:solidFill>
+            </a:endParaRPr>
+          </a:p>
+        </p:txBody>
+      </p:sp>
+    </p:spTree>
+    <p:extLst>
+      <p:ext uri="{BB962C8B-B14F-4D97-AF65-F5344CB8AC3E}">
+        <p14:creationId xmlns:p14="http://schemas.microsoft.com/office/powerpoint/2010/main" val="2251065014"/>
       </p:ext>
     </p:extLst>
   </p:cSld>
@@ -769,7 +2890,7 @@
           <a:p>
             <a:fld id="{B8966210-D7C8-4A1C-B59E-033C29288170}" type="datetimeFigureOut">
               <a:rPr lang="en-US" smtClean="0"/>
-              <a:t>11/22/2015</a:t>
+              <a:t>3/1/2016</a:t>
             </a:fld>
             <a:endParaRPr lang="en-US"/>
           </a:p>
@@ -821,6 +2942,705 @@
     <p:extLst>
       <p:ext uri="{BB962C8B-B14F-4D97-AF65-F5344CB8AC3E}">
         <p14:creationId xmlns:p14="http://schemas.microsoft.com/office/powerpoint/2010/main" val="2495719139"/>
+      </p:ext>
+    </p:extLst>
+  </p:cSld>
+  <p:clrMapOvr>
+    <a:masterClrMapping/>
+  </p:clrMapOvr>
+</p:sldLayout>
+</file>
+
+<file path=ppt/slideLayouts/slideLayout20.xml><?xml version="1.0" encoding="utf-8"?>
+<p:sldLayout xmlns:a="http://schemas.openxmlformats.org/drawingml/2006/main" xmlns:r="http://schemas.openxmlformats.org/officeDocument/2006/relationships" xmlns:p="http://schemas.openxmlformats.org/presentationml/2006/main" type="picTx" preserve="1">
+  <p:cSld name="Picture with Caption">
+    <p:spTree>
+      <p:nvGrpSpPr>
+        <p:cNvPr id="1" name=""/>
+        <p:cNvGrpSpPr/>
+        <p:nvPr/>
+      </p:nvGrpSpPr>
+      <p:grpSpPr>
+        <a:xfrm>
+          <a:off x="0" y="0"/>
+          <a:ext cx="0" cy="0"/>
+          <a:chOff x="0" y="0"/>
+          <a:chExt cx="0" cy="0"/>
+        </a:xfrm>
+      </p:grpSpPr>
+      <p:sp>
+        <p:nvSpPr>
+          <p:cNvPr id="2" name="Title 1"/>
+          <p:cNvSpPr>
+            <a:spLocks noGrp="1"/>
+          </p:cNvSpPr>
+          <p:nvPr>
+            <p:ph type="title"/>
+          </p:nvPr>
+        </p:nvSpPr>
+        <p:spPr>
+          <a:xfrm>
+            <a:off x="2389717" y="4800600"/>
+            <a:ext cx="7315200" cy="566739"/>
+          </a:xfrm>
+        </p:spPr>
+        <p:txBody>
+          <a:bodyPr anchor="b"/>
+          <a:lstStyle>
+            <a:lvl1pPr algn="l">
+              <a:defRPr sz="2667" b="1"/>
+            </a:lvl1pPr>
+          </a:lstStyle>
+          <a:p>
+            <a:r>
+              <a:rPr lang="en-US" smtClean="0"/>
+              <a:t>Click to edit Master title style</a:t>
+            </a:r>
+            <a:endParaRPr lang="en-US"/>
+          </a:p>
+        </p:txBody>
+      </p:sp>
+      <p:sp>
+        <p:nvSpPr>
+          <p:cNvPr id="3" name="Picture Placeholder 2"/>
+          <p:cNvSpPr>
+            <a:spLocks noGrp="1"/>
+          </p:cNvSpPr>
+          <p:nvPr>
+            <p:ph type="pic" idx="1"/>
+          </p:nvPr>
+        </p:nvSpPr>
+        <p:spPr>
+          <a:xfrm>
+            <a:off x="2389717" y="612775"/>
+            <a:ext cx="7315200" cy="4114800"/>
+          </a:xfrm>
+        </p:spPr>
+        <p:txBody>
+          <a:bodyPr/>
+          <a:lstStyle>
+            <a:lvl1pPr marL="0" indent="0">
+              <a:buNone/>
+              <a:defRPr sz="4267"/>
+            </a:lvl1pPr>
+            <a:lvl2pPr marL="609585" indent="0">
+              <a:buNone/>
+              <a:defRPr sz="3733"/>
+            </a:lvl2pPr>
+            <a:lvl3pPr marL="1219170" indent="0">
+              <a:buNone/>
+              <a:defRPr sz="3200"/>
+            </a:lvl3pPr>
+            <a:lvl4pPr marL="1828754" indent="0">
+              <a:buNone/>
+              <a:defRPr sz="2667"/>
+            </a:lvl4pPr>
+            <a:lvl5pPr marL="2438339" indent="0">
+              <a:buNone/>
+              <a:defRPr sz="2667"/>
+            </a:lvl5pPr>
+            <a:lvl6pPr marL="3047924" indent="0">
+              <a:buNone/>
+              <a:defRPr sz="2667"/>
+            </a:lvl6pPr>
+            <a:lvl7pPr marL="3657509" indent="0">
+              <a:buNone/>
+              <a:defRPr sz="2667"/>
+            </a:lvl7pPr>
+            <a:lvl8pPr marL="4267093" indent="0">
+              <a:buNone/>
+              <a:defRPr sz="2667"/>
+            </a:lvl8pPr>
+            <a:lvl9pPr marL="4876678" indent="0">
+              <a:buNone/>
+              <a:defRPr sz="2667"/>
+            </a:lvl9pPr>
+          </a:lstStyle>
+          <a:p>
+            <a:endParaRPr lang="en-US"/>
+          </a:p>
+        </p:txBody>
+      </p:sp>
+      <p:sp>
+        <p:nvSpPr>
+          <p:cNvPr id="4" name="Text Placeholder 3"/>
+          <p:cNvSpPr>
+            <a:spLocks noGrp="1"/>
+          </p:cNvSpPr>
+          <p:nvPr>
+            <p:ph type="body" sz="half" idx="2"/>
+          </p:nvPr>
+        </p:nvSpPr>
+        <p:spPr>
+          <a:xfrm>
+            <a:off x="2389717" y="5367338"/>
+            <a:ext cx="7315200" cy="804863"/>
+          </a:xfrm>
+        </p:spPr>
+        <p:txBody>
+          <a:bodyPr/>
+          <a:lstStyle>
+            <a:lvl1pPr marL="0" indent="0">
+              <a:buNone/>
+              <a:defRPr sz="1867"/>
+            </a:lvl1pPr>
+            <a:lvl2pPr marL="609585" indent="0">
+              <a:buNone/>
+              <a:defRPr sz="1600"/>
+            </a:lvl2pPr>
+            <a:lvl3pPr marL="1219170" indent="0">
+              <a:buNone/>
+              <a:defRPr sz="1333"/>
+            </a:lvl3pPr>
+            <a:lvl4pPr marL="1828754" indent="0">
+              <a:buNone/>
+              <a:defRPr sz="1200"/>
+            </a:lvl4pPr>
+            <a:lvl5pPr marL="2438339" indent="0">
+              <a:buNone/>
+              <a:defRPr sz="1200"/>
+            </a:lvl5pPr>
+            <a:lvl6pPr marL="3047924" indent="0">
+              <a:buNone/>
+              <a:defRPr sz="1200"/>
+            </a:lvl6pPr>
+            <a:lvl7pPr marL="3657509" indent="0">
+              <a:buNone/>
+              <a:defRPr sz="1200"/>
+            </a:lvl7pPr>
+            <a:lvl8pPr marL="4267093" indent="0">
+              <a:buNone/>
+              <a:defRPr sz="1200"/>
+            </a:lvl8pPr>
+            <a:lvl9pPr marL="4876678" indent="0">
+              <a:buNone/>
+              <a:defRPr sz="1200"/>
+            </a:lvl9pPr>
+          </a:lstStyle>
+          <a:p>
+            <a:pPr lvl="0"/>
+            <a:r>
+              <a:rPr lang="en-US" smtClean="0"/>
+              <a:t>Click to edit Master text styles</a:t>
+            </a:r>
+          </a:p>
+        </p:txBody>
+      </p:sp>
+      <p:sp>
+        <p:nvSpPr>
+          <p:cNvPr id="5" name="Date Placeholder 4"/>
+          <p:cNvSpPr>
+            <a:spLocks noGrp="1"/>
+          </p:cNvSpPr>
+          <p:nvPr>
+            <p:ph type="dt" sz="half" idx="10"/>
+          </p:nvPr>
+        </p:nvSpPr>
+        <p:spPr/>
+        <p:txBody>
+          <a:bodyPr/>
+          <a:lstStyle/>
+          <a:p>
+            <a:fld id="{F642DA6E-6CD9-7C41-9FD8-01D28C61CAEF}" type="datetimeFigureOut">
+              <a:rPr lang="en-US" smtClean="0">
+                <a:solidFill>
+                  <a:prstClr val="black">
+                    <a:tint val="75000"/>
+                  </a:prstClr>
+                </a:solidFill>
+              </a:rPr>
+              <a:pPr/>
+              <a:t>3/1/2016</a:t>
+            </a:fld>
+            <a:endParaRPr lang="en-US">
+              <a:solidFill>
+                <a:prstClr val="black">
+                  <a:tint val="75000"/>
+                </a:prstClr>
+              </a:solidFill>
+            </a:endParaRPr>
+          </a:p>
+        </p:txBody>
+      </p:sp>
+      <p:sp>
+        <p:nvSpPr>
+          <p:cNvPr id="6" name="Footer Placeholder 5"/>
+          <p:cNvSpPr>
+            <a:spLocks noGrp="1"/>
+          </p:cNvSpPr>
+          <p:nvPr>
+            <p:ph type="ftr" sz="quarter" idx="11"/>
+          </p:nvPr>
+        </p:nvSpPr>
+        <p:spPr/>
+        <p:txBody>
+          <a:bodyPr/>
+          <a:lstStyle/>
+          <a:p>
+            <a:endParaRPr lang="en-US">
+              <a:solidFill>
+                <a:prstClr val="black">
+                  <a:tint val="75000"/>
+                </a:prstClr>
+              </a:solidFill>
+            </a:endParaRPr>
+          </a:p>
+        </p:txBody>
+      </p:sp>
+      <p:sp>
+        <p:nvSpPr>
+          <p:cNvPr id="7" name="Slide Number Placeholder 6"/>
+          <p:cNvSpPr>
+            <a:spLocks noGrp="1"/>
+          </p:cNvSpPr>
+          <p:nvPr>
+            <p:ph type="sldNum" sz="quarter" idx="12"/>
+          </p:nvPr>
+        </p:nvSpPr>
+        <p:spPr/>
+        <p:txBody>
+          <a:bodyPr/>
+          <a:lstStyle/>
+          <a:p>
+            <a:fld id="{CE3CCD67-A99C-7B4C-9065-78DD3F082118}" type="slidenum">
+              <a:rPr lang="en-US" smtClean="0">
+                <a:solidFill>
+                  <a:prstClr val="black">
+                    <a:tint val="75000"/>
+                  </a:prstClr>
+                </a:solidFill>
+              </a:rPr>
+              <a:pPr/>
+              <a:t>‹#›</a:t>
+            </a:fld>
+            <a:endParaRPr lang="en-US">
+              <a:solidFill>
+                <a:prstClr val="black">
+                  <a:tint val="75000"/>
+                </a:prstClr>
+              </a:solidFill>
+            </a:endParaRPr>
+          </a:p>
+        </p:txBody>
+      </p:sp>
+    </p:spTree>
+    <p:extLst>
+      <p:ext uri="{BB962C8B-B14F-4D97-AF65-F5344CB8AC3E}">
+        <p14:creationId xmlns:p14="http://schemas.microsoft.com/office/powerpoint/2010/main" val="1202998566"/>
+      </p:ext>
+    </p:extLst>
+  </p:cSld>
+  <p:clrMapOvr>
+    <a:masterClrMapping/>
+  </p:clrMapOvr>
+</p:sldLayout>
+</file>
+
+<file path=ppt/slideLayouts/slideLayout21.xml><?xml version="1.0" encoding="utf-8"?>
+<p:sldLayout xmlns:a="http://schemas.openxmlformats.org/drawingml/2006/main" xmlns:r="http://schemas.openxmlformats.org/officeDocument/2006/relationships" xmlns:p="http://schemas.openxmlformats.org/presentationml/2006/main" type="vertTx" preserve="1">
+  <p:cSld name="Title and Vertical Text">
+    <p:spTree>
+      <p:nvGrpSpPr>
+        <p:cNvPr id="1" name=""/>
+        <p:cNvGrpSpPr/>
+        <p:nvPr/>
+      </p:nvGrpSpPr>
+      <p:grpSpPr>
+        <a:xfrm>
+          <a:off x="0" y="0"/>
+          <a:ext cx="0" cy="0"/>
+          <a:chOff x="0" y="0"/>
+          <a:chExt cx="0" cy="0"/>
+        </a:xfrm>
+      </p:grpSpPr>
+      <p:sp>
+        <p:nvSpPr>
+          <p:cNvPr id="2" name="Title 1"/>
+          <p:cNvSpPr>
+            <a:spLocks noGrp="1"/>
+          </p:cNvSpPr>
+          <p:nvPr>
+            <p:ph type="title"/>
+          </p:nvPr>
+        </p:nvSpPr>
+        <p:spPr/>
+        <p:txBody>
+          <a:bodyPr/>
+          <a:lstStyle/>
+          <a:p>
+            <a:r>
+              <a:rPr lang="en-US" smtClean="0"/>
+              <a:t>Click to edit Master title style</a:t>
+            </a:r>
+            <a:endParaRPr lang="en-US"/>
+          </a:p>
+        </p:txBody>
+      </p:sp>
+      <p:sp>
+        <p:nvSpPr>
+          <p:cNvPr id="3" name="Vertical Text Placeholder 2"/>
+          <p:cNvSpPr>
+            <a:spLocks noGrp="1"/>
+          </p:cNvSpPr>
+          <p:nvPr>
+            <p:ph type="body" orient="vert" idx="1"/>
+          </p:nvPr>
+        </p:nvSpPr>
+        <p:spPr/>
+        <p:txBody>
+          <a:bodyPr vert="eaVert"/>
+          <a:lstStyle/>
+          <a:p>
+            <a:pPr lvl="0"/>
+            <a:r>
+              <a:rPr lang="en-US" smtClean="0"/>
+              <a:t>Click to edit Master text styles</a:t>
+            </a:r>
+          </a:p>
+          <a:p>
+            <a:pPr lvl="1"/>
+            <a:r>
+              <a:rPr lang="en-US" smtClean="0"/>
+              <a:t>Second level</a:t>
+            </a:r>
+          </a:p>
+          <a:p>
+            <a:pPr lvl="2"/>
+            <a:r>
+              <a:rPr lang="en-US" smtClean="0"/>
+              <a:t>Third level</a:t>
+            </a:r>
+          </a:p>
+          <a:p>
+            <a:pPr lvl="3"/>
+            <a:r>
+              <a:rPr lang="en-US" smtClean="0"/>
+              <a:t>Fourth level</a:t>
+            </a:r>
+          </a:p>
+          <a:p>
+            <a:pPr lvl="4"/>
+            <a:r>
+              <a:rPr lang="en-US" smtClean="0"/>
+              <a:t>Fifth level</a:t>
+            </a:r>
+            <a:endParaRPr lang="en-US"/>
+          </a:p>
+        </p:txBody>
+      </p:sp>
+      <p:sp>
+        <p:nvSpPr>
+          <p:cNvPr id="4" name="Date Placeholder 3"/>
+          <p:cNvSpPr>
+            <a:spLocks noGrp="1"/>
+          </p:cNvSpPr>
+          <p:nvPr>
+            <p:ph type="dt" sz="half" idx="10"/>
+          </p:nvPr>
+        </p:nvSpPr>
+        <p:spPr/>
+        <p:txBody>
+          <a:bodyPr/>
+          <a:lstStyle/>
+          <a:p>
+            <a:fld id="{F642DA6E-6CD9-7C41-9FD8-01D28C61CAEF}" type="datetimeFigureOut">
+              <a:rPr lang="en-US" smtClean="0">
+                <a:solidFill>
+                  <a:prstClr val="black">
+                    <a:tint val="75000"/>
+                  </a:prstClr>
+                </a:solidFill>
+              </a:rPr>
+              <a:pPr/>
+              <a:t>3/1/2016</a:t>
+            </a:fld>
+            <a:endParaRPr lang="en-US">
+              <a:solidFill>
+                <a:prstClr val="black">
+                  <a:tint val="75000"/>
+                </a:prstClr>
+              </a:solidFill>
+            </a:endParaRPr>
+          </a:p>
+        </p:txBody>
+      </p:sp>
+      <p:sp>
+        <p:nvSpPr>
+          <p:cNvPr id="5" name="Footer Placeholder 4"/>
+          <p:cNvSpPr>
+            <a:spLocks noGrp="1"/>
+          </p:cNvSpPr>
+          <p:nvPr>
+            <p:ph type="ftr" sz="quarter" idx="11"/>
+          </p:nvPr>
+        </p:nvSpPr>
+        <p:spPr/>
+        <p:txBody>
+          <a:bodyPr/>
+          <a:lstStyle/>
+          <a:p>
+            <a:endParaRPr lang="en-US">
+              <a:solidFill>
+                <a:prstClr val="black">
+                  <a:tint val="75000"/>
+                </a:prstClr>
+              </a:solidFill>
+            </a:endParaRPr>
+          </a:p>
+        </p:txBody>
+      </p:sp>
+      <p:sp>
+        <p:nvSpPr>
+          <p:cNvPr id="6" name="Slide Number Placeholder 5"/>
+          <p:cNvSpPr>
+            <a:spLocks noGrp="1"/>
+          </p:cNvSpPr>
+          <p:nvPr>
+            <p:ph type="sldNum" sz="quarter" idx="12"/>
+          </p:nvPr>
+        </p:nvSpPr>
+        <p:spPr/>
+        <p:txBody>
+          <a:bodyPr/>
+          <a:lstStyle/>
+          <a:p>
+            <a:fld id="{CE3CCD67-A99C-7B4C-9065-78DD3F082118}" type="slidenum">
+              <a:rPr lang="en-US" smtClean="0">
+                <a:solidFill>
+                  <a:prstClr val="black">
+                    <a:tint val="75000"/>
+                  </a:prstClr>
+                </a:solidFill>
+              </a:rPr>
+              <a:pPr/>
+              <a:t>‹#›</a:t>
+            </a:fld>
+            <a:endParaRPr lang="en-US">
+              <a:solidFill>
+                <a:prstClr val="black">
+                  <a:tint val="75000"/>
+                </a:prstClr>
+              </a:solidFill>
+            </a:endParaRPr>
+          </a:p>
+        </p:txBody>
+      </p:sp>
+    </p:spTree>
+    <p:extLst>
+      <p:ext uri="{BB962C8B-B14F-4D97-AF65-F5344CB8AC3E}">
+        <p14:creationId xmlns:p14="http://schemas.microsoft.com/office/powerpoint/2010/main" val="1658602220"/>
+      </p:ext>
+    </p:extLst>
+  </p:cSld>
+  <p:clrMapOvr>
+    <a:masterClrMapping/>
+  </p:clrMapOvr>
+</p:sldLayout>
+</file>
+
+<file path=ppt/slideLayouts/slideLayout22.xml><?xml version="1.0" encoding="utf-8"?>
+<p:sldLayout xmlns:a="http://schemas.openxmlformats.org/drawingml/2006/main" xmlns:r="http://schemas.openxmlformats.org/officeDocument/2006/relationships" xmlns:p="http://schemas.openxmlformats.org/presentationml/2006/main" type="vertTitleAndTx" preserve="1">
+  <p:cSld name="Vertical Title and Text">
+    <p:spTree>
+      <p:nvGrpSpPr>
+        <p:cNvPr id="1" name=""/>
+        <p:cNvGrpSpPr/>
+        <p:nvPr/>
+      </p:nvGrpSpPr>
+      <p:grpSpPr>
+        <a:xfrm>
+          <a:off x="0" y="0"/>
+          <a:ext cx="0" cy="0"/>
+          <a:chOff x="0" y="0"/>
+          <a:chExt cx="0" cy="0"/>
+        </a:xfrm>
+      </p:grpSpPr>
+      <p:sp>
+        <p:nvSpPr>
+          <p:cNvPr id="2" name="Vertical Title 1"/>
+          <p:cNvSpPr>
+            <a:spLocks noGrp="1"/>
+          </p:cNvSpPr>
+          <p:nvPr>
+            <p:ph type="title" orient="vert"/>
+          </p:nvPr>
+        </p:nvSpPr>
+        <p:spPr>
+          <a:xfrm>
+            <a:off x="8839200" y="206375"/>
+            <a:ext cx="2743200" cy="4387851"/>
+          </a:xfrm>
+        </p:spPr>
+        <p:txBody>
+          <a:bodyPr vert="eaVert"/>
+          <a:lstStyle/>
+          <a:p>
+            <a:r>
+              <a:rPr lang="en-US" smtClean="0"/>
+              <a:t>Click to edit Master title style</a:t>
+            </a:r>
+            <a:endParaRPr lang="en-US"/>
+          </a:p>
+        </p:txBody>
+      </p:sp>
+      <p:sp>
+        <p:nvSpPr>
+          <p:cNvPr id="3" name="Vertical Text Placeholder 2"/>
+          <p:cNvSpPr>
+            <a:spLocks noGrp="1"/>
+          </p:cNvSpPr>
+          <p:nvPr>
+            <p:ph type="body" orient="vert" idx="1"/>
+          </p:nvPr>
+        </p:nvSpPr>
+        <p:spPr>
+          <a:xfrm>
+            <a:off x="609600" y="206375"/>
+            <a:ext cx="8026400" cy="4387851"/>
+          </a:xfrm>
+        </p:spPr>
+        <p:txBody>
+          <a:bodyPr vert="eaVert"/>
+          <a:lstStyle/>
+          <a:p>
+            <a:pPr lvl="0"/>
+            <a:r>
+              <a:rPr lang="en-US" smtClean="0"/>
+              <a:t>Click to edit Master text styles</a:t>
+            </a:r>
+          </a:p>
+          <a:p>
+            <a:pPr lvl="1"/>
+            <a:r>
+              <a:rPr lang="en-US" smtClean="0"/>
+              <a:t>Second level</a:t>
+            </a:r>
+          </a:p>
+          <a:p>
+            <a:pPr lvl="2"/>
+            <a:r>
+              <a:rPr lang="en-US" smtClean="0"/>
+              <a:t>Third level</a:t>
+            </a:r>
+          </a:p>
+          <a:p>
+            <a:pPr lvl="3"/>
+            <a:r>
+              <a:rPr lang="en-US" smtClean="0"/>
+              <a:t>Fourth level</a:t>
+            </a:r>
+          </a:p>
+          <a:p>
+            <a:pPr lvl="4"/>
+            <a:r>
+              <a:rPr lang="en-US" smtClean="0"/>
+              <a:t>Fifth level</a:t>
+            </a:r>
+            <a:endParaRPr lang="en-US"/>
+          </a:p>
+        </p:txBody>
+      </p:sp>
+      <p:sp>
+        <p:nvSpPr>
+          <p:cNvPr id="4" name="Date Placeholder 3"/>
+          <p:cNvSpPr>
+            <a:spLocks noGrp="1"/>
+          </p:cNvSpPr>
+          <p:nvPr>
+            <p:ph type="dt" sz="half" idx="10"/>
+          </p:nvPr>
+        </p:nvSpPr>
+        <p:spPr/>
+        <p:txBody>
+          <a:bodyPr/>
+          <a:lstStyle/>
+          <a:p>
+            <a:fld id="{F642DA6E-6CD9-7C41-9FD8-01D28C61CAEF}" type="datetimeFigureOut">
+              <a:rPr lang="en-US" smtClean="0">
+                <a:solidFill>
+                  <a:prstClr val="black">
+                    <a:tint val="75000"/>
+                  </a:prstClr>
+                </a:solidFill>
+              </a:rPr>
+              <a:pPr/>
+              <a:t>3/1/2016</a:t>
+            </a:fld>
+            <a:endParaRPr lang="en-US">
+              <a:solidFill>
+                <a:prstClr val="black">
+                  <a:tint val="75000"/>
+                </a:prstClr>
+              </a:solidFill>
+            </a:endParaRPr>
+          </a:p>
+        </p:txBody>
+      </p:sp>
+      <p:sp>
+        <p:nvSpPr>
+          <p:cNvPr id="5" name="Footer Placeholder 4"/>
+          <p:cNvSpPr>
+            <a:spLocks noGrp="1"/>
+          </p:cNvSpPr>
+          <p:nvPr>
+            <p:ph type="ftr" sz="quarter" idx="11"/>
+          </p:nvPr>
+        </p:nvSpPr>
+        <p:spPr/>
+        <p:txBody>
+          <a:bodyPr/>
+          <a:lstStyle/>
+          <a:p>
+            <a:endParaRPr lang="en-US">
+              <a:solidFill>
+                <a:prstClr val="black">
+                  <a:tint val="75000"/>
+                </a:prstClr>
+              </a:solidFill>
+            </a:endParaRPr>
+          </a:p>
+        </p:txBody>
+      </p:sp>
+      <p:sp>
+        <p:nvSpPr>
+          <p:cNvPr id="6" name="Slide Number Placeholder 5"/>
+          <p:cNvSpPr>
+            <a:spLocks noGrp="1"/>
+          </p:cNvSpPr>
+          <p:nvPr>
+            <p:ph type="sldNum" sz="quarter" idx="12"/>
+          </p:nvPr>
+        </p:nvSpPr>
+        <p:spPr/>
+        <p:txBody>
+          <a:bodyPr/>
+          <a:lstStyle/>
+          <a:p>
+            <a:fld id="{CE3CCD67-A99C-7B4C-9065-78DD3F082118}" type="slidenum">
+              <a:rPr lang="en-US" smtClean="0">
+                <a:solidFill>
+                  <a:prstClr val="black">
+                    <a:tint val="75000"/>
+                  </a:prstClr>
+                </a:solidFill>
+              </a:rPr>
+              <a:pPr/>
+              <a:t>‹#›</a:t>
+            </a:fld>
+            <a:endParaRPr lang="en-US">
+              <a:solidFill>
+                <a:prstClr val="black">
+                  <a:tint val="75000"/>
+                </a:prstClr>
+              </a:solidFill>
+            </a:endParaRPr>
+          </a:p>
+        </p:txBody>
+      </p:sp>
+    </p:spTree>
+    <p:extLst>
+      <p:ext uri="{BB962C8B-B14F-4D97-AF65-F5344CB8AC3E}">
+        <p14:creationId xmlns:p14="http://schemas.microsoft.com/office/powerpoint/2010/main" val="2319740802"/>
       </p:ext>
     </p:extLst>
   </p:cSld>
@@ -1015,7 +3835,7 @@
           <a:p>
             <a:fld id="{B8966210-D7C8-4A1C-B59E-033C29288170}" type="datetimeFigureOut">
               <a:rPr lang="en-US" smtClean="0"/>
-              <a:t>11/22/2015</a:t>
+              <a:t>3/1/2016</a:t>
             </a:fld>
             <a:endParaRPr lang="en-US"/>
           </a:p>
@@ -1247,7 +4067,7 @@
           <a:p>
             <a:fld id="{B8966210-D7C8-4A1C-B59E-033C29288170}" type="datetimeFigureOut">
               <a:rPr lang="en-US" smtClean="0"/>
-              <a:t>11/22/2015</a:t>
+              <a:t>3/1/2016</a:t>
             </a:fld>
             <a:endParaRPr lang="en-US"/>
           </a:p>
@@ -1614,7 +4434,7 @@
           <a:p>
             <a:fld id="{B8966210-D7C8-4A1C-B59E-033C29288170}" type="datetimeFigureOut">
               <a:rPr lang="en-US" smtClean="0"/>
-              <a:t>11/22/2015</a:t>
+              <a:t>3/1/2016</a:t>
             </a:fld>
             <a:endParaRPr lang="en-US"/>
           </a:p>
@@ -1732,7 +4552,7 @@
           <a:p>
             <a:fld id="{B8966210-D7C8-4A1C-B59E-033C29288170}" type="datetimeFigureOut">
               <a:rPr lang="en-US" smtClean="0"/>
-              <a:t>11/22/2015</a:t>
+              <a:t>3/1/2016</a:t>
             </a:fld>
             <a:endParaRPr lang="en-US"/>
           </a:p>
@@ -1827,7 +4647,7 @@
           <a:p>
             <a:fld id="{B8966210-D7C8-4A1C-B59E-033C29288170}" type="datetimeFigureOut">
               <a:rPr lang="en-US" smtClean="0"/>
-              <a:t>11/22/2015</a:t>
+              <a:t>3/1/2016</a:t>
             </a:fld>
             <a:endParaRPr lang="en-US"/>
           </a:p>
@@ -2104,7 +4924,7 @@
           <a:p>
             <a:fld id="{B8966210-D7C8-4A1C-B59E-033C29288170}" type="datetimeFigureOut">
               <a:rPr lang="en-US" smtClean="0"/>
-              <a:t>11/22/2015</a:t>
+              <a:t>3/1/2016</a:t>
             </a:fld>
             <a:endParaRPr lang="en-US"/>
           </a:p>
@@ -2357,7 +5177,7 @@
           <a:p>
             <a:fld id="{B8966210-D7C8-4A1C-B59E-033C29288170}" type="datetimeFigureOut">
               <a:rPr lang="en-US" smtClean="0"/>
-              <a:t>11/22/2015</a:t>
+              <a:t>3/1/2016</a:t>
             </a:fld>
             <a:endParaRPr lang="en-US"/>
           </a:p>
@@ -2570,7 +5390,7 @@
           <a:p>
             <a:fld id="{B8966210-D7C8-4A1C-B59E-033C29288170}" type="datetimeFigureOut">
               <a:rPr lang="en-US" smtClean="0"/>
-              <a:t>11/22/2015</a:t>
+              <a:t>3/1/2016</a:t>
             </a:fld>
             <a:endParaRPr lang="en-US"/>
           </a:p>
@@ -2945,6 +5765,551 @@
       </a:lvl8pPr>
       <a:lvl9pPr marL="3657600" algn="l" defTabSz="914400" rtl="0" eaLnBrk="1" latinLnBrk="0" hangingPunct="1">
         <a:defRPr sz="1800" kern="1200">
+          <a:solidFill>
+            <a:schemeClr val="tx1"/>
+          </a:solidFill>
+          <a:latin typeface="+mn-lt"/>
+          <a:ea typeface="+mn-ea"/>
+          <a:cs typeface="+mn-cs"/>
+        </a:defRPr>
+      </a:lvl9pPr>
+    </p:otherStyle>
+  </p:txStyles>
+</p:sldMaster>
+</file>
+
+<file path=ppt/slideMasters/slideMaster2.xml><?xml version="1.0" encoding="utf-8"?>
+<p:sldMaster xmlns:a="http://schemas.openxmlformats.org/drawingml/2006/main" xmlns:r="http://schemas.openxmlformats.org/officeDocument/2006/relationships" xmlns:p="http://schemas.openxmlformats.org/presentationml/2006/main">
+  <p:cSld>
+    <p:bg>
+      <p:bgRef idx="1001">
+        <a:schemeClr val="bg1"/>
+      </p:bgRef>
+    </p:bg>
+    <p:spTree>
+      <p:nvGrpSpPr>
+        <p:cNvPr id="1" name=""/>
+        <p:cNvGrpSpPr/>
+        <p:nvPr/>
+      </p:nvGrpSpPr>
+      <p:grpSpPr>
+        <a:xfrm>
+          <a:off x="0" y="0"/>
+          <a:ext cx="0" cy="0"/>
+          <a:chOff x="0" y="0"/>
+          <a:chExt cx="0" cy="0"/>
+        </a:xfrm>
+      </p:grpSpPr>
+      <p:sp>
+        <p:nvSpPr>
+          <p:cNvPr id="2" name="Title Placeholder 1"/>
+          <p:cNvSpPr>
+            <a:spLocks noGrp="1"/>
+          </p:cNvSpPr>
+          <p:nvPr>
+            <p:ph type="title"/>
+          </p:nvPr>
+        </p:nvSpPr>
+        <p:spPr>
+          <a:xfrm>
+            <a:off x="609600" y="274639"/>
+            <a:ext cx="10972800" cy="1143000"/>
+          </a:xfrm>
+          <a:prstGeom prst="rect">
+            <a:avLst/>
+          </a:prstGeom>
+        </p:spPr>
+        <p:txBody>
+          <a:bodyPr vert="horz" lIns="91440" tIns="45720" rIns="91440" bIns="45720" rtlCol="0" anchor="ctr">
+            <a:normAutofit/>
+          </a:bodyPr>
+          <a:lstStyle/>
+          <a:p>
+            <a:r>
+              <a:rPr lang="en-US" smtClean="0"/>
+              <a:t>Click to edit Master title style</a:t>
+            </a:r>
+            <a:endParaRPr lang="en-US"/>
+          </a:p>
+        </p:txBody>
+      </p:sp>
+      <p:sp>
+        <p:nvSpPr>
+          <p:cNvPr id="3" name="Text Placeholder 2"/>
+          <p:cNvSpPr>
+            <a:spLocks noGrp="1"/>
+          </p:cNvSpPr>
+          <p:nvPr>
+            <p:ph type="body" idx="1"/>
+          </p:nvPr>
+        </p:nvSpPr>
+        <p:spPr>
+          <a:xfrm>
+            <a:off x="609600" y="1600201"/>
+            <a:ext cx="10972800" cy="4525963"/>
+          </a:xfrm>
+          <a:prstGeom prst="rect">
+            <a:avLst/>
+          </a:prstGeom>
+        </p:spPr>
+        <p:txBody>
+          <a:bodyPr vert="horz" lIns="91440" tIns="45720" rIns="91440" bIns="45720" rtlCol="0">
+            <a:normAutofit/>
+          </a:bodyPr>
+          <a:lstStyle/>
+          <a:p>
+            <a:pPr lvl="0"/>
+            <a:r>
+              <a:rPr lang="en-US" smtClean="0"/>
+              <a:t>Click to edit Master text styles</a:t>
+            </a:r>
+          </a:p>
+          <a:p>
+            <a:pPr lvl="1"/>
+            <a:r>
+              <a:rPr lang="en-US" smtClean="0"/>
+              <a:t>Second level</a:t>
+            </a:r>
+          </a:p>
+          <a:p>
+            <a:pPr lvl="2"/>
+            <a:r>
+              <a:rPr lang="en-US" smtClean="0"/>
+              <a:t>Third level</a:t>
+            </a:r>
+          </a:p>
+          <a:p>
+            <a:pPr lvl="3"/>
+            <a:r>
+              <a:rPr lang="en-US" smtClean="0"/>
+              <a:t>Fourth level</a:t>
+            </a:r>
+          </a:p>
+          <a:p>
+            <a:pPr lvl="4"/>
+            <a:r>
+              <a:rPr lang="en-US" smtClean="0"/>
+              <a:t>Fifth level</a:t>
+            </a:r>
+            <a:endParaRPr lang="en-US"/>
+          </a:p>
+        </p:txBody>
+      </p:sp>
+      <p:sp>
+        <p:nvSpPr>
+          <p:cNvPr id="4" name="Date Placeholder 3"/>
+          <p:cNvSpPr>
+            <a:spLocks noGrp="1"/>
+          </p:cNvSpPr>
+          <p:nvPr>
+            <p:ph type="dt" sz="half" idx="2"/>
+          </p:nvPr>
+        </p:nvSpPr>
+        <p:spPr>
+          <a:xfrm>
+            <a:off x="609600" y="6356351"/>
+            <a:ext cx="2844800" cy="365125"/>
+          </a:xfrm>
+          <a:prstGeom prst="rect">
+            <a:avLst/>
+          </a:prstGeom>
+        </p:spPr>
+        <p:txBody>
+          <a:bodyPr vert="horz" lIns="91440" tIns="45720" rIns="91440" bIns="45720" rtlCol="0" anchor="ctr"/>
+          <a:lstStyle>
+            <a:lvl1pPr algn="l">
+              <a:defRPr sz="1600">
+                <a:solidFill>
+                  <a:schemeClr val="tx1">
+                    <a:tint val="75000"/>
+                  </a:schemeClr>
+                </a:solidFill>
+              </a:defRPr>
+            </a:lvl1pPr>
+          </a:lstStyle>
+          <a:p>
+            <a:pPr defTabSz="609585"/>
+            <a:fld id="{F642DA6E-6CD9-7C41-9FD8-01D28C61CAEF}" type="datetimeFigureOut">
+              <a:rPr lang="en-US" smtClean="0">
+                <a:solidFill>
+                  <a:prstClr val="black">
+                    <a:tint val="75000"/>
+                  </a:prstClr>
+                </a:solidFill>
+              </a:rPr>
+              <a:pPr defTabSz="609585"/>
+              <a:t>3/1/2016</a:t>
+            </a:fld>
+            <a:endParaRPr lang="en-US">
+              <a:solidFill>
+                <a:prstClr val="black">
+                  <a:tint val="75000"/>
+                </a:prstClr>
+              </a:solidFill>
+            </a:endParaRPr>
+          </a:p>
+        </p:txBody>
+      </p:sp>
+      <p:sp>
+        <p:nvSpPr>
+          <p:cNvPr id="5" name="Footer Placeholder 4"/>
+          <p:cNvSpPr>
+            <a:spLocks noGrp="1"/>
+          </p:cNvSpPr>
+          <p:nvPr>
+            <p:ph type="ftr" sz="quarter" idx="3"/>
+          </p:nvPr>
+        </p:nvSpPr>
+        <p:spPr>
+          <a:xfrm>
+            <a:off x="4165600" y="6356351"/>
+            <a:ext cx="3860800" cy="365125"/>
+          </a:xfrm>
+          <a:prstGeom prst="rect">
+            <a:avLst/>
+          </a:prstGeom>
+        </p:spPr>
+        <p:txBody>
+          <a:bodyPr vert="horz" lIns="91440" tIns="45720" rIns="91440" bIns="45720" rtlCol="0" anchor="ctr"/>
+          <a:lstStyle>
+            <a:lvl1pPr algn="ctr">
+              <a:defRPr sz="1600">
+                <a:solidFill>
+                  <a:schemeClr val="tx1">
+                    <a:tint val="75000"/>
+                  </a:schemeClr>
+                </a:solidFill>
+              </a:defRPr>
+            </a:lvl1pPr>
+          </a:lstStyle>
+          <a:p>
+            <a:pPr defTabSz="609585"/>
+            <a:endParaRPr lang="en-US">
+              <a:solidFill>
+                <a:prstClr val="black">
+                  <a:tint val="75000"/>
+                </a:prstClr>
+              </a:solidFill>
+            </a:endParaRPr>
+          </a:p>
+        </p:txBody>
+      </p:sp>
+      <p:sp>
+        <p:nvSpPr>
+          <p:cNvPr id="6" name="Slide Number Placeholder 5"/>
+          <p:cNvSpPr>
+            <a:spLocks noGrp="1"/>
+          </p:cNvSpPr>
+          <p:nvPr>
+            <p:ph type="sldNum" sz="quarter" idx="4"/>
+          </p:nvPr>
+        </p:nvSpPr>
+        <p:spPr>
+          <a:xfrm>
+            <a:off x="8737600" y="6356351"/>
+            <a:ext cx="2844800" cy="365125"/>
+          </a:xfrm>
+          <a:prstGeom prst="rect">
+            <a:avLst/>
+          </a:prstGeom>
+        </p:spPr>
+        <p:txBody>
+          <a:bodyPr vert="horz" lIns="91440" tIns="45720" rIns="91440" bIns="45720" rtlCol="0" anchor="ctr"/>
+          <a:lstStyle>
+            <a:lvl1pPr algn="r">
+              <a:defRPr sz="1600">
+                <a:solidFill>
+                  <a:schemeClr val="tx1">
+                    <a:tint val="75000"/>
+                  </a:schemeClr>
+                </a:solidFill>
+              </a:defRPr>
+            </a:lvl1pPr>
+          </a:lstStyle>
+          <a:p>
+            <a:pPr defTabSz="609585"/>
+            <a:fld id="{CE3CCD67-A99C-7B4C-9065-78DD3F082118}" type="slidenum">
+              <a:rPr lang="en-US" smtClean="0">
+                <a:solidFill>
+                  <a:prstClr val="black">
+                    <a:tint val="75000"/>
+                  </a:prstClr>
+                </a:solidFill>
+              </a:rPr>
+              <a:pPr defTabSz="609585"/>
+              <a:t>‹#›</a:t>
+            </a:fld>
+            <a:endParaRPr lang="en-US">
+              <a:solidFill>
+                <a:prstClr val="black">
+                  <a:tint val="75000"/>
+                </a:prstClr>
+              </a:solidFill>
+            </a:endParaRPr>
+          </a:p>
+        </p:txBody>
+      </p:sp>
+    </p:spTree>
+    <p:extLst>
+      <p:ext uri="{BB962C8B-B14F-4D97-AF65-F5344CB8AC3E}">
+        <p14:creationId xmlns:p14="http://schemas.microsoft.com/office/powerpoint/2010/main" val="1779908039"/>
+      </p:ext>
+    </p:extLst>
+  </p:cSld>
+  <p:clrMap bg1="lt1" tx1="dk1" bg2="lt2" tx2="dk2" accent1="accent1" accent2="accent2" accent3="accent3" accent4="accent4" accent5="accent5" accent6="accent6" hlink="hlink" folHlink="folHlink"/>
+  <p:sldLayoutIdLst>
+    <p:sldLayoutId id="2147483661" r:id="rId1"/>
+    <p:sldLayoutId id="2147483662" r:id="rId2"/>
+    <p:sldLayoutId id="2147483663" r:id="rId3"/>
+    <p:sldLayoutId id="2147483664" r:id="rId4"/>
+    <p:sldLayoutId id="2147483665" r:id="rId5"/>
+    <p:sldLayoutId id="2147483666" r:id="rId6"/>
+    <p:sldLayoutId id="2147483667" r:id="rId7"/>
+    <p:sldLayoutId id="2147483668" r:id="rId8"/>
+    <p:sldLayoutId id="2147483669" r:id="rId9"/>
+    <p:sldLayoutId id="2147483670" r:id="rId10"/>
+    <p:sldLayoutId id="2147483671" r:id="rId11"/>
+  </p:sldLayoutIdLst>
+  <p:txStyles>
+    <p:titleStyle>
+      <a:lvl1pPr algn="ctr" defTabSz="609585" rtl="0" eaLnBrk="1" latinLnBrk="0" hangingPunct="1">
+        <a:spcBef>
+          <a:spcPct val="0"/>
+        </a:spcBef>
+        <a:buNone/>
+        <a:defRPr sz="5867" kern="1200">
+          <a:solidFill>
+            <a:schemeClr val="tx1"/>
+          </a:solidFill>
+          <a:latin typeface="+mj-lt"/>
+          <a:ea typeface="+mj-ea"/>
+          <a:cs typeface="+mj-cs"/>
+        </a:defRPr>
+      </a:lvl1pPr>
+    </p:titleStyle>
+    <p:bodyStyle>
+      <a:lvl1pPr marL="457189" indent="-457189" algn="l" defTabSz="609585" rtl="0" eaLnBrk="1" latinLnBrk="0" hangingPunct="1">
+        <a:spcBef>
+          <a:spcPct val="20000"/>
+        </a:spcBef>
+        <a:buFont typeface="Arial"/>
+        <a:buChar char="•"/>
+        <a:defRPr sz="4267" kern="1200">
+          <a:solidFill>
+            <a:schemeClr val="tx1"/>
+          </a:solidFill>
+          <a:latin typeface="+mn-lt"/>
+          <a:ea typeface="+mn-ea"/>
+          <a:cs typeface="+mn-cs"/>
+        </a:defRPr>
+      </a:lvl1pPr>
+      <a:lvl2pPr marL="990575" indent="-380990" algn="l" defTabSz="609585" rtl="0" eaLnBrk="1" latinLnBrk="0" hangingPunct="1">
+        <a:spcBef>
+          <a:spcPct val="20000"/>
+        </a:spcBef>
+        <a:buFont typeface="Arial"/>
+        <a:buChar char="–"/>
+        <a:defRPr sz="3733" kern="1200">
+          <a:solidFill>
+            <a:schemeClr val="tx1"/>
+          </a:solidFill>
+          <a:latin typeface="+mn-lt"/>
+          <a:ea typeface="+mn-ea"/>
+          <a:cs typeface="+mn-cs"/>
+        </a:defRPr>
+      </a:lvl2pPr>
+      <a:lvl3pPr marL="1523962" indent="-304792" algn="l" defTabSz="609585" rtl="0" eaLnBrk="1" latinLnBrk="0" hangingPunct="1">
+        <a:spcBef>
+          <a:spcPct val="20000"/>
+        </a:spcBef>
+        <a:buFont typeface="Arial"/>
+        <a:buChar char="•"/>
+        <a:defRPr sz="3200" kern="1200">
+          <a:solidFill>
+            <a:schemeClr val="tx1"/>
+          </a:solidFill>
+          <a:latin typeface="+mn-lt"/>
+          <a:ea typeface="+mn-ea"/>
+          <a:cs typeface="+mn-cs"/>
+        </a:defRPr>
+      </a:lvl3pPr>
+      <a:lvl4pPr marL="2133547" indent="-304792" algn="l" defTabSz="609585" rtl="0" eaLnBrk="1" latinLnBrk="0" hangingPunct="1">
+        <a:spcBef>
+          <a:spcPct val="20000"/>
+        </a:spcBef>
+        <a:buFont typeface="Arial"/>
+        <a:buChar char="–"/>
+        <a:defRPr sz="2667" kern="1200">
+          <a:solidFill>
+            <a:schemeClr val="tx1"/>
+          </a:solidFill>
+          <a:latin typeface="+mn-lt"/>
+          <a:ea typeface="+mn-ea"/>
+          <a:cs typeface="+mn-cs"/>
+        </a:defRPr>
+      </a:lvl4pPr>
+      <a:lvl5pPr marL="2743131" indent="-304792" algn="l" defTabSz="609585" rtl="0" eaLnBrk="1" latinLnBrk="0" hangingPunct="1">
+        <a:spcBef>
+          <a:spcPct val="20000"/>
+        </a:spcBef>
+        <a:buFont typeface="Arial"/>
+        <a:buChar char="»"/>
+        <a:defRPr sz="2667" kern="1200">
+          <a:solidFill>
+            <a:schemeClr val="tx1"/>
+          </a:solidFill>
+          <a:latin typeface="+mn-lt"/>
+          <a:ea typeface="+mn-ea"/>
+          <a:cs typeface="+mn-cs"/>
+        </a:defRPr>
+      </a:lvl5pPr>
+      <a:lvl6pPr marL="3352716" indent="-304792" algn="l" defTabSz="609585" rtl="0" eaLnBrk="1" latinLnBrk="0" hangingPunct="1">
+        <a:spcBef>
+          <a:spcPct val="20000"/>
+        </a:spcBef>
+        <a:buFont typeface="Arial"/>
+        <a:buChar char="•"/>
+        <a:defRPr sz="2667" kern="1200">
+          <a:solidFill>
+            <a:schemeClr val="tx1"/>
+          </a:solidFill>
+          <a:latin typeface="+mn-lt"/>
+          <a:ea typeface="+mn-ea"/>
+          <a:cs typeface="+mn-cs"/>
+        </a:defRPr>
+      </a:lvl6pPr>
+      <a:lvl7pPr marL="3962301" indent="-304792" algn="l" defTabSz="609585" rtl="0" eaLnBrk="1" latinLnBrk="0" hangingPunct="1">
+        <a:spcBef>
+          <a:spcPct val="20000"/>
+        </a:spcBef>
+        <a:buFont typeface="Arial"/>
+        <a:buChar char="•"/>
+        <a:defRPr sz="2667" kern="1200">
+          <a:solidFill>
+            <a:schemeClr val="tx1"/>
+          </a:solidFill>
+          <a:latin typeface="+mn-lt"/>
+          <a:ea typeface="+mn-ea"/>
+          <a:cs typeface="+mn-cs"/>
+        </a:defRPr>
+      </a:lvl7pPr>
+      <a:lvl8pPr marL="4571886" indent="-304792" algn="l" defTabSz="609585" rtl="0" eaLnBrk="1" latinLnBrk="0" hangingPunct="1">
+        <a:spcBef>
+          <a:spcPct val="20000"/>
+        </a:spcBef>
+        <a:buFont typeface="Arial"/>
+        <a:buChar char="•"/>
+        <a:defRPr sz="2667" kern="1200">
+          <a:solidFill>
+            <a:schemeClr val="tx1"/>
+          </a:solidFill>
+          <a:latin typeface="+mn-lt"/>
+          <a:ea typeface="+mn-ea"/>
+          <a:cs typeface="+mn-cs"/>
+        </a:defRPr>
+      </a:lvl8pPr>
+      <a:lvl9pPr marL="5181470" indent="-304792" algn="l" defTabSz="609585" rtl="0" eaLnBrk="1" latinLnBrk="0" hangingPunct="1">
+        <a:spcBef>
+          <a:spcPct val="20000"/>
+        </a:spcBef>
+        <a:buFont typeface="Arial"/>
+        <a:buChar char="•"/>
+        <a:defRPr sz="2667" kern="1200">
+          <a:solidFill>
+            <a:schemeClr val="tx1"/>
+          </a:solidFill>
+          <a:latin typeface="+mn-lt"/>
+          <a:ea typeface="+mn-ea"/>
+          <a:cs typeface="+mn-cs"/>
+        </a:defRPr>
+      </a:lvl9pPr>
+    </p:bodyStyle>
+    <p:otherStyle>
+      <a:defPPr>
+        <a:defRPr lang="en-US"/>
+      </a:defPPr>
+      <a:lvl1pPr marL="0" algn="l" defTabSz="609585" rtl="0" eaLnBrk="1" latinLnBrk="0" hangingPunct="1">
+        <a:defRPr sz="2400" kern="1200">
+          <a:solidFill>
+            <a:schemeClr val="tx1"/>
+          </a:solidFill>
+          <a:latin typeface="+mn-lt"/>
+          <a:ea typeface="+mn-ea"/>
+          <a:cs typeface="+mn-cs"/>
+        </a:defRPr>
+      </a:lvl1pPr>
+      <a:lvl2pPr marL="609585" algn="l" defTabSz="609585" rtl="0" eaLnBrk="1" latinLnBrk="0" hangingPunct="1">
+        <a:defRPr sz="2400" kern="1200">
+          <a:solidFill>
+            <a:schemeClr val="tx1"/>
+          </a:solidFill>
+          <a:latin typeface="+mn-lt"/>
+          <a:ea typeface="+mn-ea"/>
+          <a:cs typeface="+mn-cs"/>
+        </a:defRPr>
+      </a:lvl2pPr>
+      <a:lvl3pPr marL="1219170" algn="l" defTabSz="609585" rtl="0" eaLnBrk="1" latinLnBrk="0" hangingPunct="1">
+        <a:defRPr sz="2400" kern="1200">
+          <a:solidFill>
+            <a:schemeClr val="tx1"/>
+          </a:solidFill>
+          <a:latin typeface="+mn-lt"/>
+          <a:ea typeface="+mn-ea"/>
+          <a:cs typeface="+mn-cs"/>
+        </a:defRPr>
+      </a:lvl3pPr>
+      <a:lvl4pPr marL="1828754" algn="l" defTabSz="609585" rtl="0" eaLnBrk="1" latinLnBrk="0" hangingPunct="1">
+        <a:defRPr sz="2400" kern="1200">
+          <a:solidFill>
+            <a:schemeClr val="tx1"/>
+          </a:solidFill>
+          <a:latin typeface="+mn-lt"/>
+          <a:ea typeface="+mn-ea"/>
+          <a:cs typeface="+mn-cs"/>
+        </a:defRPr>
+      </a:lvl4pPr>
+      <a:lvl5pPr marL="2438339" algn="l" defTabSz="609585" rtl="0" eaLnBrk="1" latinLnBrk="0" hangingPunct="1">
+        <a:defRPr sz="2400" kern="1200">
+          <a:solidFill>
+            <a:schemeClr val="tx1"/>
+          </a:solidFill>
+          <a:latin typeface="+mn-lt"/>
+          <a:ea typeface="+mn-ea"/>
+          <a:cs typeface="+mn-cs"/>
+        </a:defRPr>
+      </a:lvl5pPr>
+      <a:lvl6pPr marL="3047924" algn="l" defTabSz="609585" rtl="0" eaLnBrk="1" latinLnBrk="0" hangingPunct="1">
+        <a:defRPr sz="2400" kern="1200">
+          <a:solidFill>
+            <a:schemeClr val="tx1"/>
+          </a:solidFill>
+          <a:latin typeface="+mn-lt"/>
+          <a:ea typeface="+mn-ea"/>
+          <a:cs typeface="+mn-cs"/>
+        </a:defRPr>
+      </a:lvl6pPr>
+      <a:lvl7pPr marL="3657509" algn="l" defTabSz="609585" rtl="0" eaLnBrk="1" latinLnBrk="0" hangingPunct="1">
+        <a:defRPr sz="2400" kern="1200">
+          <a:solidFill>
+            <a:schemeClr val="tx1"/>
+          </a:solidFill>
+          <a:latin typeface="+mn-lt"/>
+          <a:ea typeface="+mn-ea"/>
+          <a:cs typeface="+mn-cs"/>
+        </a:defRPr>
+      </a:lvl7pPr>
+      <a:lvl8pPr marL="4267093" algn="l" defTabSz="609585" rtl="0" eaLnBrk="1" latinLnBrk="0" hangingPunct="1">
+        <a:defRPr sz="2400" kern="1200">
+          <a:solidFill>
+            <a:schemeClr val="tx1"/>
+          </a:solidFill>
+          <a:latin typeface="+mn-lt"/>
+          <a:ea typeface="+mn-ea"/>
+          <a:cs typeface="+mn-cs"/>
+        </a:defRPr>
+      </a:lvl8pPr>
+      <a:lvl9pPr marL="4876678" algn="l" defTabSz="609585" rtl="0" eaLnBrk="1" latinLnBrk="0" hangingPunct="1">
+        <a:defRPr sz="2400" kern="1200">
           <a:solidFill>
             <a:schemeClr val="tx1"/>
           </a:solidFill>
@@ -4523,6 +7888,400 @@
 </p:sld>
 </file>
 
+<file path=ppt/slides/slide8.xml><?xml version="1.0" encoding="utf-8"?>
+<p:sld xmlns:a="http://schemas.openxmlformats.org/drawingml/2006/main" xmlns:r="http://schemas.openxmlformats.org/officeDocument/2006/relationships" xmlns:p="http://schemas.openxmlformats.org/presentationml/2006/main">
+  <p:cSld>
+    <p:bg>
+      <p:bgPr>
+        <a:solidFill>
+          <a:srgbClr val="CDDD45"/>
+        </a:solidFill>
+        <a:effectLst/>
+      </p:bgPr>
+    </p:bg>
+    <p:spTree>
+      <p:nvGrpSpPr>
+        <p:cNvPr id="1" name=""/>
+        <p:cNvGrpSpPr/>
+        <p:nvPr/>
+      </p:nvGrpSpPr>
+      <p:grpSpPr>
+        <a:xfrm>
+          <a:off x="0" y="0"/>
+          <a:ext cx="0" cy="0"/>
+          <a:chOff x="0" y="0"/>
+          <a:chExt cx="0" cy="0"/>
+        </a:xfrm>
+      </p:grpSpPr>
+      <p:pic>
+        <p:nvPicPr>
+          <p:cNvPr id="7" name="Picture 6"/>
+          <p:cNvPicPr>
+            <a:picLocks noChangeAspect="1"/>
+          </p:cNvPicPr>
+          <p:nvPr/>
+        </p:nvPicPr>
+        <p:blipFill>
+          <a:blip r:embed="rId2"/>
+          <a:stretch>
+            <a:fillRect/>
+          </a:stretch>
+        </p:blipFill>
+        <p:spPr>
+          <a:xfrm>
+            <a:off x="0" y="0"/>
+            <a:ext cx="12192000" cy="6858000"/>
+          </a:xfrm>
+          <a:prstGeom prst="rect">
+            <a:avLst/>
+          </a:prstGeom>
+        </p:spPr>
+      </p:pic>
+      <p:pic>
+        <p:nvPicPr>
+          <p:cNvPr id="8" name="Picture 7"/>
+          <p:cNvPicPr>
+            <a:picLocks noChangeAspect="1"/>
+          </p:cNvPicPr>
+          <p:nvPr/>
+        </p:nvPicPr>
+        <p:blipFill rotWithShape="1">
+          <a:blip r:embed="rId3"/>
+          <a:srcRect t="-957" b="-957"/>
+          <a:stretch/>
+        </p:blipFill>
+        <p:spPr>
+          <a:xfrm rot="20862665">
+            <a:off x="-631980" y="892578"/>
+            <a:ext cx="20738979" cy="5072844"/>
+          </a:xfrm>
+          <a:prstGeom prst="rect">
+            <a:avLst/>
+          </a:prstGeom>
+          <a:effectLst>
+            <a:glow rad="63500">
+              <a:schemeClr val="bg1">
+                <a:alpha val="19000"/>
+              </a:schemeClr>
+            </a:glow>
+            <a:softEdge rad="12700"/>
+          </a:effectLst>
+        </p:spPr>
+      </p:pic>
+      <p:sp>
+        <p:nvSpPr>
+          <p:cNvPr id="39" name="Title 3"/>
+          <p:cNvSpPr txBox="1">
+            <a:spLocks/>
+          </p:cNvSpPr>
+          <p:nvPr/>
+        </p:nvSpPr>
+        <p:spPr>
+          <a:xfrm>
+            <a:off x="3859451" y="1473200"/>
+            <a:ext cx="4168299" cy="4334933"/>
+          </a:xfrm>
+          <a:prstGeom prst="rect">
+            <a:avLst/>
+          </a:prstGeom>
+        </p:spPr>
+        <p:txBody>
+          <a:bodyPr vert="horz" lIns="121920" tIns="60960" rIns="121920" bIns="60960" rtlCol="0" anchor="ctr">
+            <a:noAutofit/>
+          </a:bodyPr>
+          <a:lstStyle/>
+          <a:p>
+            <a:pPr algn="ctr">
+              <a:spcBef>
+                <a:spcPct val="0"/>
+              </a:spcBef>
+              <a:defRPr/>
+            </a:pPr>
+            <a:endParaRPr lang="en-CA" sz="39999" b="1" dirty="0">
+              <a:solidFill>
+                <a:srgbClr val="7F7F7F"/>
+              </a:solidFill>
+              <a:latin typeface="Times"/>
+              <a:cs typeface="Times"/>
+            </a:endParaRPr>
+          </a:p>
+        </p:txBody>
+      </p:sp>
+      <p:pic>
+        <p:nvPicPr>
+          <p:cNvPr id="2" name="Picture 1"/>
+          <p:cNvPicPr>
+            <a:picLocks noChangeAspect="1"/>
+          </p:cNvPicPr>
+          <p:nvPr/>
+        </p:nvPicPr>
+        <p:blipFill>
+          <a:blip r:embed="rId4"/>
+          <a:stretch>
+            <a:fillRect/>
+          </a:stretch>
+        </p:blipFill>
+        <p:spPr>
+          <a:xfrm>
+            <a:off x="9071203" y="309930"/>
+            <a:ext cx="2840492" cy="694796"/>
+          </a:xfrm>
+          <a:prstGeom prst="rect">
+            <a:avLst/>
+          </a:prstGeom>
+        </p:spPr>
+      </p:pic>
+      <p:sp>
+        <p:nvSpPr>
+          <p:cNvPr id="9" name="TextBox 8"/>
+          <p:cNvSpPr txBox="1"/>
+          <p:nvPr/>
+        </p:nvSpPr>
+        <p:spPr>
+          <a:xfrm>
+            <a:off x="3361442" y="1581871"/>
+            <a:ext cx="5399491" cy="748988"/>
+          </a:xfrm>
+          <a:prstGeom prst="rect">
+            <a:avLst/>
+          </a:prstGeom>
+          <a:noFill/>
+          <a:effectLst>
+            <a:outerShdw blurRad="63500" dist="25400" dir="3600000" algn="ctr" rotWithShape="0">
+              <a:schemeClr val="tx1">
+                <a:alpha val="85000"/>
+              </a:schemeClr>
+            </a:outerShdw>
+          </a:effectLst>
+        </p:spPr>
+        <p:txBody>
+          <a:bodyPr wrap="none" rtlCol="0">
+            <a:spAutoFit/>
+          </a:bodyPr>
+          <a:lstStyle/>
+          <a:p>
+            <a:pPr defTabSz="609585"/>
+            <a:r>
+              <a:rPr lang="en-CA" sz="4267" dirty="0">
+                <a:solidFill>
+                  <a:prstClr val="white"/>
+                </a:solidFill>
+                <a:latin typeface="Tahoma" panose="020B0604030504040204" pitchFamily="34" charset="0"/>
+                <a:ea typeface="Tahoma" panose="020B0604030504040204" pitchFamily="34" charset="0"/>
+                <a:cs typeface="Tahoma" panose="020B0604030504040204" pitchFamily="34" charset="0"/>
+              </a:rPr>
+              <a:t>Evaluate the Sessions</a:t>
+            </a:r>
+          </a:p>
+        </p:txBody>
+      </p:sp>
+      <p:sp>
+        <p:nvSpPr>
+          <p:cNvPr id="15" name="TextBox 14"/>
+          <p:cNvSpPr txBox="1"/>
+          <p:nvPr/>
+        </p:nvSpPr>
+        <p:spPr>
+          <a:xfrm>
+            <a:off x="2271631" y="2885023"/>
+            <a:ext cx="8875058" cy="748988"/>
+          </a:xfrm>
+          <a:prstGeom prst="rect">
+            <a:avLst/>
+          </a:prstGeom>
+          <a:noFill/>
+          <a:effectLst>
+            <a:outerShdw blurRad="63500" dist="25400" dir="3600000" algn="ctr" rotWithShape="0">
+              <a:schemeClr val="tx1">
+                <a:alpha val="85000"/>
+              </a:schemeClr>
+            </a:outerShdw>
+          </a:effectLst>
+        </p:spPr>
+        <p:txBody>
+          <a:bodyPr wrap="none" rtlCol="0">
+            <a:spAutoFit/>
+          </a:bodyPr>
+          <a:lstStyle/>
+          <a:p>
+            <a:pPr defTabSz="609585"/>
+            <a:r>
+              <a:rPr lang="en-CA" sz="4267" dirty="0">
+                <a:solidFill>
+                  <a:prstClr val="white"/>
+                </a:solidFill>
+                <a:latin typeface="Tahoma" panose="020B0604030504040204" pitchFamily="34" charset="0"/>
+                <a:ea typeface="Tahoma" panose="020B0604030504040204" pitchFamily="34" charset="0"/>
+                <a:cs typeface="Tahoma" panose="020B0604030504040204" pitchFamily="34" charset="0"/>
+              </a:rPr>
+              <a:t>Sign in and vote at </a:t>
+            </a:r>
+            <a:r>
+              <a:rPr lang="en-CA" sz="4267" b="1" dirty="0">
+                <a:solidFill>
+                  <a:prstClr val="white"/>
+                </a:solidFill>
+                <a:latin typeface="Tahoma" panose="020B0604030504040204" pitchFamily="34" charset="0"/>
+                <a:ea typeface="Tahoma" panose="020B0604030504040204" pitchFamily="34" charset="0"/>
+                <a:cs typeface="Tahoma" panose="020B0604030504040204" pitchFamily="34" charset="0"/>
+              </a:rPr>
+              <a:t>eclipsecon.org</a:t>
+            </a:r>
+          </a:p>
+        </p:txBody>
+      </p:sp>
+      <p:sp>
+        <p:nvSpPr>
+          <p:cNvPr id="19" name="TextBox 18"/>
+          <p:cNvSpPr txBox="1"/>
+          <p:nvPr/>
+        </p:nvSpPr>
+        <p:spPr>
+          <a:xfrm>
+            <a:off x="3566888" y="4404333"/>
+            <a:ext cx="2021707" cy="1897892"/>
+          </a:xfrm>
+          <a:prstGeom prst="rect">
+            <a:avLst/>
+          </a:prstGeom>
+          <a:noFill/>
+          <a:effectLst>
+            <a:outerShdw blurRad="63500" dist="25400" dir="3600000" algn="ctr" rotWithShape="0">
+              <a:schemeClr val="tx1">
+                <a:alpha val="85000"/>
+              </a:schemeClr>
+            </a:outerShdw>
+          </a:effectLst>
+        </p:spPr>
+        <p:txBody>
+          <a:bodyPr wrap="none" rtlCol="0">
+            <a:spAutoFit/>
+          </a:bodyPr>
+          <a:lstStyle/>
+          <a:p>
+            <a:pPr defTabSz="609585"/>
+            <a:r>
+              <a:rPr lang="en-CA" sz="11733" dirty="0">
+                <a:solidFill>
+                  <a:prstClr val="white"/>
+                </a:solidFill>
+                <a:latin typeface="Tahoma" panose="020B0604030504040204" pitchFamily="34" charset="0"/>
+                <a:ea typeface="Tahoma" panose="020B0604030504040204" pitchFamily="34" charset="0"/>
+                <a:cs typeface="Tahoma" panose="020B0604030504040204" pitchFamily="34" charset="0"/>
+              </a:rPr>
+              <a:t>- 1</a:t>
+            </a:r>
+          </a:p>
+        </p:txBody>
+      </p:sp>
+      <p:sp>
+        <p:nvSpPr>
+          <p:cNvPr id="22" name="TextBox 21"/>
+          <p:cNvSpPr txBox="1"/>
+          <p:nvPr/>
+        </p:nvSpPr>
+        <p:spPr>
+          <a:xfrm>
+            <a:off x="8626983" y="4404333"/>
+            <a:ext cx="2569934" cy="1897892"/>
+          </a:xfrm>
+          <a:prstGeom prst="rect">
+            <a:avLst/>
+          </a:prstGeom>
+          <a:noFill/>
+          <a:effectLst>
+            <a:outerShdw blurRad="63500" dist="25400" dir="3600000" algn="ctr" rotWithShape="0">
+              <a:schemeClr val="tx1">
+                <a:alpha val="85000"/>
+              </a:schemeClr>
+            </a:outerShdw>
+          </a:effectLst>
+        </p:spPr>
+        <p:txBody>
+          <a:bodyPr wrap="none" rtlCol="0">
+            <a:spAutoFit/>
+          </a:bodyPr>
+          <a:lstStyle/>
+          <a:p>
+            <a:pPr defTabSz="609585"/>
+            <a:r>
+              <a:rPr lang="en-CA" sz="11733" dirty="0">
+                <a:solidFill>
+                  <a:prstClr val="white"/>
+                </a:solidFill>
+                <a:latin typeface="Tahoma" panose="020B0604030504040204" pitchFamily="34" charset="0"/>
+                <a:ea typeface="Tahoma" panose="020B0604030504040204" pitchFamily="34" charset="0"/>
+                <a:cs typeface="Tahoma" panose="020B0604030504040204" pitchFamily="34" charset="0"/>
+              </a:rPr>
+              <a:t>+ 1</a:t>
+            </a:r>
+          </a:p>
+        </p:txBody>
+      </p:sp>
+      <p:sp>
+        <p:nvSpPr>
+          <p:cNvPr id="10" name="TextBox 9"/>
+          <p:cNvSpPr txBox="1"/>
+          <p:nvPr/>
+        </p:nvSpPr>
+        <p:spPr>
+          <a:xfrm>
+            <a:off x="6749541" y="4435160"/>
+            <a:ext cx="1005403" cy="1897892"/>
+          </a:xfrm>
+          <a:prstGeom prst="rect">
+            <a:avLst/>
+          </a:prstGeom>
+          <a:noFill/>
+          <a:effectLst>
+            <a:outerShdw blurRad="63500" dist="25400" dir="3600000" algn="ctr" rotWithShape="0">
+              <a:schemeClr val="tx1">
+                <a:alpha val="85000"/>
+              </a:schemeClr>
+            </a:outerShdw>
+          </a:effectLst>
+        </p:spPr>
+        <p:txBody>
+          <a:bodyPr wrap="none" rtlCol="0">
+            <a:spAutoFit/>
+          </a:bodyPr>
+          <a:lstStyle/>
+          <a:p>
+            <a:pPr defTabSz="609585"/>
+            <a:r>
+              <a:rPr lang="en-CA" sz="11733" dirty="0">
+                <a:solidFill>
+                  <a:prstClr val="white"/>
+                </a:solidFill>
+                <a:latin typeface="Tahoma" panose="020B0604030504040204" pitchFamily="34" charset="0"/>
+                <a:ea typeface="Tahoma" panose="020B0604030504040204" pitchFamily="34" charset="0"/>
+                <a:cs typeface="Tahoma" panose="020B0604030504040204" pitchFamily="34" charset="0"/>
+              </a:rPr>
+              <a:t>0</a:t>
+            </a:r>
+          </a:p>
+        </p:txBody>
+      </p:sp>
+    </p:spTree>
+    <p:extLst>
+      <p:ext uri="{BB962C8B-B14F-4D97-AF65-F5344CB8AC3E}">
+        <p14:creationId xmlns:p14="http://schemas.microsoft.com/office/powerpoint/2010/main" val="313739013"/>
+      </p:ext>
+    </p:extLst>
+  </p:cSld>
+  <p:clrMapOvr>
+    <a:masterClrMapping/>
+  </p:clrMapOvr>
+  <p:timing>
+    <p:tnLst>
+      <p:par>
+        <p:cTn id="1" dur="indefinite" restart="never" nodeType="tmRoot"/>
+      </p:par>
+    </p:tnLst>
+  </p:timing>
+</p:sld>
+</file>
+
 <file path=ppt/theme/theme1.xml><?xml version="1.0" encoding="utf-8"?>
 <a:theme xmlns:a="http://schemas.openxmlformats.org/drawingml/2006/main" name="Office Theme">
   <a:themeElements>
@@ -4782,4 +8541,322 @@
     </a:ext>
   </a:extLst>
 </a:theme>
+</file>
+
+<file path=ppt/theme/theme2.xml><?xml version="1.0" encoding="utf-8"?>
+<a:theme xmlns:a="http://schemas.openxmlformats.org/drawingml/2006/main" name="1_Office Theme">
+  <a:themeElements>
+    <a:clrScheme name="Office">
+      <a:dk1>
+        <a:sysClr val="windowText" lastClr="000000"/>
+      </a:dk1>
+      <a:lt1>
+        <a:sysClr val="window" lastClr="FFFFFF"/>
+      </a:lt1>
+      <a:dk2>
+        <a:srgbClr val="1F497D"/>
+      </a:dk2>
+      <a:lt2>
+        <a:srgbClr val="EEECE1"/>
+      </a:lt2>
+      <a:accent1>
+        <a:srgbClr val="4F81BD"/>
+      </a:accent1>
+      <a:accent2>
+        <a:srgbClr val="C0504D"/>
+      </a:accent2>
+      <a:accent3>
+        <a:srgbClr val="9BBB59"/>
+      </a:accent3>
+      <a:accent4>
+        <a:srgbClr val="8064A2"/>
+      </a:accent4>
+      <a:accent5>
+        <a:srgbClr val="4BACC6"/>
+      </a:accent5>
+      <a:accent6>
+        <a:srgbClr val="F79646"/>
+      </a:accent6>
+      <a:hlink>
+        <a:srgbClr val="0000FF"/>
+      </a:hlink>
+      <a:folHlink>
+        <a:srgbClr val="800080"/>
+      </a:folHlink>
+    </a:clrScheme>
+    <a:fontScheme name="Office">
+      <a:majorFont>
+        <a:latin typeface="Calibri"/>
+        <a:ea typeface=""/>
+        <a:cs typeface=""/>
+        <a:font script="Jpan" typeface="ＭＳ Ｐゴシック"/>
+        <a:font script="Hang" typeface="맑은 고딕"/>
+        <a:font script="Hans" typeface="宋体"/>
+        <a:font script="Hant" typeface="新細明體"/>
+        <a:font script="Arab" typeface="Times New Roman"/>
+        <a:font script="Hebr" typeface="Times New Roman"/>
+        <a:font script="Thai" typeface="Angsana New"/>
+        <a:font script="Ethi" typeface="Nyala"/>
+        <a:font script="Beng" typeface="Vrinda"/>
+        <a:font script="Gujr" typeface="Shruti"/>
+        <a:font script="Khmr" typeface="MoolBoran"/>
+        <a:font script="Knda" typeface="Tunga"/>
+        <a:font script="Guru" typeface="Raavi"/>
+        <a:font script="Cans" typeface="Euphemia"/>
+        <a:font script="Cher" typeface="Plantagenet Cherokee"/>
+        <a:font script="Yiii" typeface="Microsoft Yi Baiti"/>
+        <a:font script="Tibt" typeface="Microsoft Himalaya"/>
+        <a:font script="Thaa" typeface="MV Boli"/>
+        <a:font script="Deva" typeface="Mangal"/>
+        <a:font script="Telu" typeface="Gautami"/>
+        <a:font script="Taml" typeface="Latha"/>
+        <a:font script="Syrc" typeface="Estrangelo Edessa"/>
+        <a:font script="Orya" typeface="Kalinga"/>
+        <a:font script="Mlym" typeface="Kartika"/>
+        <a:font script="Laoo" typeface="DokChampa"/>
+        <a:font script="Sinh" typeface="Iskoola Pota"/>
+        <a:font script="Mong" typeface="Mongolian Baiti"/>
+        <a:font script="Viet" typeface="Times New Roman"/>
+        <a:font script="Uigh" typeface="Microsoft Uighur"/>
+      </a:majorFont>
+      <a:minorFont>
+        <a:latin typeface="Calibri"/>
+        <a:ea typeface=""/>
+        <a:cs typeface=""/>
+        <a:font script="Jpan" typeface="ＭＳ Ｐゴシック"/>
+        <a:font script="Hang" typeface="맑은 고딕"/>
+        <a:font script="Hans" typeface="宋体"/>
+        <a:font script="Hant" typeface="新細明體"/>
+        <a:font script="Arab" typeface="Arial"/>
+        <a:font script="Hebr" typeface="Arial"/>
+        <a:font script="Thai" typeface="Cordia New"/>
+        <a:font script="Ethi" typeface="Nyala"/>
+        <a:font script="Beng" typeface="Vrinda"/>
+        <a:font script="Gujr" typeface="Shruti"/>
+        <a:font script="Khmr" typeface="DaunPenh"/>
+        <a:font script="Knda" typeface="Tunga"/>
+        <a:font script="Guru" typeface="Raavi"/>
+        <a:font script="Cans" typeface="Euphemia"/>
+        <a:font script="Cher" typeface="Plantagenet Cherokee"/>
+        <a:font script="Yiii" typeface="Microsoft Yi Baiti"/>
+        <a:font script="Tibt" typeface="Microsoft Himalaya"/>
+        <a:font script="Thaa" typeface="MV Boli"/>
+        <a:font script="Deva" typeface="Mangal"/>
+        <a:font script="Telu" typeface="Gautami"/>
+        <a:font script="Taml" typeface="Latha"/>
+        <a:font script="Syrc" typeface="Estrangelo Edessa"/>
+        <a:font script="Orya" typeface="Kalinga"/>
+        <a:font script="Mlym" typeface="Kartika"/>
+        <a:font script="Laoo" typeface="DokChampa"/>
+        <a:font script="Sinh" typeface="Iskoola Pota"/>
+        <a:font script="Mong" typeface="Mongolian Baiti"/>
+        <a:font script="Viet" typeface="Arial"/>
+        <a:font script="Uigh" typeface="Microsoft Uighur"/>
+      </a:minorFont>
+    </a:fontScheme>
+    <a:fmtScheme name="Office">
+      <a:fillStyleLst>
+        <a:solidFill>
+          <a:schemeClr val="phClr"/>
+        </a:solidFill>
+        <a:gradFill rotWithShape="1">
+          <a:gsLst>
+            <a:gs pos="0">
+              <a:schemeClr val="phClr">
+                <a:tint val="50000"/>
+                <a:satMod val="300000"/>
+              </a:schemeClr>
+            </a:gs>
+            <a:gs pos="35000">
+              <a:schemeClr val="phClr">
+                <a:tint val="37000"/>
+                <a:satMod val="300000"/>
+              </a:schemeClr>
+            </a:gs>
+            <a:gs pos="100000">
+              <a:schemeClr val="phClr">
+                <a:tint val="15000"/>
+                <a:satMod val="350000"/>
+              </a:schemeClr>
+            </a:gs>
+          </a:gsLst>
+          <a:lin ang="16200000" scaled="1"/>
+        </a:gradFill>
+        <a:gradFill rotWithShape="1">
+          <a:gsLst>
+            <a:gs pos="0">
+              <a:schemeClr val="phClr">
+                <a:tint val="100000"/>
+                <a:shade val="100000"/>
+                <a:satMod val="130000"/>
+              </a:schemeClr>
+            </a:gs>
+            <a:gs pos="100000">
+              <a:schemeClr val="phClr">
+                <a:tint val="50000"/>
+                <a:shade val="100000"/>
+                <a:satMod val="350000"/>
+              </a:schemeClr>
+            </a:gs>
+          </a:gsLst>
+          <a:lin ang="16200000" scaled="0"/>
+        </a:gradFill>
+      </a:fillStyleLst>
+      <a:lnStyleLst>
+        <a:ln w="9525" cap="flat" cmpd="sng" algn="ctr">
+          <a:solidFill>
+            <a:schemeClr val="phClr">
+              <a:shade val="95000"/>
+              <a:satMod val="105000"/>
+            </a:schemeClr>
+          </a:solidFill>
+          <a:prstDash val="solid"/>
+        </a:ln>
+        <a:ln w="25400" cap="flat" cmpd="sng" algn="ctr">
+          <a:solidFill>
+            <a:schemeClr val="phClr"/>
+          </a:solidFill>
+          <a:prstDash val="solid"/>
+        </a:ln>
+        <a:ln w="38100" cap="flat" cmpd="sng" algn="ctr">
+          <a:solidFill>
+            <a:schemeClr val="phClr"/>
+          </a:solidFill>
+          <a:prstDash val="solid"/>
+        </a:ln>
+      </a:lnStyleLst>
+      <a:effectStyleLst>
+        <a:effectStyle>
+          <a:effectLst>
+            <a:outerShdw blurRad="40000" dist="20000" dir="5400000" rotWithShape="0">
+              <a:srgbClr val="000000">
+                <a:alpha val="38000"/>
+              </a:srgbClr>
+            </a:outerShdw>
+          </a:effectLst>
+        </a:effectStyle>
+        <a:effectStyle>
+          <a:effectLst>
+            <a:outerShdw blurRad="40000" dist="23000" dir="5400000" rotWithShape="0">
+              <a:srgbClr val="000000">
+                <a:alpha val="35000"/>
+              </a:srgbClr>
+            </a:outerShdw>
+          </a:effectLst>
+        </a:effectStyle>
+        <a:effectStyle>
+          <a:effectLst>
+            <a:outerShdw blurRad="40000" dist="23000" dir="5400000" rotWithShape="0">
+              <a:srgbClr val="000000">
+                <a:alpha val="35000"/>
+              </a:srgbClr>
+            </a:outerShdw>
+          </a:effectLst>
+          <a:scene3d>
+            <a:camera prst="orthographicFront">
+              <a:rot lat="0" lon="0" rev="0"/>
+            </a:camera>
+            <a:lightRig rig="threePt" dir="t">
+              <a:rot lat="0" lon="0" rev="1200000"/>
+            </a:lightRig>
+          </a:scene3d>
+          <a:sp3d>
+            <a:bevelT w="63500" h="25400"/>
+          </a:sp3d>
+        </a:effectStyle>
+      </a:effectStyleLst>
+      <a:bgFillStyleLst>
+        <a:solidFill>
+          <a:schemeClr val="phClr"/>
+        </a:solidFill>
+        <a:gradFill rotWithShape="1">
+          <a:gsLst>
+            <a:gs pos="0">
+              <a:schemeClr val="phClr">
+                <a:tint val="40000"/>
+                <a:satMod val="350000"/>
+              </a:schemeClr>
+            </a:gs>
+            <a:gs pos="40000">
+              <a:schemeClr val="phClr">
+                <a:tint val="45000"/>
+                <a:shade val="99000"/>
+                <a:satMod val="350000"/>
+              </a:schemeClr>
+            </a:gs>
+            <a:gs pos="100000">
+              <a:schemeClr val="phClr">
+                <a:shade val="20000"/>
+                <a:satMod val="255000"/>
+              </a:schemeClr>
+            </a:gs>
+          </a:gsLst>
+          <a:path path="circle">
+            <a:fillToRect l="50000" t="-80000" r="50000" b="180000"/>
+          </a:path>
+        </a:gradFill>
+        <a:gradFill rotWithShape="1">
+          <a:gsLst>
+            <a:gs pos="0">
+              <a:schemeClr val="phClr">
+                <a:tint val="80000"/>
+                <a:satMod val="300000"/>
+              </a:schemeClr>
+            </a:gs>
+            <a:gs pos="100000">
+              <a:schemeClr val="phClr">
+                <a:shade val="30000"/>
+                <a:satMod val="200000"/>
+              </a:schemeClr>
+            </a:gs>
+          </a:gsLst>
+          <a:path path="circle">
+            <a:fillToRect l="50000" t="50000" r="50000" b="50000"/>
+          </a:path>
+        </a:gradFill>
+      </a:bgFillStyleLst>
+    </a:fmtScheme>
+  </a:themeElements>
+  <a:objectDefaults>
+    <a:spDef>
+      <a:spPr/>
+      <a:bodyPr/>
+      <a:lstStyle/>
+      <a:style>
+        <a:lnRef idx="1">
+          <a:schemeClr val="accent1"/>
+        </a:lnRef>
+        <a:fillRef idx="3">
+          <a:schemeClr val="accent1"/>
+        </a:fillRef>
+        <a:effectRef idx="2">
+          <a:schemeClr val="accent1"/>
+        </a:effectRef>
+        <a:fontRef idx="minor">
+          <a:schemeClr val="lt1"/>
+        </a:fontRef>
+      </a:style>
+    </a:spDef>
+    <a:lnDef>
+      <a:spPr/>
+      <a:bodyPr/>
+      <a:lstStyle/>
+      <a:style>
+        <a:lnRef idx="2">
+          <a:schemeClr val="accent1"/>
+        </a:lnRef>
+        <a:fillRef idx="0">
+          <a:schemeClr val="accent1"/>
+        </a:fillRef>
+        <a:effectRef idx="1">
+          <a:schemeClr val="accent1"/>
+        </a:effectRef>
+        <a:fontRef idx="minor">
+          <a:schemeClr val="tx1"/>
+        </a:fontRef>
+      </a:style>
+    </a:lnDef>
+  </a:objectDefaults>
+  <a:extraClrSchemeLst/>
+</a:theme>
 </file>
</xml_diff>

<commit_message>
Added two different kinds of subject to the powerpoint for clarity.
</commit_message>
<xml_diff>
--- a/RxJava and SWT.pptx
+++ b/RxJava and SWT.pptx
@@ -639,7 +639,7 @@
           <a:bodyPr/>
           <a:lstStyle/>
           <a:p>
-            <a:endParaRPr lang="en-US"/>
+            <a:endParaRPr lang="en-US" dirty="0"/>
           </a:p>
         </p:txBody>
       </p:sp>
@@ -8457,7 +8457,7 @@
           <a:graphicData uri="http://schemas.openxmlformats.org/presentationml/2006/ole">
             <mc:AlternateContent xmlns:mc="http://schemas.openxmlformats.org/markup-compatibility/2006">
               <mc:Choice xmlns:v="urn:schemas-microsoft-com:vml" Requires="v">
-                <p:oleObj spid="_x0000_s2086" name="Bitmap Image" r:id="rId6" imgW="6751440" imgH="1585080" progId="Paint.Picture">
+                <p:oleObj spid="_x0000_s2089" name="Bitmap Image" r:id="rId6" imgW="6751440" imgH="1585080" progId="Paint.Picture">
                   <p:embed/>
                 </p:oleObj>
               </mc:Choice>
@@ -12120,14 +12120,14 @@
       </p:sp>
       <p:pic>
         <p:nvPicPr>
-          <p:cNvPr id="1026" name="Picture 2" descr="http://reactivex.io/documentation/operators/images/S.PublishSubject.png"/>
+          <p:cNvPr id="1028" name="Picture 4" descr="http://reactivex.io/documentation/operators/images/S.PublishSubject.e.png"/>
           <p:cNvPicPr>
             <a:picLocks noChangeAspect="1" noChangeArrowheads="1"/>
           </p:cNvPicPr>
           <p:nvPr/>
         </p:nvPicPr>
         <p:blipFill>
-          <a:blip r:embed="rId2" cstate="print">
+          <a:blip r:embed="rId2">
             <a:extLst>
               <a:ext uri="{28A0092B-C50C-407E-A947-70E740481C1C}">
                 <a14:useLocalDpi xmlns:a14="http://schemas.microsoft.com/office/drawing/2010/main" val="0"/>
@@ -12141,8 +12141,8 @@
         </p:blipFill>
         <p:spPr bwMode="auto">
           <a:xfrm>
-            <a:off x="630693" y="3430736"/>
-            <a:ext cx="5084307" cy="3217413"/>
+            <a:off x="361520" y="3363551"/>
+            <a:ext cx="5327650" cy="3288158"/>
           </a:xfrm>
           <a:prstGeom prst="rect">
             <a:avLst/>
@@ -12161,14 +12161,14 @@
       </p:pic>
       <p:pic>
         <p:nvPicPr>
-          <p:cNvPr id="1028" name="Picture 4" descr="http://reactivex.io/documentation/operators/images/S.PublishSubject.e.png"/>
+          <p:cNvPr id="3074" name="Picture 2" descr="https://raw.github.com/wiki/ReactiveX/RxJava/images/rx-operators/S.BehaviorSubject.png"/>
           <p:cNvPicPr>
             <a:picLocks noChangeAspect="1" noChangeArrowheads="1"/>
           </p:cNvPicPr>
           <p:nvPr/>
         </p:nvPicPr>
         <p:blipFill>
-          <a:blip r:embed="rId3">
+          <a:blip r:embed="rId3" cstate="print">
             <a:extLst>
               <a:ext uri="{28A0092B-C50C-407E-A947-70E740481C1C}">
                 <a14:useLocalDpi xmlns:a14="http://schemas.microsoft.com/office/drawing/2010/main" val="0"/>
@@ -12182,8 +12182,8 @@
         </p:blipFill>
         <p:spPr bwMode="auto">
           <a:xfrm>
-            <a:off x="6349365" y="3361692"/>
-            <a:ext cx="5327650" cy="3288158"/>
+            <a:off x="6537127" y="3302953"/>
+            <a:ext cx="5257800" cy="3409355"/>
           </a:xfrm>
           <a:prstGeom prst="rect">
             <a:avLst/>

</xml_diff>